<commit_message>
Updating slides, finished reference implementation of list operations. Working on tests
</commit_message>
<xml_diff>
--- a/class-notes/cs321-winter-2023-lecture-7.pptx
+++ b/class-notes/cs321-winter-2023-lecture-7.pptx
@@ -21099,13 +21099,8 @@
           <a:p>
             <a:r>
               <a:rPr lang="en-CA" dirty="0"/>
-              <a:t>What do </a:t>
+              <a:t>What do we do to the data?</a:t>
             </a:r>
-            <a:r>
-              <a:rPr lang="en-CA"/>
-              <a:t>we do to the data?</a:t>
-            </a:r>
-            <a:endParaRPr lang="en-CA" dirty="0"/>
           </a:p>
         </p:txBody>
       </p:sp>
@@ -21930,6 +21925,17 @@
                 <a:hlinkClick r:id="rId3"/>
               </a:rPr>
               <a:t>https://referencesource.microsoft.com/#mscorlib/system/collections/generic/list.cs</a:t>
+            </a:r>
+            <a:endParaRPr lang="en-CA" dirty="0"/>
+          </a:p>
+          <a:p>
+            <a:r>
+              <a:rPr lang="en-CA" dirty="0"/>
+              <a:t>Use </a:t>
+            </a:r>
+            <a:r>
+              <a:rPr lang="en-CA" dirty="0" err="1"/>
+              <a:t>StackOverflow</a:t>
             </a:r>
             <a:endParaRPr lang="en-CA" dirty="0"/>
           </a:p>

</xml_diff>

<commit_message>
Improved slides a bit, but adding a lot of tests
</commit_message>
<xml_diff>
--- a/class-notes/cs321-winter-2023-lecture-7.pptx
+++ b/class-notes/cs321-winter-2023-lecture-7.pptx
@@ -5,7 +5,7 @@
     <p:sldMasterId id="2147484010" r:id="rId1"/>
   </p:sldMasterIdLst>
   <p:notesMasterIdLst>
-    <p:notesMasterId r:id="rId34"/>
+    <p:notesMasterId r:id="rId37"/>
   </p:notesMasterIdLst>
   <p:sldIdLst>
     <p:sldId id="449" r:id="rId2"/>
@@ -14,8 +14,8 @@
     <p:sldId id="483" r:id="rId5"/>
     <p:sldId id="484" r:id="rId6"/>
     <p:sldId id="451" r:id="rId7"/>
-    <p:sldId id="473" r:id="rId8"/>
-    <p:sldId id="456" r:id="rId9"/>
+    <p:sldId id="456" r:id="rId8"/>
+    <p:sldId id="487" r:id="rId9"/>
     <p:sldId id="450" r:id="rId10"/>
     <p:sldId id="458" r:id="rId11"/>
     <p:sldId id="460" r:id="rId12"/>
@@ -40,23 +40,26 @@
     <p:sldId id="485" r:id="rId31"/>
     <p:sldId id="475" r:id="rId32"/>
     <p:sldId id="464" r:id="rId33"/>
+    <p:sldId id="473" r:id="rId34"/>
+    <p:sldId id="486" r:id="rId35"/>
+    <p:sldId id="488" r:id="rId36"/>
   </p:sldIdLst>
   <p:sldSz cx="18288000" cy="10287000"/>
   <p:notesSz cx="18288000" cy="10287000"/>
   <p:embeddedFontLst>
     <p:embeddedFont>
       <p:font typeface="Calibri" panose="020F0502020204030204" pitchFamily="34" charset="0"/>
-      <p:regular r:id="rId35"/>
-      <p:bold r:id="rId36"/>
-      <p:italic r:id="rId37"/>
-      <p:boldItalic r:id="rId38"/>
+      <p:regular r:id="rId38"/>
+      <p:bold r:id="rId39"/>
+      <p:italic r:id="rId40"/>
+      <p:boldItalic r:id="rId41"/>
     </p:embeddedFont>
     <p:embeddedFont>
       <p:font typeface="Corbel" panose="020B0503020204020204" pitchFamily="34" charset="0"/>
-      <p:regular r:id="rId39"/>
-      <p:bold r:id="rId40"/>
-      <p:italic r:id="rId41"/>
-      <p:boldItalic r:id="rId42"/>
+      <p:regular r:id="rId42"/>
+      <p:bold r:id="rId43"/>
+      <p:italic r:id="rId44"/>
+      <p:boldItalic r:id="rId45"/>
     </p:embeddedFont>
   </p:embeddedFontLst>
   <p:defaultTextStyle>
@@ -155,6 +158,53 @@
     </a:lvl9pPr>
   </p:defaultTextStyle>
   <p:extLst>
+    <p:ext uri="{521415D9-36F7-43E2-AB2F-B90AF26B5E84}">
+      <p14:sectionLst xmlns:p14="http://schemas.microsoft.com/office/powerpoint/2010/main">
+        <p14:section name="Default Section" id="{E7535D71-1037-4E45-B81F-F6625FCF5CE7}">
+          <p14:sldIdLst>
+            <p14:sldId id="449"/>
+            <p14:sldId id="476"/>
+            <p14:sldId id="478"/>
+            <p14:sldId id="483"/>
+            <p14:sldId id="484"/>
+            <p14:sldId id="451"/>
+            <p14:sldId id="456"/>
+            <p14:sldId id="487"/>
+            <p14:sldId id="450"/>
+            <p14:sldId id="458"/>
+            <p14:sldId id="460"/>
+            <p14:sldId id="461"/>
+            <p14:sldId id="462"/>
+            <p14:sldId id="459"/>
+            <p14:sldId id="454"/>
+            <p14:sldId id="453"/>
+            <p14:sldId id="455"/>
+            <p14:sldId id="467"/>
+            <p14:sldId id="479"/>
+            <p14:sldId id="480"/>
+            <p14:sldId id="463"/>
+            <p14:sldId id="465"/>
+            <p14:sldId id="468"/>
+            <p14:sldId id="469"/>
+            <p14:sldId id="470"/>
+            <p14:sldId id="471"/>
+            <p14:sldId id="472"/>
+            <p14:sldId id="482"/>
+            <p14:sldId id="481"/>
+            <p14:sldId id="485"/>
+            <p14:sldId id="475"/>
+            <p14:sldId id="464"/>
+          </p14:sldIdLst>
+        </p14:section>
+        <p14:section name="Assignment #2" id="{3669AA45-E808-4C00-B1E0-48BB69BDD0DC}">
+          <p14:sldIdLst>
+            <p14:sldId id="473"/>
+            <p14:sldId id="486"/>
+            <p14:sldId id="488"/>
+          </p14:sldIdLst>
+        </p14:section>
+      </p14:sectionLst>
+    </p:ext>
     <p:ext uri="{EFAFB233-063F-42B5-8137-9DF3F51BA10A}">
       <p15:sldGuideLst xmlns:p15="http://schemas.microsoft.com/office/powerpoint/2012/main">
         <p15:guide id="1" orient="horz" pos="2880">
@@ -4762,6 +4812,788 @@
     <dgm:fillClrLst meth="repeat">
       <a:schemeClr val="accent1">
         <a:tint val="60000"/>
+      </a:schemeClr>
+    </dgm:fillClrLst>
+    <dgm:linClrLst meth="repeat">
+      <a:schemeClr val="lt1"/>
+    </dgm:linClrLst>
+    <dgm:effectClrLst/>
+    <dgm:txLinClrLst/>
+    <dgm:txFillClrLst meth="repeat">
+      <a:schemeClr val="dk1"/>
+    </dgm:txFillClrLst>
+    <dgm:txEffectClrLst/>
+  </dgm:styleLbl>
+  <dgm:styleLbl name="revTx">
+    <dgm:fillClrLst meth="repeat">
+      <a:schemeClr val="lt1">
+        <a:alpha val="0"/>
+      </a:schemeClr>
+    </dgm:fillClrLst>
+    <dgm:linClrLst meth="repeat">
+      <a:schemeClr val="dk1">
+        <a:alpha val="0"/>
+      </a:schemeClr>
+    </dgm:linClrLst>
+    <dgm:effectClrLst/>
+    <dgm:txLinClrLst/>
+    <dgm:txFillClrLst meth="repeat">
+      <a:schemeClr val="tx1"/>
+    </dgm:txFillClrLst>
+    <dgm:txEffectClrLst/>
+  </dgm:styleLbl>
+</dgm:colorsDef>
+</file>
+
+<file path=ppt/diagrams/colors7.xml><?xml version="1.0" encoding="utf-8"?>
+<dgm:colorsDef xmlns:dgm="http://schemas.openxmlformats.org/drawingml/2006/diagram" xmlns:a="http://schemas.openxmlformats.org/drawingml/2006/main" uniqueId="urn:microsoft.com/office/officeart/2005/8/colors/colorful5">
+  <dgm:title val=""/>
+  <dgm:desc val=""/>
+  <dgm:catLst>
+    <dgm:cat type="colorful" pri="10500"/>
+  </dgm:catLst>
+  <dgm:styleLbl name="node0">
+    <dgm:fillClrLst meth="repeat">
+      <a:schemeClr val="accent4"/>
+    </dgm:fillClrLst>
+    <dgm:linClrLst meth="repeat">
+      <a:schemeClr val="lt1"/>
+    </dgm:linClrLst>
+    <dgm:effectClrLst/>
+    <dgm:txLinClrLst/>
+    <dgm:txFillClrLst/>
+    <dgm:txEffectClrLst/>
+  </dgm:styleLbl>
+  <dgm:styleLbl name="node1">
+    <dgm:fillClrLst>
+      <a:schemeClr val="accent5"/>
+      <a:schemeClr val="accent6"/>
+    </dgm:fillClrLst>
+    <dgm:linClrLst meth="repeat">
+      <a:schemeClr val="lt1"/>
+    </dgm:linClrLst>
+    <dgm:effectClrLst/>
+    <dgm:txLinClrLst/>
+    <dgm:txFillClrLst/>
+    <dgm:txEffectClrLst/>
+  </dgm:styleLbl>
+  <dgm:styleLbl name="alignNode1">
+    <dgm:fillClrLst>
+      <a:schemeClr val="accent5"/>
+      <a:schemeClr val="accent6"/>
+    </dgm:fillClrLst>
+    <dgm:linClrLst>
+      <a:schemeClr val="accent5"/>
+      <a:schemeClr val="accent6"/>
+    </dgm:linClrLst>
+    <dgm:effectClrLst/>
+    <dgm:txLinClrLst/>
+    <dgm:txFillClrLst/>
+    <dgm:txEffectClrLst/>
+  </dgm:styleLbl>
+  <dgm:styleLbl name="lnNode1">
+    <dgm:fillClrLst>
+      <a:schemeClr val="accent5"/>
+      <a:schemeClr val="accent6"/>
+    </dgm:fillClrLst>
+    <dgm:linClrLst meth="repeat">
+      <a:schemeClr val="lt1"/>
+    </dgm:linClrLst>
+    <dgm:effectClrLst/>
+    <dgm:txLinClrLst/>
+    <dgm:txFillClrLst/>
+    <dgm:txEffectClrLst/>
+  </dgm:styleLbl>
+  <dgm:styleLbl name="vennNode1">
+    <dgm:fillClrLst>
+      <a:schemeClr val="accent5">
+        <a:alpha val="50000"/>
+      </a:schemeClr>
+      <a:schemeClr val="accent6">
+        <a:alpha val="50000"/>
+      </a:schemeClr>
+    </dgm:fillClrLst>
+    <dgm:linClrLst meth="repeat">
+      <a:schemeClr val="lt1"/>
+    </dgm:linClrLst>
+    <dgm:effectClrLst/>
+    <dgm:txLinClrLst/>
+    <dgm:txFillClrLst/>
+    <dgm:txEffectClrLst/>
+  </dgm:styleLbl>
+  <dgm:styleLbl name="node2">
+    <dgm:fillClrLst>
+      <a:schemeClr val="accent6"/>
+    </dgm:fillClrLst>
+    <dgm:linClrLst meth="repeat">
+      <a:schemeClr val="lt1"/>
+    </dgm:linClrLst>
+    <dgm:effectClrLst/>
+    <dgm:txLinClrLst/>
+    <dgm:txFillClrLst/>
+    <dgm:txEffectClrLst/>
+  </dgm:styleLbl>
+  <dgm:styleLbl name="node3">
+    <dgm:fillClrLst>
+      <a:schemeClr val="accent1"/>
+    </dgm:fillClrLst>
+    <dgm:linClrLst meth="repeat">
+      <a:schemeClr val="lt1"/>
+    </dgm:linClrLst>
+    <dgm:effectClrLst/>
+    <dgm:txLinClrLst/>
+    <dgm:txFillClrLst/>
+    <dgm:txEffectClrLst/>
+  </dgm:styleLbl>
+  <dgm:styleLbl name="node4">
+    <dgm:fillClrLst>
+      <a:schemeClr val="accent2"/>
+    </dgm:fillClrLst>
+    <dgm:linClrLst meth="repeat">
+      <a:schemeClr val="lt1"/>
+    </dgm:linClrLst>
+    <dgm:effectClrLst/>
+    <dgm:txLinClrLst/>
+    <dgm:txFillClrLst/>
+    <dgm:txEffectClrLst/>
+  </dgm:styleLbl>
+  <dgm:styleLbl name="fgImgPlace1">
+    <dgm:fillClrLst>
+      <a:schemeClr val="accent5">
+        <a:tint val="50000"/>
+      </a:schemeClr>
+      <a:schemeClr val="accent6">
+        <a:tint val="50000"/>
+      </a:schemeClr>
+    </dgm:fillClrLst>
+    <dgm:linClrLst meth="repeat">
+      <a:schemeClr val="lt1"/>
+    </dgm:linClrLst>
+    <dgm:effectClrLst/>
+    <dgm:txLinClrLst/>
+    <dgm:txFillClrLst meth="repeat">
+      <a:schemeClr val="lt1"/>
+    </dgm:txFillClrLst>
+    <dgm:txEffectClrLst/>
+  </dgm:styleLbl>
+  <dgm:styleLbl name="alignImgPlace1">
+    <dgm:fillClrLst>
+      <a:schemeClr val="accent5">
+        <a:tint val="50000"/>
+      </a:schemeClr>
+      <a:schemeClr val="accent6">
+        <a:tint val="20000"/>
+      </a:schemeClr>
+    </dgm:fillClrLst>
+    <dgm:linClrLst meth="repeat">
+      <a:schemeClr val="lt1"/>
+    </dgm:linClrLst>
+    <dgm:effectClrLst/>
+    <dgm:txLinClrLst/>
+    <dgm:txFillClrLst meth="repeat">
+      <a:schemeClr val="lt1"/>
+    </dgm:txFillClrLst>
+    <dgm:txEffectClrLst/>
+  </dgm:styleLbl>
+  <dgm:styleLbl name="bgImgPlace1">
+    <dgm:fillClrLst>
+      <a:schemeClr val="accent5">
+        <a:tint val="50000"/>
+      </a:schemeClr>
+      <a:schemeClr val="accent6">
+        <a:tint val="20000"/>
+      </a:schemeClr>
+    </dgm:fillClrLst>
+    <dgm:linClrLst meth="repeat">
+      <a:schemeClr val="lt1"/>
+    </dgm:linClrLst>
+    <dgm:effectClrLst/>
+    <dgm:txLinClrLst/>
+    <dgm:txFillClrLst meth="repeat">
+      <a:schemeClr val="lt1"/>
+    </dgm:txFillClrLst>
+    <dgm:txEffectClrLst/>
+  </dgm:styleLbl>
+  <dgm:styleLbl name="sibTrans2D1">
+    <dgm:fillClrLst>
+      <a:schemeClr val="accent5"/>
+      <a:schemeClr val="accent6"/>
+    </dgm:fillClrLst>
+    <dgm:linClrLst meth="repeat">
+      <a:schemeClr val="lt1"/>
+    </dgm:linClrLst>
+    <dgm:effectClrLst/>
+    <dgm:txLinClrLst/>
+    <dgm:txFillClrLst/>
+    <dgm:txEffectClrLst/>
+  </dgm:styleLbl>
+  <dgm:styleLbl name="fgSibTrans2D1">
+    <dgm:fillClrLst>
+      <a:schemeClr val="accent5"/>
+      <a:schemeClr val="accent6"/>
+    </dgm:fillClrLst>
+    <dgm:linClrLst meth="repeat">
+      <a:schemeClr val="lt1"/>
+    </dgm:linClrLst>
+    <dgm:effectClrLst/>
+    <dgm:txLinClrLst/>
+    <dgm:txFillClrLst meth="repeat">
+      <a:schemeClr val="lt1"/>
+    </dgm:txFillClrLst>
+    <dgm:txEffectClrLst/>
+  </dgm:styleLbl>
+  <dgm:styleLbl name="bgSibTrans2D1">
+    <dgm:fillClrLst>
+      <a:schemeClr val="accent5"/>
+      <a:schemeClr val="accent6"/>
+    </dgm:fillClrLst>
+    <dgm:linClrLst meth="repeat">
+      <a:schemeClr val="lt1"/>
+    </dgm:linClrLst>
+    <dgm:effectClrLst/>
+    <dgm:txLinClrLst/>
+    <dgm:txFillClrLst meth="repeat">
+      <a:schemeClr val="lt1"/>
+    </dgm:txFillClrLst>
+    <dgm:txEffectClrLst/>
+  </dgm:styleLbl>
+  <dgm:styleLbl name="sibTrans1D1">
+    <dgm:fillClrLst/>
+    <dgm:linClrLst>
+      <a:schemeClr val="accent5"/>
+      <a:schemeClr val="accent6"/>
+    </dgm:linClrLst>
+    <dgm:effectClrLst/>
+    <dgm:txLinClrLst/>
+    <dgm:txFillClrLst meth="repeat">
+      <a:schemeClr val="tx1"/>
+    </dgm:txFillClrLst>
+    <dgm:txEffectClrLst/>
+  </dgm:styleLbl>
+  <dgm:styleLbl name="callout">
+    <dgm:fillClrLst meth="repeat">
+      <a:schemeClr val="accent5"/>
+    </dgm:fillClrLst>
+    <dgm:linClrLst meth="repeat">
+      <a:schemeClr val="accent5">
+        <a:tint val="50000"/>
+      </a:schemeClr>
+    </dgm:linClrLst>
+    <dgm:effectClrLst/>
+    <dgm:txLinClrLst/>
+    <dgm:txFillClrLst meth="repeat">
+      <a:schemeClr val="tx1"/>
+    </dgm:txFillClrLst>
+    <dgm:txEffectClrLst/>
+  </dgm:styleLbl>
+  <dgm:styleLbl name="asst0">
+    <dgm:fillClrLst meth="repeat">
+      <a:schemeClr val="accent5"/>
+    </dgm:fillClrLst>
+    <dgm:linClrLst meth="repeat">
+      <a:schemeClr val="lt1">
+        <a:shade val="80000"/>
+      </a:schemeClr>
+    </dgm:linClrLst>
+    <dgm:effectClrLst/>
+    <dgm:txLinClrLst/>
+    <dgm:txFillClrLst/>
+    <dgm:txEffectClrLst/>
+  </dgm:styleLbl>
+  <dgm:styleLbl name="asst1">
+    <dgm:fillClrLst meth="repeat">
+      <a:schemeClr val="accent6"/>
+    </dgm:fillClrLst>
+    <dgm:linClrLst meth="repeat">
+      <a:schemeClr val="lt1">
+        <a:shade val="80000"/>
+      </a:schemeClr>
+    </dgm:linClrLst>
+    <dgm:effectClrLst/>
+    <dgm:txLinClrLst/>
+    <dgm:txFillClrLst/>
+    <dgm:txEffectClrLst/>
+  </dgm:styleLbl>
+  <dgm:styleLbl name="asst2">
+    <dgm:fillClrLst>
+      <a:schemeClr val="accent1"/>
+    </dgm:fillClrLst>
+    <dgm:linClrLst meth="repeat">
+      <a:schemeClr val="lt1"/>
+    </dgm:linClrLst>
+    <dgm:effectClrLst/>
+    <dgm:txLinClrLst/>
+    <dgm:txFillClrLst/>
+    <dgm:txEffectClrLst/>
+  </dgm:styleLbl>
+  <dgm:styleLbl name="asst3">
+    <dgm:fillClrLst>
+      <a:schemeClr val="accent2"/>
+    </dgm:fillClrLst>
+    <dgm:linClrLst meth="repeat">
+      <a:schemeClr val="lt1"/>
+    </dgm:linClrLst>
+    <dgm:effectClrLst/>
+    <dgm:txLinClrLst/>
+    <dgm:txFillClrLst/>
+    <dgm:txEffectClrLst/>
+  </dgm:styleLbl>
+  <dgm:styleLbl name="asst4">
+    <dgm:fillClrLst>
+      <a:schemeClr val="accent3"/>
+    </dgm:fillClrLst>
+    <dgm:linClrLst meth="repeat">
+      <a:schemeClr val="lt1"/>
+    </dgm:linClrLst>
+    <dgm:effectClrLst/>
+    <dgm:txLinClrLst/>
+    <dgm:txFillClrLst/>
+    <dgm:txEffectClrLst/>
+  </dgm:styleLbl>
+  <dgm:styleLbl name="parChTrans2D1">
+    <dgm:fillClrLst meth="repeat">
+      <a:schemeClr val="accent5"/>
+    </dgm:fillClrLst>
+    <dgm:linClrLst meth="repeat">
+      <a:schemeClr val="lt1"/>
+    </dgm:linClrLst>
+    <dgm:effectClrLst/>
+    <dgm:txLinClrLst/>
+    <dgm:txFillClrLst meth="repeat">
+      <a:schemeClr val="lt1"/>
+    </dgm:txFillClrLst>
+    <dgm:txEffectClrLst/>
+  </dgm:styleLbl>
+  <dgm:styleLbl name="parChTrans2D2">
+    <dgm:fillClrLst meth="repeat">
+      <a:schemeClr val="accent6"/>
+    </dgm:fillClrLst>
+    <dgm:linClrLst meth="repeat">
+      <a:schemeClr val="lt1"/>
+    </dgm:linClrLst>
+    <dgm:effectClrLst/>
+    <dgm:txLinClrLst/>
+    <dgm:txFillClrLst/>
+    <dgm:txEffectClrLst/>
+  </dgm:styleLbl>
+  <dgm:styleLbl name="parChTrans2D3">
+    <dgm:fillClrLst meth="repeat">
+      <a:schemeClr val="accent6"/>
+    </dgm:fillClrLst>
+    <dgm:linClrLst meth="repeat">
+      <a:schemeClr val="lt1"/>
+    </dgm:linClrLst>
+    <dgm:effectClrLst/>
+    <dgm:txLinClrLst/>
+    <dgm:txFillClrLst/>
+    <dgm:txEffectClrLst/>
+  </dgm:styleLbl>
+  <dgm:styleLbl name="parChTrans2D4">
+    <dgm:fillClrLst meth="repeat">
+      <a:schemeClr val="accent1"/>
+    </dgm:fillClrLst>
+    <dgm:linClrLst meth="repeat">
+      <a:schemeClr val="lt1"/>
+    </dgm:linClrLst>
+    <dgm:effectClrLst/>
+    <dgm:txLinClrLst/>
+    <dgm:txFillClrLst meth="repeat">
+      <a:schemeClr val="lt1"/>
+    </dgm:txFillClrLst>
+    <dgm:txEffectClrLst/>
+  </dgm:styleLbl>
+  <dgm:styleLbl name="parChTrans1D1">
+    <dgm:fillClrLst meth="repeat">
+      <a:schemeClr val="accent5"/>
+    </dgm:fillClrLst>
+    <dgm:linClrLst meth="repeat">
+      <a:schemeClr val="accent5"/>
+    </dgm:linClrLst>
+    <dgm:effectClrLst/>
+    <dgm:txLinClrLst/>
+    <dgm:txFillClrLst meth="repeat">
+      <a:schemeClr val="tx1"/>
+    </dgm:txFillClrLst>
+    <dgm:txEffectClrLst/>
+  </dgm:styleLbl>
+  <dgm:styleLbl name="parChTrans1D2">
+    <dgm:fillClrLst meth="repeat">
+      <a:schemeClr val="accent6">
+        <a:tint val="90000"/>
+      </a:schemeClr>
+    </dgm:fillClrLst>
+    <dgm:linClrLst meth="repeat">
+      <a:schemeClr val="accent6"/>
+    </dgm:linClrLst>
+    <dgm:effectClrLst/>
+    <dgm:txLinClrLst/>
+    <dgm:txFillClrLst meth="repeat">
+      <a:schemeClr val="tx1"/>
+    </dgm:txFillClrLst>
+    <dgm:txEffectClrLst/>
+  </dgm:styleLbl>
+  <dgm:styleLbl name="parChTrans1D3">
+    <dgm:fillClrLst meth="repeat">
+      <a:schemeClr val="accent6">
+        <a:tint val="70000"/>
+      </a:schemeClr>
+    </dgm:fillClrLst>
+    <dgm:linClrLst meth="repeat">
+      <a:schemeClr val="accent1"/>
+    </dgm:linClrLst>
+    <dgm:effectClrLst/>
+    <dgm:txLinClrLst/>
+    <dgm:txFillClrLst meth="repeat">
+      <a:schemeClr val="tx1"/>
+    </dgm:txFillClrLst>
+    <dgm:txEffectClrLst/>
+  </dgm:styleLbl>
+  <dgm:styleLbl name="parChTrans1D4">
+    <dgm:fillClrLst meth="repeat">
+      <a:schemeClr val="accent6">
+        <a:tint val="50000"/>
+      </a:schemeClr>
+    </dgm:fillClrLst>
+    <dgm:linClrLst meth="repeat">
+      <a:schemeClr val="accent2"/>
+    </dgm:linClrLst>
+    <dgm:effectClrLst/>
+    <dgm:txLinClrLst/>
+    <dgm:txFillClrLst meth="repeat">
+      <a:schemeClr val="tx1"/>
+    </dgm:txFillClrLst>
+    <dgm:txEffectClrLst/>
+  </dgm:styleLbl>
+  <dgm:styleLbl name="fgAcc1">
+    <dgm:fillClrLst meth="repeat">
+      <a:schemeClr val="lt1">
+        <a:alpha val="90000"/>
+      </a:schemeClr>
+    </dgm:fillClrLst>
+    <dgm:linClrLst>
+      <a:schemeClr val="accent5"/>
+      <a:schemeClr val="accent6"/>
+    </dgm:linClrLst>
+    <dgm:effectClrLst/>
+    <dgm:txLinClrLst/>
+    <dgm:txFillClrLst meth="repeat">
+      <a:schemeClr val="dk1"/>
+    </dgm:txFillClrLst>
+    <dgm:txEffectClrLst/>
+  </dgm:styleLbl>
+  <dgm:styleLbl name="conFgAcc1">
+    <dgm:fillClrLst meth="repeat">
+      <a:schemeClr val="lt1">
+        <a:alpha val="90000"/>
+      </a:schemeClr>
+    </dgm:fillClrLst>
+    <dgm:linClrLst>
+      <a:schemeClr val="accent5"/>
+      <a:schemeClr val="accent6"/>
+    </dgm:linClrLst>
+    <dgm:effectClrLst/>
+    <dgm:txLinClrLst/>
+    <dgm:txFillClrLst meth="repeat">
+      <a:schemeClr val="dk1"/>
+    </dgm:txFillClrLst>
+    <dgm:txEffectClrLst/>
+  </dgm:styleLbl>
+  <dgm:styleLbl name="alignAcc1">
+    <dgm:fillClrLst meth="repeat">
+      <a:schemeClr val="lt1">
+        <a:alpha val="90000"/>
+      </a:schemeClr>
+    </dgm:fillClrLst>
+    <dgm:linClrLst>
+      <a:schemeClr val="accent5"/>
+      <a:schemeClr val="accent6"/>
+    </dgm:linClrLst>
+    <dgm:effectClrLst/>
+    <dgm:txLinClrLst/>
+    <dgm:txFillClrLst meth="repeat">
+      <a:schemeClr val="dk1"/>
+    </dgm:txFillClrLst>
+    <dgm:txEffectClrLst/>
+  </dgm:styleLbl>
+  <dgm:styleLbl name="trAlignAcc1">
+    <dgm:fillClrLst meth="repeat">
+      <a:schemeClr val="lt1">
+        <a:alpha val="40000"/>
+      </a:schemeClr>
+    </dgm:fillClrLst>
+    <dgm:linClrLst meth="repeat">
+      <a:schemeClr val="accent5"/>
+    </dgm:linClrLst>
+    <dgm:effectClrLst/>
+    <dgm:txLinClrLst/>
+    <dgm:txFillClrLst meth="repeat">
+      <a:schemeClr val="dk1"/>
+    </dgm:txFillClrLst>
+    <dgm:txEffectClrLst/>
+  </dgm:styleLbl>
+  <dgm:styleLbl name="bgAcc1">
+    <dgm:fillClrLst meth="repeat">
+      <a:schemeClr val="lt1">
+        <a:alpha val="90000"/>
+      </a:schemeClr>
+    </dgm:fillClrLst>
+    <dgm:linClrLst>
+      <a:schemeClr val="accent5"/>
+      <a:schemeClr val="accent6"/>
+    </dgm:linClrLst>
+    <dgm:effectClrLst/>
+    <dgm:txLinClrLst/>
+    <dgm:txFillClrLst meth="repeat">
+      <a:schemeClr val="dk1"/>
+    </dgm:txFillClrLst>
+    <dgm:txEffectClrLst/>
+  </dgm:styleLbl>
+  <dgm:styleLbl name="solidFgAcc1">
+    <dgm:fillClrLst meth="repeat">
+      <a:schemeClr val="lt1"/>
+    </dgm:fillClrLst>
+    <dgm:linClrLst>
+      <a:schemeClr val="accent5"/>
+      <a:schemeClr val="accent6"/>
+    </dgm:linClrLst>
+    <dgm:effectClrLst/>
+    <dgm:txLinClrLst/>
+    <dgm:txFillClrLst meth="repeat">
+      <a:schemeClr val="dk1"/>
+    </dgm:txFillClrLst>
+    <dgm:txEffectClrLst/>
+  </dgm:styleLbl>
+  <dgm:styleLbl name="solidAlignAcc1">
+    <dgm:fillClrLst meth="repeat">
+      <a:schemeClr val="lt1"/>
+    </dgm:fillClrLst>
+    <dgm:linClrLst>
+      <a:schemeClr val="accent5"/>
+      <a:schemeClr val="accent6"/>
+    </dgm:linClrLst>
+    <dgm:effectClrLst/>
+    <dgm:txLinClrLst/>
+    <dgm:txFillClrLst meth="repeat">
+      <a:schemeClr val="dk1"/>
+    </dgm:txFillClrLst>
+    <dgm:txEffectClrLst/>
+  </dgm:styleLbl>
+  <dgm:styleLbl name="solidBgAcc1">
+    <dgm:fillClrLst meth="repeat">
+      <a:schemeClr val="lt1"/>
+    </dgm:fillClrLst>
+    <dgm:linClrLst>
+      <a:schemeClr val="accent5"/>
+      <a:schemeClr val="accent6"/>
+    </dgm:linClrLst>
+    <dgm:effectClrLst/>
+    <dgm:txLinClrLst/>
+    <dgm:txFillClrLst meth="repeat">
+      <a:schemeClr val="dk1"/>
+    </dgm:txFillClrLst>
+    <dgm:txEffectClrLst/>
+  </dgm:styleLbl>
+  <dgm:styleLbl name="fgAccFollowNode1">
+    <dgm:fillClrLst>
+      <a:schemeClr val="accent5">
+        <a:tint val="40000"/>
+        <a:alpha val="90000"/>
+      </a:schemeClr>
+      <a:schemeClr val="accent6">
+        <a:tint val="40000"/>
+        <a:alpha val="90000"/>
+      </a:schemeClr>
+    </dgm:fillClrLst>
+    <dgm:linClrLst>
+      <a:schemeClr val="accent5">
+        <a:tint val="40000"/>
+        <a:alpha val="90000"/>
+      </a:schemeClr>
+      <a:schemeClr val="accent5">
+        <a:tint val="40000"/>
+        <a:alpha val="90000"/>
+      </a:schemeClr>
+    </dgm:linClrLst>
+    <dgm:effectClrLst/>
+    <dgm:txLinClrLst/>
+    <dgm:txFillClrLst meth="repeat">
+      <a:schemeClr val="dk1"/>
+    </dgm:txFillClrLst>
+    <dgm:txEffectClrLst/>
+  </dgm:styleLbl>
+  <dgm:styleLbl name="alignAccFollowNode1">
+    <dgm:fillClrLst>
+      <a:schemeClr val="accent5">
+        <a:tint val="40000"/>
+        <a:alpha val="90000"/>
+      </a:schemeClr>
+      <a:schemeClr val="accent6">
+        <a:tint val="40000"/>
+        <a:alpha val="90000"/>
+      </a:schemeClr>
+    </dgm:fillClrLst>
+    <dgm:linClrLst>
+      <a:schemeClr val="accent5">
+        <a:tint val="40000"/>
+        <a:alpha val="90000"/>
+      </a:schemeClr>
+      <a:schemeClr val="accent6">
+        <a:tint val="40000"/>
+        <a:alpha val="90000"/>
+      </a:schemeClr>
+    </dgm:linClrLst>
+    <dgm:effectClrLst/>
+    <dgm:txLinClrLst/>
+    <dgm:txFillClrLst meth="repeat">
+      <a:schemeClr val="dk1"/>
+    </dgm:txFillClrLst>
+    <dgm:txEffectClrLst/>
+  </dgm:styleLbl>
+  <dgm:styleLbl name="bgAccFollowNode1">
+    <dgm:fillClrLst>
+      <a:schemeClr val="accent5">
+        <a:tint val="40000"/>
+        <a:alpha val="90000"/>
+      </a:schemeClr>
+      <a:schemeClr val="accent6">
+        <a:tint val="40000"/>
+        <a:alpha val="90000"/>
+      </a:schemeClr>
+    </dgm:fillClrLst>
+    <dgm:linClrLst>
+      <a:schemeClr val="accent5">
+        <a:tint val="40000"/>
+        <a:alpha val="90000"/>
+      </a:schemeClr>
+      <a:schemeClr val="accent6">
+        <a:tint val="40000"/>
+        <a:alpha val="90000"/>
+      </a:schemeClr>
+    </dgm:linClrLst>
+    <dgm:effectClrLst/>
+    <dgm:txLinClrLst/>
+    <dgm:txFillClrLst meth="repeat">
+      <a:schemeClr val="dk1"/>
+    </dgm:txFillClrLst>
+    <dgm:txEffectClrLst/>
+  </dgm:styleLbl>
+  <dgm:styleLbl name="fgAcc0">
+    <dgm:fillClrLst meth="repeat">
+      <a:schemeClr val="lt1">
+        <a:alpha val="90000"/>
+      </a:schemeClr>
+    </dgm:fillClrLst>
+    <dgm:linClrLst>
+      <a:schemeClr val="accent4"/>
+    </dgm:linClrLst>
+    <dgm:effectClrLst/>
+    <dgm:txLinClrLst/>
+    <dgm:txFillClrLst meth="repeat">
+      <a:schemeClr val="dk1"/>
+    </dgm:txFillClrLst>
+    <dgm:txEffectClrLst/>
+  </dgm:styleLbl>
+  <dgm:styleLbl name="fgAcc2">
+    <dgm:fillClrLst meth="repeat">
+      <a:schemeClr val="lt1">
+        <a:alpha val="90000"/>
+      </a:schemeClr>
+    </dgm:fillClrLst>
+    <dgm:linClrLst>
+      <a:schemeClr val="accent6"/>
+    </dgm:linClrLst>
+    <dgm:effectClrLst/>
+    <dgm:txLinClrLst/>
+    <dgm:txFillClrLst meth="repeat">
+      <a:schemeClr val="dk1"/>
+    </dgm:txFillClrLst>
+    <dgm:txEffectClrLst/>
+  </dgm:styleLbl>
+  <dgm:styleLbl name="fgAcc3">
+    <dgm:fillClrLst meth="repeat">
+      <a:schemeClr val="lt1">
+        <a:alpha val="90000"/>
+      </a:schemeClr>
+    </dgm:fillClrLst>
+    <dgm:linClrLst>
+      <a:schemeClr val="accent1"/>
+    </dgm:linClrLst>
+    <dgm:effectClrLst/>
+    <dgm:txLinClrLst/>
+    <dgm:txFillClrLst meth="repeat">
+      <a:schemeClr val="dk1"/>
+    </dgm:txFillClrLst>
+    <dgm:txEffectClrLst/>
+  </dgm:styleLbl>
+  <dgm:styleLbl name="fgAcc4">
+    <dgm:fillClrLst meth="repeat">
+      <a:schemeClr val="lt1">
+        <a:alpha val="90000"/>
+      </a:schemeClr>
+    </dgm:fillClrLst>
+    <dgm:linClrLst>
+      <a:schemeClr val="accent2"/>
+    </dgm:linClrLst>
+    <dgm:effectClrLst/>
+    <dgm:txLinClrLst/>
+    <dgm:txFillClrLst meth="repeat">
+      <a:schemeClr val="dk1"/>
+    </dgm:txFillClrLst>
+    <dgm:txEffectClrLst/>
+  </dgm:styleLbl>
+  <dgm:styleLbl name="bgShp">
+    <dgm:fillClrLst meth="repeat">
+      <a:schemeClr val="accent5">
+        <a:tint val="40000"/>
+      </a:schemeClr>
+    </dgm:fillClrLst>
+    <dgm:linClrLst meth="repeat">
+      <a:schemeClr val="dk1"/>
+    </dgm:linClrLst>
+    <dgm:effectClrLst/>
+    <dgm:txLinClrLst/>
+    <dgm:txFillClrLst meth="repeat">
+      <a:schemeClr val="dk1"/>
+    </dgm:txFillClrLst>
+    <dgm:txEffectClrLst/>
+  </dgm:styleLbl>
+  <dgm:styleLbl name="dkBgShp">
+    <dgm:fillClrLst meth="repeat">
+      <a:schemeClr val="accent5">
+        <a:shade val="90000"/>
+      </a:schemeClr>
+    </dgm:fillClrLst>
+    <dgm:linClrLst meth="repeat">
+      <a:schemeClr val="dk1"/>
+    </dgm:linClrLst>
+    <dgm:effectClrLst/>
+    <dgm:txLinClrLst/>
+    <dgm:txFillClrLst meth="repeat">
+      <a:schemeClr val="lt1"/>
+    </dgm:txFillClrLst>
+    <dgm:txEffectClrLst/>
+  </dgm:styleLbl>
+  <dgm:styleLbl name="trBgShp">
+    <dgm:fillClrLst meth="repeat">
+      <a:schemeClr val="accent5">
+        <a:tint val="50000"/>
+        <a:alpha val="40000"/>
+      </a:schemeClr>
+    </dgm:fillClrLst>
+    <dgm:linClrLst meth="repeat">
+      <a:schemeClr val="accent5"/>
+    </dgm:linClrLst>
+    <dgm:effectClrLst/>
+    <dgm:txLinClrLst/>
+    <dgm:txFillClrLst meth="repeat">
+      <a:schemeClr val="lt1"/>
+    </dgm:txFillClrLst>
+    <dgm:txEffectClrLst/>
+  </dgm:styleLbl>
+  <dgm:styleLbl name="fgShp">
+    <dgm:fillClrLst meth="repeat">
+      <a:schemeClr val="accent5">
+        <a:tint val="40000"/>
       </a:schemeClr>
     </dgm:fillClrLst>
     <dgm:linClrLst meth="repeat">
@@ -5702,7 +6534,7 @@
   <dgm:whole/>
   <dgm:extLst>
     <a:ext uri="http://schemas.microsoft.com/office/drawing/2008/diagram">
-      <dsp:dataModelExt xmlns:dsp="http://schemas.microsoft.com/office/drawing/2008/diagram" relId="rId6" minVer="http://schemas.openxmlformats.org/drawingml/2006/diagram"/>
+      <dsp:dataModelExt xmlns:dsp="http://schemas.microsoft.com/office/drawing/2008/diagram" relId="rId7" minVer="http://schemas.openxmlformats.org/drawingml/2006/diagram"/>
     </a:ext>
   </dgm:extLst>
 </dgm:dataModel>
@@ -5926,6 +6758,866 @@
     <dgm:cxn modelId="{69395EC2-4942-4577-95D5-FB646EB82A59}" type="presParOf" srcId="{F7533666-D720-4E14-89D3-E8CCFF7005DC}" destId="{524086B5-AAFE-47CE-AA20-6302C22CC753}" srcOrd="4" destOrd="0" presId="urn:microsoft.com/office/officeart/2005/8/layout/hProcess9"/>
     <dgm:cxn modelId="{6431D54B-F5B4-42BD-B022-6A3251E09086}" type="presParOf" srcId="{F7533666-D720-4E14-89D3-E8CCFF7005DC}" destId="{0588F9D1-27BD-4812-985E-41A81D80D7C9}" srcOrd="5" destOrd="0" presId="urn:microsoft.com/office/officeart/2005/8/layout/hProcess9"/>
     <dgm:cxn modelId="{48D36916-187A-417D-93F6-07B1431573E0}" type="presParOf" srcId="{F7533666-D720-4E14-89D3-E8CCFF7005DC}" destId="{EFB97832-257D-413B-8248-FA0FB42AF18E}" srcOrd="6" destOrd="0" presId="urn:microsoft.com/office/officeart/2005/8/layout/hProcess9"/>
+  </dgm:cxnLst>
+  <dgm:bg/>
+  <dgm:whole/>
+  <dgm:extLst>
+    <a:ext uri="http://schemas.microsoft.com/office/drawing/2008/diagram">
+      <dsp:dataModelExt xmlns:dsp="http://schemas.microsoft.com/office/drawing/2008/diagram" relId="rId6" minVer="http://schemas.openxmlformats.org/drawingml/2006/diagram"/>
+    </a:ext>
+  </dgm:extLst>
+</dgm:dataModel>
+</file>
+
+<file path=ppt/diagrams/data7.xml><?xml version="1.0" encoding="utf-8"?>
+<dgm:dataModel xmlns:dgm="http://schemas.openxmlformats.org/drawingml/2006/diagram" xmlns:a="http://schemas.openxmlformats.org/drawingml/2006/main">
+  <dgm:ptLst>
+    <dgm:pt modelId="{1C26C817-B3BB-4D6C-8907-EA466F27B5F0}" type="doc">
+      <dgm:prSet loTypeId="urn:microsoft.com/office/officeart/2005/8/layout/default" loCatId="list" qsTypeId="urn:microsoft.com/office/officeart/2005/8/quickstyle/simple1" qsCatId="simple" csTypeId="urn:microsoft.com/office/officeart/2005/8/colors/colorful5" csCatId="colorful" phldr="1"/>
+      <dgm:spPr/>
+      <dgm:t>
+        <a:bodyPr/>
+        <a:lstStyle/>
+        <a:p>
+          <a:endParaRPr lang="en-US"/>
+        </a:p>
+      </dgm:t>
+    </dgm:pt>
+    <dgm:pt modelId="{96FF5E58-5217-4B84-8C6E-5AC3AC7C5E06}">
+      <dgm:prSet/>
+      <dgm:spPr/>
+      <dgm:t>
+        <a:bodyPr/>
+        <a:lstStyle/>
+        <a:p>
+          <a:r>
+            <a:rPr lang="en-CA" dirty="0"/>
+            <a:t>Smoke test </a:t>
+          </a:r>
+          <a:endParaRPr lang="en-US" dirty="0"/>
+        </a:p>
+      </dgm:t>
+    </dgm:pt>
+    <dgm:pt modelId="{34BCA199-29ED-4CA6-B605-231DA2536C22}" type="parTrans" cxnId="{36F51673-AC30-4B56-9B97-BA338B78158C}">
+      <dgm:prSet/>
+      <dgm:spPr/>
+      <dgm:t>
+        <a:bodyPr/>
+        <a:lstStyle/>
+        <a:p>
+          <a:endParaRPr lang="en-US"/>
+        </a:p>
+      </dgm:t>
+    </dgm:pt>
+    <dgm:pt modelId="{F5EAB60A-CBF6-4308-AF04-E6B870C8C0D3}" type="sibTrans" cxnId="{36F51673-AC30-4B56-9B97-BA338B78158C}">
+      <dgm:prSet/>
+      <dgm:spPr/>
+      <dgm:t>
+        <a:bodyPr/>
+        <a:lstStyle/>
+        <a:p>
+          <a:endParaRPr lang="en-US"/>
+        </a:p>
+      </dgm:t>
+    </dgm:pt>
+    <dgm:pt modelId="{5F1472ED-C5FF-4B4B-A315-11E4111322E0}">
+      <dgm:prSet/>
+      <dgm:spPr/>
+      <dgm:t>
+        <a:bodyPr/>
+        <a:lstStyle/>
+        <a:p>
+          <a:r>
+            <a:rPr lang="en-CA" dirty="0"/>
+            <a:t>Does it do what I expect with basic input</a:t>
+          </a:r>
+          <a:endParaRPr lang="en-US" dirty="0"/>
+        </a:p>
+      </dgm:t>
+    </dgm:pt>
+    <dgm:pt modelId="{FE1B877D-89C0-4531-B73D-D977ACE5C33D}" type="parTrans" cxnId="{5856CA4E-BAE8-48B6-939C-874668EAC79E}">
+      <dgm:prSet/>
+      <dgm:spPr/>
+      <dgm:t>
+        <a:bodyPr/>
+        <a:lstStyle/>
+        <a:p>
+          <a:endParaRPr lang="en-US"/>
+        </a:p>
+      </dgm:t>
+    </dgm:pt>
+    <dgm:pt modelId="{5D713612-5265-4C4D-B1DF-1875B191382A}" type="sibTrans" cxnId="{5856CA4E-BAE8-48B6-939C-874668EAC79E}">
+      <dgm:prSet/>
+      <dgm:spPr/>
+      <dgm:t>
+        <a:bodyPr/>
+        <a:lstStyle/>
+        <a:p>
+          <a:endParaRPr lang="en-US"/>
+        </a:p>
+      </dgm:t>
+    </dgm:pt>
+    <dgm:pt modelId="{D0A690C7-CB42-4A8C-BFA9-1A5CEF66D437}">
+      <dgm:prSet/>
+      <dgm:spPr/>
+      <dgm:t>
+        <a:bodyPr/>
+        <a:lstStyle/>
+        <a:p>
+          <a:r>
+            <a:rPr lang="en-CA" dirty="0"/>
+            <a:t>Comprehensive test</a:t>
+          </a:r>
+          <a:endParaRPr lang="en-US" dirty="0"/>
+        </a:p>
+      </dgm:t>
+    </dgm:pt>
+    <dgm:pt modelId="{2D2E188C-32B2-42A1-BDA8-E56F044A5572}" type="parTrans" cxnId="{E4BAC639-A7BC-48FA-90F6-B5AFA701F23E}">
+      <dgm:prSet/>
+      <dgm:spPr/>
+      <dgm:t>
+        <a:bodyPr/>
+        <a:lstStyle/>
+        <a:p>
+          <a:endParaRPr lang="en-US"/>
+        </a:p>
+      </dgm:t>
+    </dgm:pt>
+    <dgm:pt modelId="{DC4D009E-D4C1-4B03-8B3B-D4DE5DDE1B82}" type="sibTrans" cxnId="{E4BAC639-A7BC-48FA-90F6-B5AFA701F23E}">
+      <dgm:prSet/>
+      <dgm:spPr/>
+      <dgm:t>
+        <a:bodyPr/>
+        <a:lstStyle/>
+        <a:p>
+          <a:endParaRPr lang="en-US"/>
+        </a:p>
+      </dgm:t>
+    </dgm:pt>
+    <dgm:pt modelId="{6D01C3FA-1E54-44A5-8564-1A65A816D47A}">
+      <dgm:prSet/>
+      <dgm:spPr/>
+      <dgm:t>
+        <a:bodyPr/>
+        <a:lstStyle/>
+        <a:p>
+          <a:r>
+            <a:rPr lang="en-CA" dirty="0"/>
+            <a:t>Does it meet properties across a range of inputs </a:t>
+          </a:r>
+          <a:endParaRPr lang="en-US" dirty="0"/>
+        </a:p>
+      </dgm:t>
+    </dgm:pt>
+    <dgm:pt modelId="{306F263C-AEC9-4DF8-8C1A-716CF0ABCE30}" type="parTrans" cxnId="{8E04A8FB-CADD-4F1B-963F-B01D370F3A08}">
+      <dgm:prSet/>
+      <dgm:spPr/>
+      <dgm:t>
+        <a:bodyPr/>
+        <a:lstStyle/>
+        <a:p>
+          <a:endParaRPr lang="en-US"/>
+        </a:p>
+      </dgm:t>
+    </dgm:pt>
+    <dgm:pt modelId="{2A947A13-8CB9-4144-A6C7-665E60EEA0E7}" type="sibTrans" cxnId="{8E04A8FB-CADD-4F1B-963F-B01D370F3A08}">
+      <dgm:prSet/>
+      <dgm:spPr/>
+      <dgm:t>
+        <a:bodyPr/>
+        <a:lstStyle/>
+        <a:p>
+          <a:endParaRPr lang="en-US"/>
+        </a:p>
+      </dgm:t>
+    </dgm:pt>
+    <dgm:pt modelId="{0E6EA64B-1647-49BC-9874-78A2D9B88ED6}">
+      <dgm:prSet/>
+      <dgm:spPr/>
+      <dgm:t>
+        <a:bodyPr/>
+        <a:lstStyle/>
+        <a:p>
+          <a:r>
+            <a:rPr lang="en-CA" dirty="0"/>
+            <a:t>Performance test</a:t>
+          </a:r>
+          <a:endParaRPr lang="en-US" dirty="0"/>
+        </a:p>
+      </dgm:t>
+    </dgm:pt>
+    <dgm:pt modelId="{8854BB9C-0F7A-4939-90C6-5FABF85352C5}" type="parTrans" cxnId="{264C5297-0824-4912-B5BF-3A9A40D98B5C}">
+      <dgm:prSet/>
+      <dgm:spPr/>
+      <dgm:t>
+        <a:bodyPr/>
+        <a:lstStyle/>
+        <a:p>
+          <a:endParaRPr lang="en-US"/>
+        </a:p>
+      </dgm:t>
+    </dgm:pt>
+    <dgm:pt modelId="{CC19225D-9EEF-4AF6-91A8-881E5A2C1C8D}" type="sibTrans" cxnId="{264C5297-0824-4912-B5BF-3A9A40D98B5C}">
+      <dgm:prSet/>
+      <dgm:spPr/>
+      <dgm:t>
+        <a:bodyPr/>
+        <a:lstStyle/>
+        <a:p>
+          <a:endParaRPr lang="en-US"/>
+        </a:p>
+      </dgm:t>
+    </dgm:pt>
+    <dgm:pt modelId="{F911D231-12A4-4D34-AC44-2365329CDB0A}">
+      <dgm:prSet/>
+      <dgm:spPr/>
+      <dgm:t>
+        <a:bodyPr/>
+        <a:lstStyle/>
+        <a:p>
+          <a:r>
+            <a:rPr lang="en-CA" dirty="0"/>
+            <a:t>Does the algorithm meet performance criteria</a:t>
+          </a:r>
+          <a:endParaRPr lang="en-US" dirty="0"/>
+        </a:p>
+      </dgm:t>
+    </dgm:pt>
+    <dgm:pt modelId="{AF29ED3D-F99C-479A-9942-55724A157D7B}" type="parTrans" cxnId="{1F80226D-59E4-4EC4-B97A-73F008F23B1D}">
+      <dgm:prSet/>
+      <dgm:spPr/>
+      <dgm:t>
+        <a:bodyPr/>
+        <a:lstStyle/>
+        <a:p>
+          <a:endParaRPr lang="en-US"/>
+        </a:p>
+      </dgm:t>
+    </dgm:pt>
+    <dgm:pt modelId="{9196B4FC-BCBD-4F92-AB0A-0451914C7CB0}" type="sibTrans" cxnId="{1F80226D-59E4-4EC4-B97A-73F008F23B1D}">
+      <dgm:prSet/>
+      <dgm:spPr/>
+      <dgm:t>
+        <a:bodyPr/>
+        <a:lstStyle/>
+        <a:p>
+          <a:endParaRPr lang="en-US"/>
+        </a:p>
+      </dgm:t>
+    </dgm:pt>
+    <dgm:pt modelId="{08F0411E-BA7B-409B-B37F-F903E2F0A164}">
+      <dgm:prSet/>
+      <dgm:spPr/>
+      <dgm:t>
+        <a:bodyPr/>
+        <a:lstStyle/>
+        <a:p>
+          <a:r>
+            <a:rPr lang="en-CA"/>
+            <a:t>Edge case test</a:t>
+          </a:r>
+          <a:endParaRPr lang="en-US"/>
+        </a:p>
+      </dgm:t>
+    </dgm:pt>
+    <dgm:pt modelId="{65C5E997-0A4D-46BC-834B-5A40435FCF7C}" type="parTrans" cxnId="{66C7F619-F8C0-4582-A787-4F9BD617D076}">
+      <dgm:prSet/>
+      <dgm:spPr/>
+      <dgm:t>
+        <a:bodyPr/>
+        <a:lstStyle/>
+        <a:p>
+          <a:endParaRPr lang="en-US"/>
+        </a:p>
+      </dgm:t>
+    </dgm:pt>
+    <dgm:pt modelId="{3D2DF141-B701-46F8-B58A-DFBC5132829C}" type="sibTrans" cxnId="{66C7F619-F8C0-4582-A787-4F9BD617D076}">
+      <dgm:prSet/>
+      <dgm:spPr/>
+      <dgm:t>
+        <a:bodyPr/>
+        <a:lstStyle/>
+        <a:p>
+          <a:endParaRPr lang="en-US"/>
+        </a:p>
+      </dgm:t>
+    </dgm:pt>
+    <dgm:pt modelId="{81C4566B-2190-426D-B9BF-E2B588F52183}">
+      <dgm:prSet/>
+      <dgm:spPr/>
+      <dgm:t>
+        <a:bodyPr/>
+        <a:lstStyle/>
+        <a:p>
+          <a:r>
+            <a:rPr lang="en-CA" dirty="0"/>
+            <a:t>Does it work with rare or degenerate input</a:t>
+          </a:r>
+          <a:endParaRPr lang="en-US" dirty="0"/>
+        </a:p>
+      </dgm:t>
+    </dgm:pt>
+    <dgm:pt modelId="{685BB180-9962-41A6-8A6B-96DE8BE33E82}" type="parTrans" cxnId="{B1039FD8-527B-465C-8FE6-3DC681816C24}">
+      <dgm:prSet/>
+      <dgm:spPr/>
+      <dgm:t>
+        <a:bodyPr/>
+        <a:lstStyle/>
+        <a:p>
+          <a:endParaRPr lang="en-US"/>
+        </a:p>
+      </dgm:t>
+    </dgm:pt>
+    <dgm:pt modelId="{AE4E7192-9404-41DC-8A83-5B5C3595E736}" type="sibTrans" cxnId="{B1039FD8-527B-465C-8FE6-3DC681816C24}">
+      <dgm:prSet/>
+      <dgm:spPr/>
+      <dgm:t>
+        <a:bodyPr/>
+        <a:lstStyle/>
+        <a:p>
+          <a:endParaRPr lang="en-US"/>
+        </a:p>
+      </dgm:t>
+    </dgm:pt>
+    <dgm:pt modelId="{F3340473-20DF-4E52-9D3F-B15B328917F3}">
+      <dgm:prSet/>
+      <dgm:spPr/>
+      <dgm:t>
+        <a:bodyPr/>
+        <a:lstStyle/>
+        <a:p>
+          <a:r>
+            <a:rPr lang="en-CA" dirty="0"/>
+            <a:t>Limit test</a:t>
+          </a:r>
+          <a:endParaRPr lang="en-US" dirty="0"/>
+        </a:p>
+      </dgm:t>
+    </dgm:pt>
+    <dgm:pt modelId="{7E1E5B16-C943-4529-BDE5-C1A0BB7749DC}" type="parTrans" cxnId="{10EFE135-630E-4F77-AF43-EFBE9E1C5F59}">
+      <dgm:prSet/>
+      <dgm:spPr/>
+      <dgm:t>
+        <a:bodyPr/>
+        <a:lstStyle/>
+        <a:p>
+          <a:endParaRPr lang="en-US"/>
+        </a:p>
+      </dgm:t>
+    </dgm:pt>
+    <dgm:pt modelId="{D900D206-21BA-4D51-A1DC-52CA28B45798}" type="sibTrans" cxnId="{10EFE135-630E-4F77-AF43-EFBE9E1C5F59}">
+      <dgm:prSet/>
+      <dgm:spPr/>
+      <dgm:t>
+        <a:bodyPr/>
+        <a:lstStyle/>
+        <a:p>
+          <a:endParaRPr lang="en-US"/>
+        </a:p>
+      </dgm:t>
+    </dgm:pt>
+    <dgm:pt modelId="{CF99230F-3EDB-4747-A969-BE856B1DA29F}">
+      <dgm:prSet/>
+      <dgm:spPr/>
+      <dgm:t>
+        <a:bodyPr/>
+        <a:lstStyle/>
+        <a:p>
+          <a:r>
+            <a:rPr lang="en-CA" dirty="0"/>
+            <a:t>Uncover operational constraints</a:t>
+          </a:r>
+          <a:endParaRPr lang="en-US" dirty="0"/>
+        </a:p>
+      </dgm:t>
+    </dgm:pt>
+    <dgm:pt modelId="{E9557F10-B15E-47DE-B7B6-EE3394A82A4B}" type="parTrans" cxnId="{97E95808-F5CA-4033-BC66-865C66A5200F}">
+      <dgm:prSet/>
+      <dgm:spPr/>
+      <dgm:t>
+        <a:bodyPr/>
+        <a:lstStyle/>
+        <a:p>
+          <a:endParaRPr lang="en-US"/>
+        </a:p>
+      </dgm:t>
+    </dgm:pt>
+    <dgm:pt modelId="{F016F2C7-92CA-448D-8D43-A118436496E9}" type="sibTrans" cxnId="{97E95808-F5CA-4033-BC66-865C66A5200F}">
+      <dgm:prSet/>
+      <dgm:spPr/>
+      <dgm:t>
+        <a:bodyPr/>
+        <a:lstStyle/>
+        <a:p>
+          <a:endParaRPr lang="en-US"/>
+        </a:p>
+      </dgm:t>
+    </dgm:pt>
+    <dgm:pt modelId="{9476792A-6C99-4E59-8CC0-6547AB04CCE5}">
+      <dgm:prSet/>
+      <dgm:spPr/>
+      <dgm:t>
+        <a:bodyPr/>
+        <a:lstStyle/>
+        <a:p>
+          <a:r>
+            <a:rPr lang="en-CA"/>
+            <a:t>Manual test</a:t>
+          </a:r>
+          <a:endParaRPr lang="en-US"/>
+        </a:p>
+      </dgm:t>
+    </dgm:pt>
+    <dgm:pt modelId="{6B7B6985-DA36-401C-86A0-77387C223325}" type="parTrans" cxnId="{5ED6D2A6-834B-4F5C-891A-29614CF00A45}">
+      <dgm:prSet/>
+      <dgm:spPr/>
+      <dgm:t>
+        <a:bodyPr/>
+        <a:lstStyle/>
+        <a:p>
+          <a:endParaRPr lang="en-US"/>
+        </a:p>
+      </dgm:t>
+    </dgm:pt>
+    <dgm:pt modelId="{F0C78486-C5C7-4CD7-BF22-1965B4AB0FD7}" type="sibTrans" cxnId="{5ED6D2A6-834B-4F5C-891A-29614CF00A45}">
+      <dgm:prSet/>
+      <dgm:spPr/>
+      <dgm:t>
+        <a:bodyPr/>
+        <a:lstStyle/>
+        <a:p>
+          <a:endParaRPr lang="en-US"/>
+        </a:p>
+      </dgm:t>
+    </dgm:pt>
+    <dgm:pt modelId="{FE4AB3D0-F89D-45D5-94F0-EB8CDBD73269}">
+      <dgm:prSet/>
+      <dgm:spPr/>
+      <dgm:t>
+        <a:bodyPr/>
+        <a:lstStyle/>
+        <a:p>
+          <a:r>
+            <a:rPr lang="en-CA" dirty="0"/>
+            <a:t>Tests which are run manually</a:t>
+          </a:r>
+          <a:endParaRPr lang="en-US" dirty="0"/>
+        </a:p>
+      </dgm:t>
+    </dgm:pt>
+    <dgm:pt modelId="{90DFF887-0AB7-485C-BE78-38E271014044}" type="parTrans" cxnId="{45C0B3F8-AFF1-4E9C-AB90-BCAE89EBDA4B}">
+      <dgm:prSet/>
+      <dgm:spPr/>
+      <dgm:t>
+        <a:bodyPr/>
+        <a:lstStyle/>
+        <a:p>
+          <a:endParaRPr lang="en-US"/>
+        </a:p>
+      </dgm:t>
+    </dgm:pt>
+    <dgm:pt modelId="{38AFC936-AC5C-4666-A3D2-E58720B7952C}" type="sibTrans" cxnId="{45C0B3F8-AFF1-4E9C-AB90-BCAE89EBDA4B}">
+      <dgm:prSet/>
+      <dgm:spPr/>
+      <dgm:t>
+        <a:bodyPr/>
+        <a:lstStyle/>
+        <a:p>
+          <a:endParaRPr lang="en-US"/>
+        </a:p>
+      </dgm:t>
+    </dgm:pt>
+    <dgm:pt modelId="{BFB1A776-D330-42FE-AEF4-0FC1653E1896}">
+      <dgm:prSet/>
+      <dgm:spPr/>
+      <dgm:t>
+        <a:bodyPr/>
+        <a:lstStyle/>
+        <a:p>
+          <a:r>
+            <a:rPr lang="en-CA"/>
+            <a:t>Fuzz test</a:t>
+          </a:r>
+          <a:endParaRPr lang="en-US"/>
+        </a:p>
+      </dgm:t>
+    </dgm:pt>
+    <dgm:pt modelId="{31D6317D-D9A9-4888-B542-21BB45B2C0CA}" type="parTrans" cxnId="{DF19CEAD-D291-4873-A6E3-0A18DAE2DA6F}">
+      <dgm:prSet/>
+      <dgm:spPr/>
+      <dgm:t>
+        <a:bodyPr/>
+        <a:lstStyle/>
+        <a:p>
+          <a:endParaRPr lang="en-US"/>
+        </a:p>
+      </dgm:t>
+    </dgm:pt>
+    <dgm:pt modelId="{2812E937-4125-4E04-AA17-D68D49955CB0}" type="sibTrans" cxnId="{DF19CEAD-D291-4873-A6E3-0A18DAE2DA6F}">
+      <dgm:prSet/>
+      <dgm:spPr/>
+      <dgm:t>
+        <a:bodyPr/>
+        <a:lstStyle/>
+        <a:p>
+          <a:endParaRPr lang="en-US"/>
+        </a:p>
+      </dgm:t>
+    </dgm:pt>
+    <dgm:pt modelId="{82B88F45-75E9-4868-B880-3F2BA7E0A76C}">
+      <dgm:prSet/>
+      <dgm:spPr/>
+      <dgm:t>
+        <a:bodyPr/>
+        <a:lstStyle/>
+        <a:p>
+          <a:r>
+            <a:rPr lang="en-CA" dirty="0"/>
+            <a:t>Tested with pseudo-random data  </a:t>
+          </a:r>
+          <a:endParaRPr lang="en-US" dirty="0"/>
+        </a:p>
+      </dgm:t>
+    </dgm:pt>
+    <dgm:pt modelId="{A632DD07-7881-46D6-9D81-634498E6E818}" type="parTrans" cxnId="{1C71BAEC-4EE7-43E7-B777-E834BE4BEA3F}">
+      <dgm:prSet/>
+      <dgm:spPr/>
+      <dgm:t>
+        <a:bodyPr/>
+        <a:lstStyle/>
+        <a:p>
+          <a:endParaRPr lang="en-US"/>
+        </a:p>
+      </dgm:t>
+    </dgm:pt>
+    <dgm:pt modelId="{55BF4D7B-F1E6-47B6-94E2-F282A36E817D}" type="sibTrans" cxnId="{1C71BAEC-4EE7-43E7-B777-E834BE4BEA3F}">
+      <dgm:prSet/>
+      <dgm:spPr/>
+      <dgm:t>
+        <a:bodyPr/>
+        <a:lstStyle/>
+        <a:p>
+          <a:endParaRPr lang="en-US"/>
+        </a:p>
+      </dgm:t>
+    </dgm:pt>
+    <dgm:pt modelId="{5164F023-5400-4567-9CE5-10536BED9D3C}">
+      <dgm:prSet/>
+      <dgm:spPr/>
+      <dgm:t>
+        <a:bodyPr/>
+        <a:lstStyle/>
+        <a:p>
+          <a:r>
+            <a:rPr lang="en-CA"/>
+            <a:t>Regression test</a:t>
+          </a:r>
+          <a:endParaRPr lang="en-US"/>
+        </a:p>
+      </dgm:t>
+    </dgm:pt>
+    <dgm:pt modelId="{5532CAA4-F47C-489A-9A97-435244B10F92}" type="parTrans" cxnId="{C9BAEE99-57F3-4704-B8E5-D7C99FBCCA78}">
+      <dgm:prSet/>
+      <dgm:spPr/>
+      <dgm:t>
+        <a:bodyPr/>
+        <a:lstStyle/>
+        <a:p>
+          <a:endParaRPr lang="en-US"/>
+        </a:p>
+      </dgm:t>
+    </dgm:pt>
+    <dgm:pt modelId="{3D8629CD-5492-4621-93D8-EA20673D9169}" type="sibTrans" cxnId="{C9BAEE99-57F3-4704-B8E5-D7C99FBCCA78}">
+      <dgm:prSet/>
+      <dgm:spPr/>
+      <dgm:t>
+        <a:bodyPr/>
+        <a:lstStyle/>
+        <a:p>
+          <a:endParaRPr lang="en-US"/>
+        </a:p>
+      </dgm:t>
+    </dgm:pt>
+    <dgm:pt modelId="{FA114AB5-09C6-4DD9-9B4E-BA24F2C389AC}">
+      <dgm:prSet/>
+      <dgm:spPr/>
+      <dgm:t>
+        <a:bodyPr/>
+        <a:lstStyle/>
+        <a:p>
+          <a:r>
+            <a:rPr lang="en-CA"/>
+            <a:t>Assure that fixed bugs don’t reoccur </a:t>
+          </a:r>
+          <a:endParaRPr lang="en-US"/>
+        </a:p>
+      </dgm:t>
+    </dgm:pt>
+    <dgm:pt modelId="{AB2E959D-CCAF-4037-B6AE-EC8D3A587173}" type="parTrans" cxnId="{74D3BF29-F63D-4F2D-B3A4-7F42613C0D3D}">
+      <dgm:prSet/>
+      <dgm:spPr/>
+      <dgm:t>
+        <a:bodyPr/>
+        <a:lstStyle/>
+        <a:p>
+          <a:endParaRPr lang="en-US"/>
+        </a:p>
+      </dgm:t>
+    </dgm:pt>
+    <dgm:pt modelId="{97C44B00-FC02-4DE4-A056-186B0BB71D32}" type="sibTrans" cxnId="{74D3BF29-F63D-4F2D-B3A4-7F42613C0D3D}">
+      <dgm:prSet/>
+      <dgm:spPr/>
+      <dgm:t>
+        <a:bodyPr/>
+        <a:lstStyle/>
+        <a:p>
+          <a:endParaRPr lang="en-US"/>
+        </a:p>
+      </dgm:t>
+    </dgm:pt>
+    <dgm:pt modelId="{E90A488C-0EE9-4B38-8A54-563090D4BA04}">
+      <dgm:prSet/>
+      <dgm:spPr/>
+      <dgm:t>
+        <a:bodyPr/>
+        <a:lstStyle/>
+        <a:p>
+          <a:r>
+            <a:rPr lang="en-CA"/>
+            <a:t>Integration test</a:t>
+          </a:r>
+          <a:endParaRPr lang="en-US"/>
+        </a:p>
+      </dgm:t>
+    </dgm:pt>
+    <dgm:pt modelId="{B603F1D7-5367-4C9E-9C60-30DCAC2AC6FA}" type="parTrans" cxnId="{3208F742-B1C1-4E67-BC9F-D0BC9C8CC8BC}">
+      <dgm:prSet/>
+      <dgm:spPr/>
+      <dgm:t>
+        <a:bodyPr/>
+        <a:lstStyle/>
+        <a:p>
+          <a:endParaRPr lang="en-US"/>
+        </a:p>
+      </dgm:t>
+    </dgm:pt>
+    <dgm:pt modelId="{485D9FD2-9C38-4328-8430-68AB423BB8D5}" type="sibTrans" cxnId="{3208F742-B1C1-4E67-BC9F-D0BC9C8CC8BC}">
+      <dgm:prSet/>
+      <dgm:spPr/>
+      <dgm:t>
+        <a:bodyPr/>
+        <a:lstStyle/>
+        <a:p>
+          <a:endParaRPr lang="en-US"/>
+        </a:p>
+      </dgm:t>
+    </dgm:pt>
+    <dgm:pt modelId="{A9398EAF-18BD-4514-9650-8C85D53F9B31}">
+      <dgm:prSet/>
+      <dgm:spPr/>
+      <dgm:t>
+        <a:bodyPr/>
+        <a:lstStyle/>
+        <a:p>
+          <a:r>
+            <a:rPr lang="en-CA" dirty="0"/>
+            <a:t>Does the algorithm work in conjunction with other components </a:t>
+          </a:r>
+          <a:endParaRPr lang="en-US" dirty="0"/>
+        </a:p>
+      </dgm:t>
+    </dgm:pt>
+    <dgm:pt modelId="{2E7AEB7B-A6D8-4CAD-843E-FCBF94E81CED}" type="parTrans" cxnId="{AC9E210E-19C8-4A37-9EA2-6A287E72FE76}">
+      <dgm:prSet/>
+      <dgm:spPr/>
+      <dgm:t>
+        <a:bodyPr/>
+        <a:lstStyle/>
+        <a:p>
+          <a:endParaRPr lang="en-US"/>
+        </a:p>
+      </dgm:t>
+    </dgm:pt>
+    <dgm:pt modelId="{057F0445-68CB-455E-AB9C-85938553E637}" type="sibTrans" cxnId="{AC9E210E-19C8-4A37-9EA2-6A287E72FE76}">
+      <dgm:prSet/>
+      <dgm:spPr/>
+      <dgm:t>
+        <a:bodyPr/>
+        <a:lstStyle/>
+        <a:p>
+          <a:endParaRPr lang="en-US"/>
+        </a:p>
+      </dgm:t>
+    </dgm:pt>
+    <dgm:pt modelId="{EE706590-D6E5-470A-80EA-B2F859940438}" type="pres">
+      <dgm:prSet presAssocID="{1C26C817-B3BB-4D6C-8907-EA466F27B5F0}" presName="diagram" presStyleCnt="0">
+        <dgm:presLayoutVars>
+          <dgm:dir/>
+          <dgm:resizeHandles val="exact"/>
+        </dgm:presLayoutVars>
+      </dgm:prSet>
+      <dgm:spPr/>
+    </dgm:pt>
+    <dgm:pt modelId="{A6F140DD-4174-4F7A-86B4-43E137BF653D}" type="pres">
+      <dgm:prSet presAssocID="{96FF5E58-5217-4B84-8C6E-5AC3AC7C5E06}" presName="node" presStyleLbl="node1" presStyleIdx="0" presStyleCnt="9">
+        <dgm:presLayoutVars>
+          <dgm:bulletEnabled val="1"/>
+        </dgm:presLayoutVars>
+      </dgm:prSet>
+      <dgm:spPr/>
+    </dgm:pt>
+    <dgm:pt modelId="{53819D93-70B6-483B-BDD5-2EEBF034DEC5}" type="pres">
+      <dgm:prSet presAssocID="{F5EAB60A-CBF6-4308-AF04-E6B870C8C0D3}" presName="sibTrans" presStyleCnt="0"/>
+      <dgm:spPr/>
+    </dgm:pt>
+    <dgm:pt modelId="{018383BF-CCA6-4235-997C-C52F600CDFCF}" type="pres">
+      <dgm:prSet presAssocID="{D0A690C7-CB42-4A8C-BFA9-1A5CEF66D437}" presName="node" presStyleLbl="node1" presStyleIdx="1" presStyleCnt="9">
+        <dgm:presLayoutVars>
+          <dgm:bulletEnabled val="1"/>
+        </dgm:presLayoutVars>
+      </dgm:prSet>
+      <dgm:spPr/>
+    </dgm:pt>
+    <dgm:pt modelId="{0E36D517-BAD6-4FC2-A802-020A7C2F0CEA}" type="pres">
+      <dgm:prSet presAssocID="{DC4D009E-D4C1-4B03-8B3B-D4DE5DDE1B82}" presName="sibTrans" presStyleCnt="0"/>
+      <dgm:spPr/>
+    </dgm:pt>
+    <dgm:pt modelId="{AD1D34A5-D0D3-4072-9E48-F7D497C54684}" type="pres">
+      <dgm:prSet presAssocID="{0E6EA64B-1647-49BC-9874-78A2D9B88ED6}" presName="node" presStyleLbl="node1" presStyleIdx="2" presStyleCnt="9">
+        <dgm:presLayoutVars>
+          <dgm:bulletEnabled val="1"/>
+        </dgm:presLayoutVars>
+      </dgm:prSet>
+      <dgm:spPr/>
+    </dgm:pt>
+    <dgm:pt modelId="{76E0239C-6656-4A6C-AC82-96C2924CB0FD}" type="pres">
+      <dgm:prSet presAssocID="{CC19225D-9EEF-4AF6-91A8-881E5A2C1C8D}" presName="sibTrans" presStyleCnt="0"/>
+      <dgm:spPr/>
+    </dgm:pt>
+    <dgm:pt modelId="{05FF81F0-3BE4-48A4-BD2B-EADAA16DE231}" type="pres">
+      <dgm:prSet presAssocID="{08F0411E-BA7B-409B-B37F-F903E2F0A164}" presName="node" presStyleLbl="node1" presStyleIdx="3" presStyleCnt="9">
+        <dgm:presLayoutVars>
+          <dgm:bulletEnabled val="1"/>
+        </dgm:presLayoutVars>
+      </dgm:prSet>
+      <dgm:spPr/>
+    </dgm:pt>
+    <dgm:pt modelId="{BE32944A-C740-4A99-8A4B-02FFA4A8E458}" type="pres">
+      <dgm:prSet presAssocID="{3D2DF141-B701-46F8-B58A-DFBC5132829C}" presName="sibTrans" presStyleCnt="0"/>
+      <dgm:spPr/>
+    </dgm:pt>
+    <dgm:pt modelId="{C3052744-8E65-407D-854A-6EACAA21F16A}" type="pres">
+      <dgm:prSet presAssocID="{F3340473-20DF-4E52-9D3F-B15B328917F3}" presName="node" presStyleLbl="node1" presStyleIdx="4" presStyleCnt="9">
+        <dgm:presLayoutVars>
+          <dgm:bulletEnabled val="1"/>
+        </dgm:presLayoutVars>
+      </dgm:prSet>
+      <dgm:spPr/>
+    </dgm:pt>
+    <dgm:pt modelId="{AA5C4A19-E57F-4BE8-A6BF-1AC8C39A9424}" type="pres">
+      <dgm:prSet presAssocID="{D900D206-21BA-4D51-A1DC-52CA28B45798}" presName="sibTrans" presStyleCnt="0"/>
+      <dgm:spPr/>
+    </dgm:pt>
+    <dgm:pt modelId="{3B0BA690-D6A8-4B81-B052-692E82A300C8}" type="pres">
+      <dgm:prSet presAssocID="{9476792A-6C99-4E59-8CC0-6547AB04CCE5}" presName="node" presStyleLbl="node1" presStyleIdx="5" presStyleCnt="9">
+        <dgm:presLayoutVars>
+          <dgm:bulletEnabled val="1"/>
+        </dgm:presLayoutVars>
+      </dgm:prSet>
+      <dgm:spPr/>
+    </dgm:pt>
+    <dgm:pt modelId="{2B733967-6D26-49C3-9D39-EB37CC72386E}" type="pres">
+      <dgm:prSet presAssocID="{F0C78486-C5C7-4CD7-BF22-1965B4AB0FD7}" presName="sibTrans" presStyleCnt="0"/>
+      <dgm:spPr/>
+    </dgm:pt>
+    <dgm:pt modelId="{C982EA68-4CFC-4351-A07C-34C7B240BAB0}" type="pres">
+      <dgm:prSet presAssocID="{BFB1A776-D330-42FE-AEF4-0FC1653E1896}" presName="node" presStyleLbl="node1" presStyleIdx="6" presStyleCnt="9">
+        <dgm:presLayoutVars>
+          <dgm:bulletEnabled val="1"/>
+        </dgm:presLayoutVars>
+      </dgm:prSet>
+      <dgm:spPr/>
+    </dgm:pt>
+    <dgm:pt modelId="{93A3305B-BB79-49BF-A20D-8D9F690FC279}" type="pres">
+      <dgm:prSet presAssocID="{2812E937-4125-4E04-AA17-D68D49955CB0}" presName="sibTrans" presStyleCnt="0"/>
+      <dgm:spPr/>
+    </dgm:pt>
+    <dgm:pt modelId="{32F329C4-C543-4E14-A79A-DB319D7F1035}" type="pres">
+      <dgm:prSet presAssocID="{5164F023-5400-4567-9CE5-10536BED9D3C}" presName="node" presStyleLbl="node1" presStyleIdx="7" presStyleCnt="9">
+        <dgm:presLayoutVars>
+          <dgm:bulletEnabled val="1"/>
+        </dgm:presLayoutVars>
+      </dgm:prSet>
+      <dgm:spPr/>
+    </dgm:pt>
+    <dgm:pt modelId="{2F0739AF-86B8-426D-8327-9F3C0126BE52}" type="pres">
+      <dgm:prSet presAssocID="{3D8629CD-5492-4621-93D8-EA20673D9169}" presName="sibTrans" presStyleCnt="0"/>
+      <dgm:spPr/>
+    </dgm:pt>
+    <dgm:pt modelId="{C7F32B15-9643-4A54-A152-85BA7CC43AB4}" type="pres">
+      <dgm:prSet presAssocID="{E90A488C-0EE9-4B38-8A54-563090D4BA04}" presName="node" presStyleLbl="node1" presStyleIdx="8" presStyleCnt="9">
+        <dgm:presLayoutVars>
+          <dgm:bulletEnabled val="1"/>
+        </dgm:presLayoutVars>
+      </dgm:prSet>
+      <dgm:spPr/>
+    </dgm:pt>
+  </dgm:ptLst>
+  <dgm:cxnLst>
+    <dgm:cxn modelId="{038A7508-D249-4B83-A346-62A9B3E92687}" type="presOf" srcId="{CF99230F-3EDB-4747-A969-BE856B1DA29F}" destId="{C3052744-8E65-407D-854A-6EACAA21F16A}" srcOrd="0" destOrd="1" presId="urn:microsoft.com/office/officeart/2005/8/layout/default"/>
+    <dgm:cxn modelId="{97E95808-F5CA-4033-BC66-865C66A5200F}" srcId="{F3340473-20DF-4E52-9D3F-B15B328917F3}" destId="{CF99230F-3EDB-4747-A969-BE856B1DA29F}" srcOrd="0" destOrd="0" parTransId="{E9557F10-B15E-47DE-B7B6-EE3394A82A4B}" sibTransId="{F016F2C7-92CA-448D-8D43-A118436496E9}"/>
+    <dgm:cxn modelId="{AC9E210E-19C8-4A37-9EA2-6A287E72FE76}" srcId="{E90A488C-0EE9-4B38-8A54-563090D4BA04}" destId="{A9398EAF-18BD-4514-9650-8C85D53F9B31}" srcOrd="0" destOrd="0" parTransId="{2E7AEB7B-A6D8-4CAD-843E-FCBF94E81CED}" sibTransId="{057F0445-68CB-455E-AB9C-85938553E637}"/>
+    <dgm:cxn modelId="{D4315316-5FE8-4204-9649-83B8D7EE8D24}" type="presOf" srcId="{FA114AB5-09C6-4DD9-9B4E-BA24F2C389AC}" destId="{32F329C4-C543-4E14-A79A-DB319D7F1035}" srcOrd="0" destOrd="1" presId="urn:microsoft.com/office/officeart/2005/8/layout/default"/>
+    <dgm:cxn modelId="{66C7F619-F8C0-4582-A787-4F9BD617D076}" srcId="{1C26C817-B3BB-4D6C-8907-EA466F27B5F0}" destId="{08F0411E-BA7B-409B-B37F-F903E2F0A164}" srcOrd="3" destOrd="0" parTransId="{65C5E997-0A4D-46BC-834B-5A40435FCF7C}" sibTransId="{3D2DF141-B701-46F8-B58A-DFBC5132829C}"/>
+    <dgm:cxn modelId="{4168311D-8E8E-4B25-B83E-B8AC9A8CF0AF}" type="presOf" srcId="{E90A488C-0EE9-4B38-8A54-563090D4BA04}" destId="{C7F32B15-9643-4A54-A152-85BA7CC43AB4}" srcOrd="0" destOrd="0" presId="urn:microsoft.com/office/officeart/2005/8/layout/default"/>
+    <dgm:cxn modelId="{788F3820-50F2-4F3A-826A-B7327D15B149}" type="presOf" srcId="{5F1472ED-C5FF-4B4B-A315-11E4111322E0}" destId="{A6F140DD-4174-4F7A-86B4-43E137BF653D}" srcOrd="0" destOrd="1" presId="urn:microsoft.com/office/officeart/2005/8/layout/default"/>
+    <dgm:cxn modelId="{74D3BF29-F63D-4F2D-B3A4-7F42613C0D3D}" srcId="{5164F023-5400-4567-9CE5-10536BED9D3C}" destId="{FA114AB5-09C6-4DD9-9B4E-BA24F2C389AC}" srcOrd="0" destOrd="0" parTransId="{AB2E959D-CCAF-4037-B6AE-EC8D3A587173}" sibTransId="{97C44B00-FC02-4DE4-A056-186B0BB71D32}"/>
+    <dgm:cxn modelId="{C221F32E-17DF-44C9-952B-410B54569504}" type="presOf" srcId="{5164F023-5400-4567-9CE5-10536BED9D3C}" destId="{32F329C4-C543-4E14-A79A-DB319D7F1035}" srcOrd="0" destOrd="0" presId="urn:microsoft.com/office/officeart/2005/8/layout/default"/>
+    <dgm:cxn modelId="{10EFE135-630E-4F77-AF43-EFBE9E1C5F59}" srcId="{1C26C817-B3BB-4D6C-8907-EA466F27B5F0}" destId="{F3340473-20DF-4E52-9D3F-B15B328917F3}" srcOrd="4" destOrd="0" parTransId="{7E1E5B16-C943-4529-BDE5-C1A0BB7749DC}" sibTransId="{D900D206-21BA-4D51-A1DC-52CA28B45798}"/>
+    <dgm:cxn modelId="{E4BAC639-A7BC-48FA-90F6-B5AFA701F23E}" srcId="{1C26C817-B3BB-4D6C-8907-EA466F27B5F0}" destId="{D0A690C7-CB42-4A8C-BFA9-1A5CEF66D437}" srcOrd="1" destOrd="0" parTransId="{2D2E188C-32B2-42A1-BDA8-E56F044A5572}" sibTransId="{DC4D009E-D4C1-4B03-8B3B-D4DE5DDE1B82}"/>
+    <dgm:cxn modelId="{AB3FBC5B-7B49-4E9A-B1EC-4F9891F7B133}" type="presOf" srcId="{BFB1A776-D330-42FE-AEF4-0FC1653E1896}" destId="{C982EA68-4CFC-4351-A07C-34C7B240BAB0}" srcOrd="0" destOrd="0" presId="urn:microsoft.com/office/officeart/2005/8/layout/default"/>
+    <dgm:cxn modelId="{3208F742-B1C1-4E67-BC9F-D0BC9C8CC8BC}" srcId="{1C26C817-B3BB-4D6C-8907-EA466F27B5F0}" destId="{E90A488C-0EE9-4B38-8A54-563090D4BA04}" srcOrd="8" destOrd="0" parTransId="{B603F1D7-5367-4C9E-9C60-30DCAC2AC6FA}" sibTransId="{485D9FD2-9C38-4328-8430-68AB423BB8D5}"/>
+    <dgm:cxn modelId="{B0B1A963-82DE-4EB6-9D90-B78DCC2C549C}" type="presOf" srcId="{08F0411E-BA7B-409B-B37F-F903E2F0A164}" destId="{05FF81F0-3BE4-48A4-BD2B-EADAA16DE231}" srcOrd="0" destOrd="0" presId="urn:microsoft.com/office/officeart/2005/8/layout/default"/>
+    <dgm:cxn modelId="{F5803448-0ECE-429D-A3BC-820FD81CA5D5}" type="presOf" srcId="{6D01C3FA-1E54-44A5-8564-1A65A816D47A}" destId="{018383BF-CCA6-4235-997C-C52F600CDFCF}" srcOrd="0" destOrd="1" presId="urn:microsoft.com/office/officeart/2005/8/layout/default"/>
+    <dgm:cxn modelId="{1F80226D-59E4-4EC4-B97A-73F008F23B1D}" srcId="{0E6EA64B-1647-49BC-9874-78A2D9B88ED6}" destId="{F911D231-12A4-4D34-AC44-2365329CDB0A}" srcOrd="0" destOrd="0" parTransId="{AF29ED3D-F99C-479A-9942-55724A157D7B}" sibTransId="{9196B4FC-BCBD-4F92-AB0A-0451914C7CB0}"/>
+    <dgm:cxn modelId="{5856CA4E-BAE8-48B6-939C-874668EAC79E}" srcId="{96FF5E58-5217-4B84-8C6E-5AC3AC7C5E06}" destId="{5F1472ED-C5FF-4B4B-A315-11E4111322E0}" srcOrd="0" destOrd="0" parTransId="{FE1B877D-89C0-4531-B73D-D977ACE5C33D}" sibTransId="{5D713612-5265-4C4D-B1DF-1875B191382A}"/>
+    <dgm:cxn modelId="{36F51673-AC30-4B56-9B97-BA338B78158C}" srcId="{1C26C817-B3BB-4D6C-8907-EA466F27B5F0}" destId="{96FF5E58-5217-4B84-8C6E-5AC3AC7C5E06}" srcOrd="0" destOrd="0" parTransId="{34BCA199-29ED-4CA6-B605-231DA2536C22}" sibTransId="{F5EAB60A-CBF6-4308-AF04-E6B870C8C0D3}"/>
+    <dgm:cxn modelId="{CDFAE556-C45C-41DC-BBD2-BC55109393C3}" type="presOf" srcId="{1C26C817-B3BB-4D6C-8907-EA466F27B5F0}" destId="{EE706590-D6E5-470A-80EA-B2F859940438}" srcOrd="0" destOrd="0" presId="urn:microsoft.com/office/officeart/2005/8/layout/default"/>
+    <dgm:cxn modelId="{9DD52357-D1E3-4352-B509-448DFC7B905B}" type="presOf" srcId="{0E6EA64B-1647-49BC-9874-78A2D9B88ED6}" destId="{AD1D34A5-D0D3-4072-9E48-F7D497C54684}" srcOrd="0" destOrd="0" presId="urn:microsoft.com/office/officeart/2005/8/layout/default"/>
+    <dgm:cxn modelId="{264C5297-0824-4912-B5BF-3A9A40D98B5C}" srcId="{1C26C817-B3BB-4D6C-8907-EA466F27B5F0}" destId="{0E6EA64B-1647-49BC-9874-78A2D9B88ED6}" srcOrd="2" destOrd="0" parTransId="{8854BB9C-0F7A-4939-90C6-5FABF85352C5}" sibTransId="{CC19225D-9EEF-4AF6-91A8-881E5A2C1C8D}"/>
+    <dgm:cxn modelId="{C9BAEE99-57F3-4704-B8E5-D7C99FBCCA78}" srcId="{1C26C817-B3BB-4D6C-8907-EA466F27B5F0}" destId="{5164F023-5400-4567-9CE5-10536BED9D3C}" srcOrd="7" destOrd="0" parTransId="{5532CAA4-F47C-489A-9A97-435244B10F92}" sibTransId="{3D8629CD-5492-4621-93D8-EA20673D9169}"/>
+    <dgm:cxn modelId="{1B708B9C-F5BC-4AD8-AFE3-C6BB8B0B9CC5}" type="presOf" srcId="{81C4566B-2190-426D-B9BF-E2B588F52183}" destId="{05FF81F0-3BE4-48A4-BD2B-EADAA16DE231}" srcOrd="0" destOrd="1" presId="urn:microsoft.com/office/officeart/2005/8/layout/default"/>
+    <dgm:cxn modelId="{5ED6D2A6-834B-4F5C-891A-29614CF00A45}" srcId="{1C26C817-B3BB-4D6C-8907-EA466F27B5F0}" destId="{9476792A-6C99-4E59-8CC0-6547AB04CCE5}" srcOrd="5" destOrd="0" parTransId="{6B7B6985-DA36-401C-86A0-77387C223325}" sibTransId="{F0C78486-C5C7-4CD7-BF22-1965B4AB0FD7}"/>
+    <dgm:cxn modelId="{9A5393A7-C7E8-48B6-8175-9743065B8734}" type="presOf" srcId="{F911D231-12A4-4D34-AC44-2365329CDB0A}" destId="{AD1D34A5-D0D3-4072-9E48-F7D497C54684}" srcOrd="0" destOrd="1" presId="urn:microsoft.com/office/officeart/2005/8/layout/default"/>
+    <dgm:cxn modelId="{DF19CEAD-D291-4873-A6E3-0A18DAE2DA6F}" srcId="{1C26C817-B3BB-4D6C-8907-EA466F27B5F0}" destId="{BFB1A776-D330-42FE-AEF4-0FC1653E1896}" srcOrd="6" destOrd="0" parTransId="{31D6317D-D9A9-4888-B542-21BB45B2C0CA}" sibTransId="{2812E937-4125-4E04-AA17-D68D49955CB0}"/>
+    <dgm:cxn modelId="{5E566CAE-93F4-4B70-9F13-17259611D1C3}" type="presOf" srcId="{96FF5E58-5217-4B84-8C6E-5AC3AC7C5E06}" destId="{A6F140DD-4174-4F7A-86B4-43E137BF653D}" srcOrd="0" destOrd="0" presId="urn:microsoft.com/office/officeart/2005/8/layout/default"/>
+    <dgm:cxn modelId="{D259A0BC-A2B7-4256-9C8F-F6ED815995CD}" type="presOf" srcId="{D0A690C7-CB42-4A8C-BFA9-1A5CEF66D437}" destId="{018383BF-CCA6-4235-997C-C52F600CDFCF}" srcOrd="0" destOrd="0" presId="urn:microsoft.com/office/officeart/2005/8/layout/default"/>
+    <dgm:cxn modelId="{F43D1CD0-3781-416A-BF52-3EF6E7D05C1C}" type="presOf" srcId="{F3340473-20DF-4E52-9D3F-B15B328917F3}" destId="{C3052744-8E65-407D-854A-6EACAA21F16A}" srcOrd="0" destOrd="0" presId="urn:microsoft.com/office/officeart/2005/8/layout/default"/>
+    <dgm:cxn modelId="{B1039FD8-527B-465C-8FE6-3DC681816C24}" srcId="{08F0411E-BA7B-409B-B37F-F903E2F0A164}" destId="{81C4566B-2190-426D-B9BF-E2B588F52183}" srcOrd="0" destOrd="0" parTransId="{685BB180-9962-41A6-8A6B-96DE8BE33E82}" sibTransId="{AE4E7192-9404-41DC-8A83-5B5C3595E736}"/>
+    <dgm:cxn modelId="{BBEBB6DA-0F1C-4FC0-956B-49824B0FBB6B}" type="presOf" srcId="{A9398EAF-18BD-4514-9650-8C85D53F9B31}" destId="{C7F32B15-9643-4A54-A152-85BA7CC43AB4}" srcOrd="0" destOrd="1" presId="urn:microsoft.com/office/officeart/2005/8/layout/default"/>
+    <dgm:cxn modelId="{4ABFEEDD-8686-4E4E-899B-370FD7353300}" type="presOf" srcId="{9476792A-6C99-4E59-8CC0-6547AB04CCE5}" destId="{3B0BA690-D6A8-4B81-B052-692E82A300C8}" srcOrd="0" destOrd="0" presId="urn:microsoft.com/office/officeart/2005/8/layout/default"/>
+    <dgm:cxn modelId="{1C71BAEC-4EE7-43E7-B777-E834BE4BEA3F}" srcId="{BFB1A776-D330-42FE-AEF4-0FC1653E1896}" destId="{82B88F45-75E9-4868-B880-3F2BA7E0A76C}" srcOrd="0" destOrd="0" parTransId="{A632DD07-7881-46D6-9D81-634498E6E818}" sibTransId="{55BF4D7B-F1E6-47B6-94E2-F282A36E817D}"/>
+    <dgm:cxn modelId="{B441A0EE-D386-4D91-B178-64FE04802676}" type="presOf" srcId="{82B88F45-75E9-4868-B880-3F2BA7E0A76C}" destId="{C982EA68-4CFC-4351-A07C-34C7B240BAB0}" srcOrd="0" destOrd="1" presId="urn:microsoft.com/office/officeart/2005/8/layout/default"/>
+    <dgm:cxn modelId="{45C0B3F8-AFF1-4E9C-AB90-BCAE89EBDA4B}" srcId="{9476792A-6C99-4E59-8CC0-6547AB04CCE5}" destId="{FE4AB3D0-F89D-45D5-94F0-EB8CDBD73269}" srcOrd="0" destOrd="0" parTransId="{90DFF887-0AB7-485C-BE78-38E271014044}" sibTransId="{38AFC936-AC5C-4666-A3D2-E58720B7952C}"/>
+    <dgm:cxn modelId="{8E04A8FB-CADD-4F1B-963F-B01D370F3A08}" srcId="{D0A690C7-CB42-4A8C-BFA9-1A5CEF66D437}" destId="{6D01C3FA-1E54-44A5-8564-1A65A816D47A}" srcOrd="0" destOrd="0" parTransId="{306F263C-AEC9-4DF8-8C1A-716CF0ABCE30}" sibTransId="{2A947A13-8CB9-4144-A6C7-665E60EEA0E7}"/>
+    <dgm:cxn modelId="{9A24F0FF-1562-46DA-A41C-48C27E02585E}" type="presOf" srcId="{FE4AB3D0-F89D-45D5-94F0-EB8CDBD73269}" destId="{3B0BA690-D6A8-4B81-B052-692E82A300C8}" srcOrd="0" destOrd="1" presId="urn:microsoft.com/office/officeart/2005/8/layout/default"/>
+    <dgm:cxn modelId="{CC9D0911-66FA-4985-A07C-9BD4F2412B03}" type="presParOf" srcId="{EE706590-D6E5-470A-80EA-B2F859940438}" destId="{A6F140DD-4174-4F7A-86B4-43E137BF653D}" srcOrd="0" destOrd="0" presId="urn:microsoft.com/office/officeart/2005/8/layout/default"/>
+    <dgm:cxn modelId="{C31755E3-6129-49B9-8B51-6222CB73DC71}" type="presParOf" srcId="{EE706590-D6E5-470A-80EA-B2F859940438}" destId="{53819D93-70B6-483B-BDD5-2EEBF034DEC5}" srcOrd="1" destOrd="0" presId="urn:microsoft.com/office/officeart/2005/8/layout/default"/>
+    <dgm:cxn modelId="{A52BDAC9-9596-4B94-9037-EA3EDA480A61}" type="presParOf" srcId="{EE706590-D6E5-470A-80EA-B2F859940438}" destId="{018383BF-CCA6-4235-997C-C52F600CDFCF}" srcOrd="2" destOrd="0" presId="urn:microsoft.com/office/officeart/2005/8/layout/default"/>
+    <dgm:cxn modelId="{5CA1A715-2625-4196-B8A1-4B6462DEF0F7}" type="presParOf" srcId="{EE706590-D6E5-470A-80EA-B2F859940438}" destId="{0E36D517-BAD6-4FC2-A802-020A7C2F0CEA}" srcOrd="3" destOrd="0" presId="urn:microsoft.com/office/officeart/2005/8/layout/default"/>
+    <dgm:cxn modelId="{A871CC67-5451-4481-93CF-616B9E07AD98}" type="presParOf" srcId="{EE706590-D6E5-470A-80EA-B2F859940438}" destId="{AD1D34A5-D0D3-4072-9E48-F7D497C54684}" srcOrd="4" destOrd="0" presId="urn:microsoft.com/office/officeart/2005/8/layout/default"/>
+    <dgm:cxn modelId="{CDBD5AB0-9AD3-4E98-9CF2-BF201DB044BB}" type="presParOf" srcId="{EE706590-D6E5-470A-80EA-B2F859940438}" destId="{76E0239C-6656-4A6C-AC82-96C2924CB0FD}" srcOrd="5" destOrd="0" presId="urn:microsoft.com/office/officeart/2005/8/layout/default"/>
+    <dgm:cxn modelId="{27D65590-367B-42DF-8E05-1BCD3BD4578B}" type="presParOf" srcId="{EE706590-D6E5-470A-80EA-B2F859940438}" destId="{05FF81F0-3BE4-48A4-BD2B-EADAA16DE231}" srcOrd="6" destOrd="0" presId="urn:microsoft.com/office/officeart/2005/8/layout/default"/>
+    <dgm:cxn modelId="{BDC99BA9-0A60-4AB2-93AC-F4C04B0DF07A}" type="presParOf" srcId="{EE706590-D6E5-470A-80EA-B2F859940438}" destId="{BE32944A-C740-4A99-8A4B-02FFA4A8E458}" srcOrd="7" destOrd="0" presId="urn:microsoft.com/office/officeart/2005/8/layout/default"/>
+    <dgm:cxn modelId="{5D7CA3ED-8FD9-44BC-9D8E-702DED365BB6}" type="presParOf" srcId="{EE706590-D6E5-470A-80EA-B2F859940438}" destId="{C3052744-8E65-407D-854A-6EACAA21F16A}" srcOrd="8" destOrd="0" presId="urn:microsoft.com/office/officeart/2005/8/layout/default"/>
+    <dgm:cxn modelId="{810AEDEC-D97A-4D3B-AF49-C7366C860053}" type="presParOf" srcId="{EE706590-D6E5-470A-80EA-B2F859940438}" destId="{AA5C4A19-E57F-4BE8-A6BF-1AC8C39A9424}" srcOrd="9" destOrd="0" presId="urn:microsoft.com/office/officeart/2005/8/layout/default"/>
+    <dgm:cxn modelId="{FA39F8B4-7D7D-4F45-88A2-8236C18ED013}" type="presParOf" srcId="{EE706590-D6E5-470A-80EA-B2F859940438}" destId="{3B0BA690-D6A8-4B81-B052-692E82A300C8}" srcOrd="10" destOrd="0" presId="urn:microsoft.com/office/officeart/2005/8/layout/default"/>
+    <dgm:cxn modelId="{9ED521BB-E8CD-4228-9914-1182E359FE55}" type="presParOf" srcId="{EE706590-D6E5-470A-80EA-B2F859940438}" destId="{2B733967-6D26-49C3-9D39-EB37CC72386E}" srcOrd="11" destOrd="0" presId="urn:microsoft.com/office/officeart/2005/8/layout/default"/>
+    <dgm:cxn modelId="{F75CB8BC-F74C-4F23-8518-233B0DBA7B30}" type="presParOf" srcId="{EE706590-D6E5-470A-80EA-B2F859940438}" destId="{C982EA68-4CFC-4351-A07C-34C7B240BAB0}" srcOrd="12" destOrd="0" presId="urn:microsoft.com/office/officeart/2005/8/layout/default"/>
+    <dgm:cxn modelId="{8585AAF0-0AC0-4761-9F14-6F5AA2EB27D8}" type="presParOf" srcId="{EE706590-D6E5-470A-80EA-B2F859940438}" destId="{93A3305B-BB79-49BF-A20D-8D9F690FC279}" srcOrd="13" destOrd="0" presId="urn:microsoft.com/office/officeart/2005/8/layout/default"/>
+    <dgm:cxn modelId="{828BA48F-4498-434E-BE51-D7CDFB298A30}" type="presParOf" srcId="{EE706590-D6E5-470A-80EA-B2F859940438}" destId="{32F329C4-C543-4E14-A79A-DB319D7F1035}" srcOrd="14" destOrd="0" presId="urn:microsoft.com/office/officeart/2005/8/layout/default"/>
+    <dgm:cxn modelId="{00A92592-851E-4240-83C5-20BAA2691A5B}" type="presParOf" srcId="{EE706590-D6E5-470A-80EA-B2F859940438}" destId="{2F0739AF-86B8-426D-8327-9F3C0126BE52}" srcOrd="15" destOrd="0" presId="urn:microsoft.com/office/officeart/2005/8/layout/default"/>
+    <dgm:cxn modelId="{0BF26253-C593-43A4-8766-24412A58BA5B}" type="presParOf" srcId="{EE706590-D6E5-470A-80EA-B2F859940438}" destId="{C7F32B15-9643-4A54-A152-85BA7CC43AB4}" srcOrd="16" destOrd="0" presId="urn:microsoft.com/office/officeart/2005/8/layout/default"/>
   </dgm:cxnLst>
   <dgm:bg/>
   <dgm:whole/>
@@ -7712,6 +9404,891 @@
 </dsp:drawing>
 </file>
 
+<file path=ppt/diagrams/drawing7.xml><?xml version="1.0" encoding="utf-8"?>
+<dsp:drawing xmlns:dgm="http://schemas.openxmlformats.org/drawingml/2006/diagram" xmlns:dsp="http://schemas.microsoft.com/office/drawing/2008/diagram" xmlns:a="http://schemas.openxmlformats.org/drawingml/2006/main">
+  <dsp:spTree>
+    <dsp:nvGrpSpPr>
+      <dsp:cNvPr id="0" name=""/>
+      <dsp:cNvGrpSpPr/>
+    </dsp:nvGrpSpPr>
+    <dsp:grpSpPr/>
+    <dsp:sp modelId="{A6F140DD-4174-4F7A-86B4-43E137BF653D}">
+      <dsp:nvSpPr>
+        <dsp:cNvPr id="0" name=""/>
+        <dsp:cNvSpPr/>
+      </dsp:nvSpPr>
+      <dsp:spPr>
+        <a:xfrm>
+          <a:off x="568493" y="629"/>
+          <a:ext cx="2847472" cy="1708483"/>
+        </a:xfrm>
+        <a:prstGeom prst="rect">
+          <a:avLst/>
+        </a:prstGeom>
+        <a:solidFill>
+          <a:schemeClr val="accent5">
+            <a:hueOff val="0"/>
+            <a:satOff val="0"/>
+            <a:lumOff val="0"/>
+            <a:alphaOff val="0"/>
+          </a:schemeClr>
+        </a:solidFill>
+        <a:ln w="19050" cap="flat" cmpd="sng" algn="ctr">
+          <a:solidFill>
+            <a:schemeClr val="lt1">
+              <a:hueOff val="0"/>
+              <a:satOff val="0"/>
+              <a:lumOff val="0"/>
+              <a:alphaOff val="0"/>
+            </a:schemeClr>
+          </a:solidFill>
+          <a:prstDash val="solid"/>
+        </a:ln>
+        <a:effectLst/>
+      </dsp:spPr>
+      <dsp:style>
+        <a:lnRef idx="2">
+          <a:scrgbClr r="0" g="0" b="0"/>
+        </a:lnRef>
+        <a:fillRef idx="1">
+          <a:scrgbClr r="0" g="0" b="0"/>
+        </a:fillRef>
+        <a:effectRef idx="0">
+          <a:scrgbClr r="0" g="0" b="0"/>
+        </a:effectRef>
+        <a:fontRef idx="minor">
+          <a:schemeClr val="lt1"/>
+        </a:fontRef>
+      </dsp:style>
+      <dsp:txBody>
+        <a:bodyPr spcFirstLastPara="0" vert="horz" wrap="square" lIns="91440" tIns="91440" rIns="91440" bIns="91440" numCol="1" spcCol="1270" anchor="t" anchorCtr="0">
+          <a:noAutofit/>
+        </a:bodyPr>
+        <a:lstStyle/>
+        <a:p>
+          <a:pPr marL="0" lvl="0" indent="0" algn="l" defTabSz="1066800">
+            <a:lnSpc>
+              <a:spcPct val="90000"/>
+            </a:lnSpc>
+            <a:spcBef>
+              <a:spcPct val="0"/>
+            </a:spcBef>
+            <a:spcAft>
+              <a:spcPct val="35000"/>
+            </a:spcAft>
+            <a:buNone/>
+          </a:pPr>
+          <a:r>
+            <a:rPr lang="en-CA" sz="2400" kern="1200" dirty="0"/>
+            <a:t>Smoke test </a:t>
+          </a:r>
+          <a:endParaRPr lang="en-US" sz="2400" kern="1200" dirty="0"/>
+        </a:p>
+        <a:p>
+          <a:pPr marL="171450" lvl="1" indent="-171450" algn="l" defTabSz="844550">
+            <a:lnSpc>
+              <a:spcPct val="90000"/>
+            </a:lnSpc>
+            <a:spcBef>
+              <a:spcPct val="0"/>
+            </a:spcBef>
+            <a:spcAft>
+              <a:spcPct val="15000"/>
+            </a:spcAft>
+            <a:buChar char="•"/>
+          </a:pPr>
+          <a:r>
+            <a:rPr lang="en-CA" sz="1900" kern="1200" dirty="0"/>
+            <a:t>Does it do what I expect with basic input</a:t>
+          </a:r>
+          <a:endParaRPr lang="en-US" sz="1900" kern="1200" dirty="0"/>
+        </a:p>
+      </dsp:txBody>
+      <dsp:txXfrm>
+        <a:off x="568493" y="629"/>
+        <a:ext cx="2847472" cy="1708483"/>
+      </dsp:txXfrm>
+    </dsp:sp>
+    <dsp:sp modelId="{018383BF-CCA6-4235-997C-C52F600CDFCF}">
+      <dsp:nvSpPr>
+        <dsp:cNvPr id="0" name=""/>
+        <dsp:cNvSpPr/>
+      </dsp:nvSpPr>
+      <dsp:spPr>
+        <a:xfrm>
+          <a:off x="3700713" y="629"/>
+          <a:ext cx="2847472" cy="1708483"/>
+        </a:xfrm>
+        <a:prstGeom prst="rect">
+          <a:avLst/>
+        </a:prstGeom>
+        <a:solidFill>
+          <a:schemeClr val="accent5">
+            <a:hueOff val="115220"/>
+            <a:satOff val="-2250"/>
+            <a:lumOff val="49"/>
+            <a:alphaOff val="0"/>
+          </a:schemeClr>
+        </a:solidFill>
+        <a:ln w="19050" cap="flat" cmpd="sng" algn="ctr">
+          <a:solidFill>
+            <a:schemeClr val="lt1">
+              <a:hueOff val="0"/>
+              <a:satOff val="0"/>
+              <a:lumOff val="0"/>
+              <a:alphaOff val="0"/>
+            </a:schemeClr>
+          </a:solidFill>
+          <a:prstDash val="solid"/>
+        </a:ln>
+        <a:effectLst/>
+      </dsp:spPr>
+      <dsp:style>
+        <a:lnRef idx="2">
+          <a:scrgbClr r="0" g="0" b="0"/>
+        </a:lnRef>
+        <a:fillRef idx="1">
+          <a:scrgbClr r="0" g="0" b="0"/>
+        </a:fillRef>
+        <a:effectRef idx="0">
+          <a:scrgbClr r="0" g="0" b="0"/>
+        </a:effectRef>
+        <a:fontRef idx="minor">
+          <a:schemeClr val="lt1"/>
+        </a:fontRef>
+      </dsp:style>
+      <dsp:txBody>
+        <a:bodyPr spcFirstLastPara="0" vert="horz" wrap="square" lIns="91440" tIns="91440" rIns="91440" bIns="91440" numCol="1" spcCol="1270" anchor="t" anchorCtr="0">
+          <a:noAutofit/>
+        </a:bodyPr>
+        <a:lstStyle/>
+        <a:p>
+          <a:pPr marL="0" lvl="0" indent="0" algn="l" defTabSz="1066800">
+            <a:lnSpc>
+              <a:spcPct val="90000"/>
+            </a:lnSpc>
+            <a:spcBef>
+              <a:spcPct val="0"/>
+            </a:spcBef>
+            <a:spcAft>
+              <a:spcPct val="35000"/>
+            </a:spcAft>
+            <a:buNone/>
+          </a:pPr>
+          <a:r>
+            <a:rPr lang="en-CA" sz="2400" kern="1200" dirty="0"/>
+            <a:t>Comprehensive test</a:t>
+          </a:r>
+          <a:endParaRPr lang="en-US" sz="2400" kern="1200" dirty="0"/>
+        </a:p>
+        <a:p>
+          <a:pPr marL="171450" lvl="1" indent="-171450" algn="l" defTabSz="844550">
+            <a:lnSpc>
+              <a:spcPct val="90000"/>
+            </a:lnSpc>
+            <a:spcBef>
+              <a:spcPct val="0"/>
+            </a:spcBef>
+            <a:spcAft>
+              <a:spcPct val="15000"/>
+            </a:spcAft>
+            <a:buChar char="•"/>
+          </a:pPr>
+          <a:r>
+            <a:rPr lang="en-CA" sz="1900" kern="1200" dirty="0"/>
+            <a:t>Does it meet properties across a range of inputs </a:t>
+          </a:r>
+          <a:endParaRPr lang="en-US" sz="1900" kern="1200" dirty="0"/>
+        </a:p>
+      </dsp:txBody>
+      <dsp:txXfrm>
+        <a:off x="3700713" y="629"/>
+        <a:ext cx="2847472" cy="1708483"/>
+      </dsp:txXfrm>
+    </dsp:sp>
+    <dsp:sp modelId="{AD1D34A5-D0D3-4072-9E48-F7D497C54684}">
+      <dsp:nvSpPr>
+        <dsp:cNvPr id="0" name=""/>
+        <dsp:cNvSpPr/>
+      </dsp:nvSpPr>
+      <dsp:spPr>
+        <a:xfrm>
+          <a:off x="6832933" y="629"/>
+          <a:ext cx="2847472" cy="1708483"/>
+        </a:xfrm>
+        <a:prstGeom prst="rect">
+          <a:avLst/>
+        </a:prstGeom>
+        <a:solidFill>
+          <a:schemeClr val="accent5">
+            <a:hueOff val="230440"/>
+            <a:satOff val="-4499"/>
+            <a:lumOff val="98"/>
+            <a:alphaOff val="0"/>
+          </a:schemeClr>
+        </a:solidFill>
+        <a:ln w="19050" cap="flat" cmpd="sng" algn="ctr">
+          <a:solidFill>
+            <a:schemeClr val="lt1">
+              <a:hueOff val="0"/>
+              <a:satOff val="0"/>
+              <a:lumOff val="0"/>
+              <a:alphaOff val="0"/>
+            </a:schemeClr>
+          </a:solidFill>
+          <a:prstDash val="solid"/>
+        </a:ln>
+        <a:effectLst/>
+      </dsp:spPr>
+      <dsp:style>
+        <a:lnRef idx="2">
+          <a:scrgbClr r="0" g="0" b="0"/>
+        </a:lnRef>
+        <a:fillRef idx="1">
+          <a:scrgbClr r="0" g="0" b="0"/>
+        </a:fillRef>
+        <a:effectRef idx="0">
+          <a:scrgbClr r="0" g="0" b="0"/>
+        </a:effectRef>
+        <a:fontRef idx="minor">
+          <a:schemeClr val="lt1"/>
+        </a:fontRef>
+      </dsp:style>
+      <dsp:txBody>
+        <a:bodyPr spcFirstLastPara="0" vert="horz" wrap="square" lIns="91440" tIns="91440" rIns="91440" bIns="91440" numCol="1" spcCol="1270" anchor="t" anchorCtr="0">
+          <a:noAutofit/>
+        </a:bodyPr>
+        <a:lstStyle/>
+        <a:p>
+          <a:pPr marL="0" lvl="0" indent="0" algn="l" defTabSz="1066800">
+            <a:lnSpc>
+              <a:spcPct val="90000"/>
+            </a:lnSpc>
+            <a:spcBef>
+              <a:spcPct val="0"/>
+            </a:spcBef>
+            <a:spcAft>
+              <a:spcPct val="35000"/>
+            </a:spcAft>
+            <a:buNone/>
+          </a:pPr>
+          <a:r>
+            <a:rPr lang="en-CA" sz="2400" kern="1200" dirty="0"/>
+            <a:t>Performance test</a:t>
+          </a:r>
+          <a:endParaRPr lang="en-US" sz="2400" kern="1200" dirty="0"/>
+        </a:p>
+        <a:p>
+          <a:pPr marL="171450" lvl="1" indent="-171450" algn="l" defTabSz="844550">
+            <a:lnSpc>
+              <a:spcPct val="90000"/>
+            </a:lnSpc>
+            <a:spcBef>
+              <a:spcPct val="0"/>
+            </a:spcBef>
+            <a:spcAft>
+              <a:spcPct val="15000"/>
+            </a:spcAft>
+            <a:buChar char="•"/>
+          </a:pPr>
+          <a:r>
+            <a:rPr lang="en-CA" sz="1900" kern="1200" dirty="0"/>
+            <a:t>Does the algorithm meet performance criteria</a:t>
+          </a:r>
+          <a:endParaRPr lang="en-US" sz="1900" kern="1200" dirty="0"/>
+        </a:p>
+      </dsp:txBody>
+      <dsp:txXfrm>
+        <a:off x="6832933" y="629"/>
+        <a:ext cx="2847472" cy="1708483"/>
+      </dsp:txXfrm>
+    </dsp:sp>
+    <dsp:sp modelId="{05FF81F0-3BE4-48A4-BD2B-EADAA16DE231}">
+      <dsp:nvSpPr>
+        <dsp:cNvPr id="0" name=""/>
+        <dsp:cNvSpPr/>
+      </dsp:nvSpPr>
+      <dsp:spPr>
+        <a:xfrm>
+          <a:off x="568493" y="1993860"/>
+          <a:ext cx="2847472" cy="1708483"/>
+        </a:xfrm>
+        <a:prstGeom prst="rect">
+          <a:avLst/>
+        </a:prstGeom>
+        <a:solidFill>
+          <a:schemeClr val="accent5">
+            <a:hueOff val="345660"/>
+            <a:satOff val="-6749"/>
+            <a:lumOff val="147"/>
+            <a:alphaOff val="0"/>
+          </a:schemeClr>
+        </a:solidFill>
+        <a:ln w="19050" cap="flat" cmpd="sng" algn="ctr">
+          <a:solidFill>
+            <a:schemeClr val="lt1">
+              <a:hueOff val="0"/>
+              <a:satOff val="0"/>
+              <a:lumOff val="0"/>
+              <a:alphaOff val="0"/>
+            </a:schemeClr>
+          </a:solidFill>
+          <a:prstDash val="solid"/>
+        </a:ln>
+        <a:effectLst/>
+      </dsp:spPr>
+      <dsp:style>
+        <a:lnRef idx="2">
+          <a:scrgbClr r="0" g="0" b="0"/>
+        </a:lnRef>
+        <a:fillRef idx="1">
+          <a:scrgbClr r="0" g="0" b="0"/>
+        </a:fillRef>
+        <a:effectRef idx="0">
+          <a:scrgbClr r="0" g="0" b="0"/>
+        </a:effectRef>
+        <a:fontRef idx="minor">
+          <a:schemeClr val="lt1"/>
+        </a:fontRef>
+      </dsp:style>
+      <dsp:txBody>
+        <a:bodyPr spcFirstLastPara="0" vert="horz" wrap="square" lIns="91440" tIns="91440" rIns="91440" bIns="91440" numCol="1" spcCol="1270" anchor="t" anchorCtr="0">
+          <a:noAutofit/>
+        </a:bodyPr>
+        <a:lstStyle/>
+        <a:p>
+          <a:pPr marL="0" lvl="0" indent="0" algn="l" defTabSz="1066800">
+            <a:lnSpc>
+              <a:spcPct val="90000"/>
+            </a:lnSpc>
+            <a:spcBef>
+              <a:spcPct val="0"/>
+            </a:spcBef>
+            <a:spcAft>
+              <a:spcPct val="35000"/>
+            </a:spcAft>
+            <a:buNone/>
+          </a:pPr>
+          <a:r>
+            <a:rPr lang="en-CA" sz="2400" kern="1200"/>
+            <a:t>Edge case test</a:t>
+          </a:r>
+          <a:endParaRPr lang="en-US" sz="2400" kern="1200"/>
+        </a:p>
+        <a:p>
+          <a:pPr marL="171450" lvl="1" indent="-171450" algn="l" defTabSz="844550">
+            <a:lnSpc>
+              <a:spcPct val="90000"/>
+            </a:lnSpc>
+            <a:spcBef>
+              <a:spcPct val="0"/>
+            </a:spcBef>
+            <a:spcAft>
+              <a:spcPct val="15000"/>
+            </a:spcAft>
+            <a:buChar char="•"/>
+          </a:pPr>
+          <a:r>
+            <a:rPr lang="en-CA" sz="1900" kern="1200" dirty="0"/>
+            <a:t>Does it work with rare or degenerate input</a:t>
+          </a:r>
+          <a:endParaRPr lang="en-US" sz="1900" kern="1200" dirty="0"/>
+        </a:p>
+      </dsp:txBody>
+      <dsp:txXfrm>
+        <a:off x="568493" y="1993860"/>
+        <a:ext cx="2847472" cy="1708483"/>
+      </dsp:txXfrm>
+    </dsp:sp>
+    <dsp:sp modelId="{C3052744-8E65-407D-854A-6EACAA21F16A}">
+      <dsp:nvSpPr>
+        <dsp:cNvPr id="0" name=""/>
+        <dsp:cNvSpPr/>
+      </dsp:nvSpPr>
+      <dsp:spPr>
+        <a:xfrm>
+          <a:off x="3700713" y="1993860"/>
+          <a:ext cx="2847472" cy="1708483"/>
+        </a:xfrm>
+        <a:prstGeom prst="rect">
+          <a:avLst/>
+        </a:prstGeom>
+        <a:solidFill>
+          <a:schemeClr val="accent5">
+            <a:hueOff val="460881"/>
+            <a:satOff val="-8998"/>
+            <a:lumOff val="196"/>
+            <a:alphaOff val="0"/>
+          </a:schemeClr>
+        </a:solidFill>
+        <a:ln w="19050" cap="flat" cmpd="sng" algn="ctr">
+          <a:solidFill>
+            <a:schemeClr val="lt1">
+              <a:hueOff val="0"/>
+              <a:satOff val="0"/>
+              <a:lumOff val="0"/>
+              <a:alphaOff val="0"/>
+            </a:schemeClr>
+          </a:solidFill>
+          <a:prstDash val="solid"/>
+        </a:ln>
+        <a:effectLst/>
+      </dsp:spPr>
+      <dsp:style>
+        <a:lnRef idx="2">
+          <a:scrgbClr r="0" g="0" b="0"/>
+        </a:lnRef>
+        <a:fillRef idx="1">
+          <a:scrgbClr r="0" g="0" b="0"/>
+        </a:fillRef>
+        <a:effectRef idx="0">
+          <a:scrgbClr r="0" g="0" b="0"/>
+        </a:effectRef>
+        <a:fontRef idx="minor">
+          <a:schemeClr val="lt1"/>
+        </a:fontRef>
+      </dsp:style>
+      <dsp:txBody>
+        <a:bodyPr spcFirstLastPara="0" vert="horz" wrap="square" lIns="91440" tIns="91440" rIns="91440" bIns="91440" numCol="1" spcCol="1270" anchor="t" anchorCtr="0">
+          <a:noAutofit/>
+        </a:bodyPr>
+        <a:lstStyle/>
+        <a:p>
+          <a:pPr marL="0" lvl="0" indent="0" algn="l" defTabSz="1066800">
+            <a:lnSpc>
+              <a:spcPct val="90000"/>
+            </a:lnSpc>
+            <a:spcBef>
+              <a:spcPct val="0"/>
+            </a:spcBef>
+            <a:spcAft>
+              <a:spcPct val="35000"/>
+            </a:spcAft>
+            <a:buNone/>
+          </a:pPr>
+          <a:r>
+            <a:rPr lang="en-CA" sz="2400" kern="1200" dirty="0"/>
+            <a:t>Limit test</a:t>
+          </a:r>
+          <a:endParaRPr lang="en-US" sz="2400" kern="1200" dirty="0"/>
+        </a:p>
+        <a:p>
+          <a:pPr marL="171450" lvl="1" indent="-171450" algn="l" defTabSz="844550">
+            <a:lnSpc>
+              <a:spcPct val="90000"/>
+            </a:lnSpc>
+            <a:spcBef>
+              <a:spcPct val="0"/>
+            </a:spcBef>
+            <a:spcAft>
+              <a:spcPct val="15000"/>
+            </a:spcAft>
+            <a:buChar char="•"/>
+          </a:pPr>
+          <a:r>
+            <a:rPr lang="en-CA" sz="1900" kern="1200" dirty="0"/>
+            <a:t>Uncover operational constraints</a:t>
+          </a:r>
+          <a:endParaRPr lang="en-US" sz="1900" kern="1200" dirty="0"/>
+        </a:p>
+      </dsp:txBody>
+      <dsp:txXfrm>
+        <a:off x="3700713" y="1993860"/>
+        <a:ext cx="2847472" cy="1708483"/>
+      </dsp:txXfrm>
+    </dsp:sp>
+    <dsp:sp modelId="{3B0BA690-D6A8-4B81-B052-692E82A300C8}">
+      <dsp:nvSpPr>
+        <dsp:cNvPr id="0" name=""/>
+        <dsp:cNvSpPr/>
+      </dsp:nvSpPr>
+      <dsp:spPr>
+        <a:xfrm>
+          <a:off x="6832933" y="1993860"/>
+          <a:ext cx="2847472" cy="1708483"/>
+        </a:xfrm>
+        <a:prstGeom prst="rect">
+          <a:avLst/>
+        </a:prstGeom>
+        <a:solidFill>
+          <a:schemeClr val="accent5">
+            <a:hueOff val="576101"/>
+            <a:satOff val="-11248"/>
+            <a:lumOff val="245"/>
+            <a:alphaOff val="0"/>
+          </a:schemeClr>
+        </a:solidFill>
+        <a:ln w="19050" cap="flat" cmpd="sng" algn="ctr">
+          <a:solidFill>
+            <a:schemeClr val="lt1">
+              <a:hueOff val="0"/>
+              <a:satOff val="0"/>
+              <a:lumOff val="0"/>
+              <a:alphaOff val="0"/>
+            </a:schemeClr>
+          </a:solidFill>
+          <a:prstDash val="solid"/>
+        </a:ln>
+        <a:effectLst/>
+      </dsp:spPr>
+      <dsp:style>
+        <a:lnRef idx="2">
+          <a:scrgbClr r="0" g="0" b="0"/>
+        </a:lnRef>
+        <a:fillRef idx="1">
+          <a:scrgbClr r="0" g="0" b="0"/>
+        </a:fillRef>
+        <a:effectRef idx="0">
+          <a:scrgbClr r="0" g="0" b="0"/>
+        </a:effectRef>
+        <a:fontRef idx="minor">
+          <a:schemeClr val="lt1"/>
+        </a:fontRef>
+      </dsp:style>
+      <dsp:txBody>
+        <a:bodyPr spcFirstLastPara="0" vert="horz" wrap="square" lIns="91440" tIns="91440" rIns="91440" bIns="91440" numCol="1" spcCol="1270" anchor="t" anchorCtr="0">
+          <a:noAutofit/>
+        </a:bodyPr>
+        <a:lstStyle/>
+        <a:p>
+          <a:pPr marL="0" lvl="0" indent="0" algn="l" defTabSz="1066800">
+            <a:lnSpc>
+              <a:spcPct val="90000"/>
+            </a:lnSpc>
+            <a:spcBef>
+              <a:spcPct val="0"/>
+            </a:spcBef>
+            <a:spcAft>
+              <a:spcPct val="35000"/>
+            </a:spcAft>
+            <a:buNone/>
+          </a:pPr>
+          <a:r>
+            <a:rPr lang="en-CA" sz="2400" kern="1200"/>
+            <a:t>Manual test</a:t>
+          </a:r>
+          <a:endParaRPr lang="en-US" sz="2400" kern="1200"/>
+        </a:p>
+        <a:p>
+          <a:pPr marL="171450" lvl="1" indent="-171450" algn="l" defTabSz="844550">
+            <a:lnSpc>
+              <a:spcPct val="90000"/>
+            </a:lnSpc>
+            <a:spcBef>
+              <a:spcPct val="0"/>
+            </a:spcBef>
+            <a:spcAft>
+              <a:spcPct val="15000"/>
+            </a:spcAft>
+            <a:buChar char="•"/>
+          </a:pPr>
+          <a:r>
+            <a:rPr lang="en-CA" sz="1900" kern="1200" dirty="0"/>
+            <a:t>Tests which are run manually</a:t>
+          </a:r>
+          <a:endParaRPr lang="en-US" sz="1900" kern="1200" dirty="0"/>
+        </a:p>
+      </dsp:txBody>
+      <dsp:txXfrm>
+        <a:off x="6832933" y="1993860"/>
+        <a:ext cx="2847472" cy="1708483"/>
+      </dsp:txXfrm>
+    </dsp:sp>
+    <dsp:sp modelId="{C982EA68-4CFC-4351-A07C-34C7B240BAB0}">
+      <dsp:nvSpPr>
+        <dsp:cNvPr id="0" name=""/>
+        <dsp:cNvSpPr/>
+      </dsp:nvSpPr>
+      <dsp:spPr>
+        <a:xfrm>
+          <a:off x="568493" y="3987091"/>
+          <a:ext cx="2847472" cy="1708483"/>
+        </a:xfrm>
+        <a:prstGeom prst="rect">
+          <a:avLst/>
+        </a:prstGeom>
+        <a:solidFill>
+          <a:schemeClr val="accent5">
+            <a:hueOff val="691321"/>
+            <a:satOff val="-13497"/>
+            <a:lumOff val="294"/>
+            <a:alphaOff val="0"/>
+          </a:schemeClr>
+        </a:solidFill>
+        <a:ln w="19050" cap="flat" cmpd="sng" algn="ctr">
+          <a:solidFill>
+            <a:schemeClr val="lt1">
+              <a:hueOff val="0"/>
+              <a:satOff val="0"/>
+              <a:lumOff val="0"/>
+              <a:alphaOff val="0"/>
+            </a:schemeClr>
+          </a:solidFill>
+          <a:prstDash val="solid"/>
+        </a:ln>
+        <a:effectLst/>
+      </dsp:spPr>
+      <dsp:style>
+        <a:lnRef idx="2">
+          <a:scrgbClr r="0" g="0" b="0"/>
+        </a:lnRef>
+        <a:fillRef idx="1">
+          <a:scrgbClr r="0" g="0" b="0"/>
+        </a:fillRef>
+        <a:effectRef idx="0">
+          <a:scrgbClr r="0" g="0" b="0"/>
+        </a:effectRef>
+        <a:fontRef idx="minor">
+          <a:schemeClr val="lt1"/>
+        </a:fontRef>
+      </dsp:style>
+      <dsp:txBody>
+        <a:bodyPr spcFirstLastPara="0" vert="horz" wrap="square" lIns="91440" tIns="91440" rIns="91440" bIns="91440" numCol="1" spcCol="1270" anchor="t" anchorCtr="0">
+          <a:noAutofit/>
+        </a:bodyPr>
+        <a:lstStyle/>
+        <a:p>
+          <a:pPr marL="0" lvl="0" indent="0" algn="l" defTabSz="1066800">
+            <a:lnSpc>
+              <a:spcPct val="90000"/>
+            </a:lnSpc>
+            <a:spcBef>
+              <a:spcPct val="0"/>
+            </a:spcBef>
+            <a:spcAft>
+              <a:spcPct val="35000"/>
+            </a:spcAft>
+            <a:buNone/>
+          </a:pPr>
+          <a:r>
+            <a:rPr lang="en-CA" sz="2400" kern="1200"/>
+            <a:t>Fuzz test</a:t>
+          </a:r>
+          <a:endParaRPr lang="en-US" sz="2400" kern="1200"/>
+        </a:p>
+        <a:p>
+          <a:pPr marL="171450" lvl="1" indent="-171450" algn="l" defTabSz="844550">
+            <a:lnSpc>
+              <a:spcPct val="90000"/>
+            </a:lnSpc>
+            <a:spcBef>
+              <a:spcPct val="0"/>
+            </a:spcBef>
+            <a:spcAft>
+              <a:spcPct val="15000"/>
+            </a:spcAft>
+            <a:buChar char="•"/>
+          </a:pPr>
+          <a:r>
+            <a:rPr lang="en-CA" sz="1900" kern="1200" dirty="0"/>
+            <a:t>Tested with pseudo-random data  </a:t>
+          </a:r>
+          <a:endParaRPr lang="en-US" sz="1900" kern="1200" dirty="0"/>
+        </a:p>
+      </dsp:txBody>
+      <dsp:txXfrm>
+        <a:off x="568493" y="3987091"/>
+        <a:ext cx="2847472" cy="1708483"/>
+      </dsp:txXfrm>
+    </dsp:sp>
+    <dsp:sp modelId="{32F329C4-C543-4E14-A79A-DB319D7F1035}">
+      <dsp:nvSpPr>
+        <dsp:cNvPr id="0" name=""/>
+        <dsp:cNvSpPr/>
+      </dsp:nvSpPr>
+      <dsp:spPr>
+        <a:xfrm>
+          <a:off x="3700713" y="3987091"/>
+          <a:ext cx="2847472" cy="1708483"/>
+        </a:xfrm>
+        <a:prstGeom prst="rect">
+          <a:avLst/>
+        </a:prstGeom>
+        <a:solidFill>
+          <a:schemeClr val="accent5">
+            <a:hueOff val="806541"/>
+            <a:satOff val="-15747"/>
+            <a:lumOff val="343"/>
+            <a:alphaOff val="0"/>
+          </a:schemeClr>
+        </a:solidFill>
+        <a:ln w="19050" cap="flat" cmpd="sng" algn="ctr">
+          <a:solidFill>
+            <a:schemeClr val="lt1">
+              <a:hueOff val="0"/>
+              <a:satOff val="0"/>
+              <a:lumOff val="0"/>
+              <a:alphaOff val="0"/>
+            </a:schemeClr>
+          </a:solidFill>
+          <a:prstDash val="solid"/>
+        </a:ln>
+        <a:effectLst/>
+      </dsp:spPr>
+      <dsp:style>
+        <a:lnRef idx="2">
+          <a:scrgbClr r="0" g="0" b="0"/>
+        </a:lnRef>
+        <a:fillRef idx="1">
+          <a:scrgbClr r="0" g="0" b="0"/>
+        </a:fillRef>
+        <a:effectRef idx="0">
+          <a:scrgbClr r="0" g="0" b="0"/>
+        </a:effectRef>
+        <a:fontRef idx="minor">
+          <a:schemeClr val="lt1"/>
+        </a:fontRef>
+      </dsp:style>
+      <dsp:txBody>
+        <a:bodyPr spcFirstLastPara="0" vert="horz" wrap="square" lIns="91440" tIns="91440" rIns="91440" bIns="91440" numCol="1" spcCol="1270" anchor="t" anchorCtr="0">
+          <a:noAutofit/>
+        </a:bodyPr>
+        <a:lstStyle/>
+        <a:p>
+          <a:pPr marL="0" lvl="0" indent="0" algn="l" defTabSz="1066800">
+            <a:lnSpc>
+              <a:spcPct val="90000"/>
+            </a:lnSpc>
+            <a:spcBef>
+              <a:spcPct val="0"/>
+            </a:spcBef>
+            <a:spcAft>
+              <a:spcPct val="35000"/>
+            </a:spcAft>
+            <a:buNone/>
+          </a:pPr>
+          <a:r>
+            <a:rPr lang="en-CA" sz="2400" kern="1200"/>
+            <a:t>Regression test</a:t>
+          </a:r>
+          <a:endParaRPr lang="en-US" sz="2400" kern="1200"/>
+        </a:p>
+        <a:p>
+          <a:pPr marL="171450" lvl="1" indent="-171450" algn="l" defTabSz="844550">
+            <a:lnSpc>
+              <a:spcPct val="90000"/>
+            </a:lnSpc>
+            <a:spcBef>
+              <a:spcPct val="0"/>
+            </a:spcBef>
+            <a:spcAft>
+              <a:spcPct val="15000"/>
+            </a:spcAft>
+            <a:buChar char="•"/>
+          </a:pPr>
+          <a:r>
+            <a:rPr lang="en-CA" sz="1900" kern="1200"/>
+            <a:t>Assure that fixed bugs don’t reoccur </a:t>
+          </a:r>
+          <a:endParaRPr lang="en-US" sz="1900" kern="1200"/>
+        </a:p>
+      </dsp:txBody>
+      <dsp:txXfrm>
+        <a:off x="3700713" y="3987091"/>
+        <a:ext cx="2847472" cy="1708483"/>
+      </dsp:txXfrm>
+    </dsp:sp>
+    <dsp:sp modelId="{C7F32B15-9643-4A54-A152-85BA7CC43AB4}">
+      <dsp:nvSpPr>
+        <dsp:cNvPr id="0" name=""/>
+        <dsp:cNvSpPr/>
+      </dsp:nvSpPr>
+      <dsp:spPr>
+        <a:xfrm>
+          <a:off x="6832933" y="3987091"/>
+          <a:ext cx="2847472" cy="1708483"/>
+        </a:xfrm>
+        <a:prstGeom prst="rect">
+          <a:avLst/>
+        </a:prstGeom>
+        <a:solidFill>
+          <a:schemeClr val="accent5">
+            <a:hueOff val="921761"/>
+            <a:satOff val="-17996"/>
+            <a:lumOff val="392"/>
+            <a:alphaOff val="0"/>
+          </a:schemeClr>
+        </a:solidFill>
+        <a:ln w="19050" cap="flat" cmpd="sng" algn="ctr">
+          <a:solidFill>
+            <a:schemeClr val="lt1">
+              <a:hueOff val="0"/>
+              <a:satOff val="0"/>
+              <a:lumOff val="0"/>
+              <a:alphaOff val="0"/>
+            </a:schemeClr>
+          </a:solidFill>
+          <a:prstDash val="solid"/>
+        </a:ln>
+        <a:effectLst/>
+      </dsp:spPr>
+      <dsp:style>
+        <a:lnRef idx="2">
+          <a:scrgbClr r="0" g="0" b="0"/>
+        </a:lnRef>
+        <a:fillRef idx="1">
+          <a:scrgbClr r="0" g="0" b="0"/>
+        </a:fillRef>
+        <a:effectRef idx="0">
+          <a:scrgbClr r="0" g="0" b="0"/>
+        </a:effectRef>
+        <a:fontRef idx="minor">
+          <a:schemeClr val="lt1"/>
+        </a:fontRef>
+      </dsp:style>
+      <dsp:txBody>
+        <a:bodyPr spcFirstLastPara="0" vert="horz" wrap="square" lIns="91440" tIns="91440" rIns="91440" bIns="91440" numCol="1" spcCol="1270" anchor="t" anchorCtr="0">
+          <a:noAutofit/>
+        </a:bodyPr>
+        <a:lstStyle/>
+        <a:p>
+          <a:pPr marL="0" lvl="0" indent="0" algn="l" defTabSz="1066800">
+            <a:lnSpc>
+              <a:spcPct val="90000"/>
+            </a:lnSpc>
+            <a:spcBef>
+              <a:spcPct val="0"/>
+            </a:spcBef>
+            <a:spcAft>
+              <a:spcPct val="35000"/>
+            </a:spcAft>
+            <a:buNone/>
+          </a:pPr>
+          <a:r>
+            <a:rPr lang="en-CA" sz="2400" kern="1200"/>
+            <a:t>Integration test</a:t>
+          </a:r>
+          <a:endParaRPr lang="en-US" sz="2400" kern="1200"/>
+        </a:p>
+        <a:p>
+          <a:pPr marL="171450" lvl="1" indent="-171450" algn="l" defTabSz="844550">
+            <a:lnSpc>
+              <a:spcPct val="90000"/>
+            </a:lnSpc>
+            <a:spcBef>
+              <a:spcPct val="0"/>
+            </a:spcBef>
+            <a:spcAft>
+              <a:spcPct val="15000"/>
+            </a:spcAft>
+            <a:buChar char="•"/>
+          </a:pPr>
+          <a:r>
+            <a:rPr lang="en-CA" sz="1900" kern="1200" dirty="0"/>
+            <a:t>Does the algorithm work in conjunction with other components </a:t>
+          </a:r>
+          <a:endParaRPr lang="en-US" sz="1900" kern="1200" dirty="0"/>
+        </a:p>
+      </dsp:txBody>
+      <dsp:txXfrm>
+        <a:off x="6832933" y="3987091"/>
+        <a:ext cx="2847472" cy="1708483"/>
+      </dsp:txXfrm>
+    </dsp:sp>
+  </dsp:spTree>
+</dsp:drawing>
+</file>
+
 <file path=ppt/diagrams/layout1.xml><?xml version="1.0" encoding="utf-8"?>
 <dgm:layoutDef xmlns:dgm="http://schemas.openxmlformats.org/drawingml/2006/diagram" xmlns:a="http://schemas.openxmlformats.org/drawingml/2006/main" uniqueId="urn:microsoft.com/office/officeart/2005/8/layout/hProcess9">
   <dgm:title val=""/>
@@ -8636,6 +11213,153 @@
 </dgm:layoutDef>
 </file>
 
+<file path=ppt/diagrams/layout7.xml><?xml version="1.0" encoding="utf-8"?>
+<dgm:layoutDef xmlns:dgm="http://schemas.openxmlformats.org/drawingml/2006/diagram" xmlns:a="http://schemas.openxmlformats.org/drawingml/2006/main" uniqueId="urn:microsoft.com/office/officeart/2005/8/layout/default">
+  <dgm:title val=""/>
+  <dgm:desc val=""/>
+  <dgm:catLst>
+    <dgm:cat type="list" pri="400"/>
+  </dgm:catLst>
+  <dgm:sampData>
+    <dgm:dataModel>
+      <dgm:ptLst>
+        <dgm:pt modelId="0" type="doc"/>
+        <dgm:pt modelId="1">
+          <dgm:prSet phldr="1"/>
+        </dgm:pt>
+        <dgm:pt modelId="2">
+          <dgm:prSet phldr="1"/>
+        </dgm:pt>
+        <dgm:pt modelId="3">
+          <dgm:prSet phldr="1"/>
+        </dgm:pt>
+        <dgm:pt modelId="4">
+          <dgm:prSet phldr="1"/>
+        </dgm:pt>
+        <dgm:pt modelId="5">
+          <dgm:prSet phldr="1"/>
+        </dgm:pt>
+      </dgm:ptLst>
+      <dgm:cxnLst>
+        <dgm:cxn modelId="6" srcId="0" destId="1" srcOrd="0" destOrd="0"/>
+        <dgm:cxn modelId="7" srcId="0" destId="2" srcOrd="1" destOrd="0"/>
+        <dgm:cxn modelId="8" srcId="0" destId="3" srcOrd="2" destOrd="0"/>
+        <dgm:cxn modelId="9" srcId="0" destId="4" srcOrd="3" destOrd="0"/>
+        <dgm:cxn modelId="10" srcId="0" destId="5" srcOrd="4" destOrd="0"/>
+      </dgm:cxnLst>
+      <dgm:bg/>
+      <dgm:whole/>
+    </dgm:dataModel>
+  </dgm:sampData>
+  <dgm:styleData>
+    <dgm:dataModel>
+      <dgm:ptLst>
+        <dgm:pt modelId="0" type="doc"/>
+        <dgm:pt modelId="1"/>
+        <dgm:pt modelId="2"/>
+      </dgm:ptLst>
+      <dgm:cxnLst>
+        <dgm:cxn modelId="3" srcId="0" destId="1" srcOrd="0" destOrd="0"/>
+        <dgm:cxn modelId="4" srcId="0" destId="2" srcOrd="1" destOrd="0"/>
+      </dgm:cxnLst>
+      <dgm:bg/>
+      <dgm:whole/>
+    </dgm:dataModel>
+  </dgm:styleData>
+  <dgm:clrData>
+    <dgm:dataModel>
+      <dgm:ptLst>
+        <dgm:pt modelId="0" type="doc"/>
+        <dgm:pt modelId="1"/>
+        <dgm:pt modelId="2"/>
+        <dgm:pt modelId="3"/>
+        <dgm:pt modelId="4"/>
+        <dgm:pt modelId="5"/>
+        <dgm:pt modelId="6"/>
+      </dgm:ptLst>
+      <dgm:cxnLst>
+        <dgm:cxn modelId="7" srcId="0" destId="1" srcOrd="0" destOrd="0"/>
+        <dgm:cxn modelId="8" srcId="0" destId="2" srcOrd="1" destOrd="0"/>
+        <dgm:cxn modelId="9" srcId="0" destId="3" srcOrd="2" destOrd="0"/>
+        <dgm:cxn modelId="10" srcId="0" destId="4" srcOrd="3" destOrd="0"/>
+        <dgm:cxn modelId="11" srcId="0" destId="5" srcOrd="4" destOrd="0"/>
+        <dgm:cxn modelId="12" srcId="0" destId="6" srcOrd="5" destOrd="0"/>
+      </dgm:cxnLst>
+      <dgm:bg/>
+      <dgm:whole/>
+    </dgm:dataModel>
+  </dgm:clrData>
+  <dgm:layoutNode name="diagram">
+    <dgm:varLst>
+      <dgm:dir/>
+      <dgm:resizeHandles val="exact"/>
+    </dgm:varLst>
+    <dgm:choose name="Name0">
+      <dgm:if name="Name1" func="var" arg="dir" op="equ" val="norm">
+        <dgm:alg type="snake">
+          <dgm:param type="grDir" val="tL"/>
+          <dgm:param type="flowDir" val="row"/>
+          <dgm:param type="contDir" val="sameDir"/>
+          <dgm:param type="off" val="ctr"/>
+        </dgm:alg>
+      </dgm:if>
+      <dgm:else name="Name2">
+        <dgm:alg type="snake">
+          <dgm:param type="grDir" val="tR"/>
+          <dgm:param type="flowDir" val="row"/>
+          <dgm:param type="contDir" val="sameDir"/>
+          <dgm:param type="off" val="ctr"/>
+        </dgm:alg>
+      </dgm:else>
+    </dgm:choose>
+    <dgm:shape xmlns:r="http://schemas.openxmlformats.org/officeDocument/2006/relationships" r:blip="">
+      <dgm:adjLst/>
+    </dgm:shape>
+    <dgm:presOf/>
+    <dgm:constrLst>
+      <dgm:constr type="w" for="ch" forName="node" refType="w"/>
+      <dgm:constr type="h" for="ch" forName="node" refType="w" refFor="ch" refForName="node" fact="0.6"/>
+      <dgm:constr type="w" for="ch" forName="sibTrans" refType="w" refFor="ch" refForName="node" fact="0.1"/>
+      <dgm:constr type="sp" refType="w" refFor="ch" refForName="sibTrans"/>
+      <dgm:constr type="primFontSz" for="ch" forName="node" op="equ" val="65"/>
+    </dgm:constrLst>
+    <dgm:ruleLst/>
+    <dgm:forEach name="Name3" axis="ch" ptType="node">
+      <dgm:layoutNode name="node">
+        <dgm:varLst>
+          <dgm:bulletEnabled val="1"/>
+        </dgm:varLst>
+        <dgm:alg type="tx"/>
+        <dgm:shape xmlns:r="http://schemas.openxmlformats.org/officeDocument/2006/relationships" type="rect" r:blip="">
+          <dgm:adjLst/>
+        </dgm:shape>
+        <dgm:presOf axis="desOrSelf" ptType="node"/>
+        <dgm:constrLst>
+          <dgm:constr type="lMarg" refType="primFontSz" fact="0.3"/>
+          <dgm:constr type="rMarg" refType="primFontSz" fact="0.3"/>
+          <dgm:constr type="tMarg" refType="primFontSz" fact="0.3"/>
+          <dgm:constr type="bMarg" refType="primFontSz" fact="0.3"/>
+        </dgm:constrLst>
+        <dgm:ruleLst>
+          <dgm:rule type="primFontSz" val="5" fact="NaN" max="NaN"/>
+        </dgm:ruleLst>
+      </dgm:layoutNode>
+      <dgm:forEach name="Name4" axis="followSib" ptType="sibTrans" cnt="1">
+        <dgm:layoutNode name="sibTrans">
+          <dgm:alg type="sp"/>
+          <dgm:shape xmlns:r="http://schemas.openxmlformats.org/officeDocument/2006/relationships" r:blip="">
+            <dgm:adjLst/>
+          </dgm:shape>
+          <dgm:presOf/>
+          <dgm:constrLst/>
+          <dgm:ruleLst/>
+        </dgm:layoutNode>
+      </dgm:forEach>
+    </dgm:forEach>
+  </dgm:layoutNode>
+</dgm:layoutDef>
+</file>
+
 <file path=ppt/diagrams/quickStyle1.xml><?xml version="1.0" encoding="utf-8"?>
 <dgm:styleDef xmlns:dgm="http://schemas.openxmlformats.org/drawingml/2006/diagram" xmlns:a="http://schemas.openxmlformats.org/drawingml/2006/main" uniqueId="urn:microsoft.com/office/officeart/2005/8/quickstyle/simple1">
   <dgm:title val=""/>
@@ -13807,6 +16531,1040 @@
 </file>
 
 <file path=ppt/diagrams/quickStyle6.xml><?xml version="1.0" encoding="utf-8"?>
+<dgm:styleDef xmlns:dgm="http://schemas.openxmlformats.org/drawingml/2006/diagram" xmlns:a="http://schemas.openxmlformats.org/drawingml/2006/main" uniqueId="urn:microsoft.com/office/officeart/2005/8/quickstyle/simple1">
+  <dgm:title val=""/>
+  <dgm:desc val=""/>
+  <dgm:catLst>
+    <dgm:cat type="simple" pri="10100"/>
+  </dgm:catLst>
+  <dgm:scene3d>
+    <a:camera prst="orthographicFront"/>
+    <a:lightRig rig="threePt" dir="t"/>
+  </dgm:scene3d>
+  <dgm:styleLbl name="node0">
+    <dgm:scene3d>
+      <a:camera prst="orthographicFront"/>
+      <a:lightRig rig="threePt" dir="t"/>
+    </dgm:scene3d>
+    <dgm:sp3d/>
+    <dgm:txPr/>
+    <dgm:style>
+      <a:lnRef idx="2">
+        <a:scrgbClr r="0" g="0" b="0"/>
+      </a:lnRef>
+      <a:fillRef idx="1">
+        <a:scrgbClr r="0" g="0" b="0"/>
+      </a:fillRef>
+      <a:effectRef idx="0">
+        <a:scrgbClr r="0" g="0" b="0"/>
+      </a:effectRef>
+      <a:fontRef idx="minor">
+        <a:schemeClr val="lt1"/>
+      </a:fontRef>
+    </dgm:style>
+  </dgm:styleLbl>
+  <dgm:styleLbl name="lnNode1">
+    <dgm:scene3d>
+      <a:camera prst="orthographicFront"/>
+      <a:lightRig rig="threePt" dir="t"/>
+    </dgm:scene3d>
+    <dgm:sp3d/>
+    <dgm:txPr/>
+    <dgm:style>
+      <a:lnRef idx="2">
+        <a:scrgbClr r="0" g="0" b="0"/>
+      </a:lnRef>
+      <a:fillRef idx="1">
+        <a:scrgbClr r="0" g="0" b="0"/>
+      </a:fillRef>
+      <a:effectRef idx="0">
+        <a:scrgbClr r="0" g="0" b="0"/>
+      </a:effectRef>
+      <a:fontRef idx="minor">
+        <a:schemeClr val="lt1"/>
+      </a:fontRef>
+    </dgm:style>
+  </dgm:styleLbl>
+  <dgm:styleLbl name="vennNode1">
+    <dgm:scene3d>
+      <a:camera prst="orthographicFront"/>
+      <a:lightRig rig="threePt" dir="t"/>
+    </dgm:scene3d>
+    <dgm:sp3d/>
+    <dgm:txPr/>
+    <dgm:style>
+      <a:lnRef idx="2">
+        <a:scrgbClr r="0" g="0" b="0"/>
+      </a:lnRef>
+      <a:fillRef idx="1">
+        <a:scrgbClr r="0" g="0" b="0"/>
+      </a:fillRef>
+      <a:effectRef idx="0">
+        <a:scrgbClr r="0" g="0" b="0"/>
+      </a:effectRef>
+      <a:fontRef idx="minor">
+        <a:schemeClr val="tx1"/>
+      </a:fontRef>
+    </dgm:style>
+  </dgm:styleLbl>
+  <dgm:styleLbl name="alignNode1">
+    <dgm:scene3d>
+      <a:camera prst="orthographicFront"/>
+      <a:lightRig rig="threePt" dir="t"/>
+    </dgm:scene3d>
+    <dgm:sp3d/>
+    <dgm:txPr/>
+    <dgm:style>
+      <a:lnRef idx="2">
+        <a:scrgbClr r="0" g="0" b="0"/>
+      </a:lnRef>
+      <a:fillRef idx="1">
+        <a:scrgbClr r="0" g="0" b="0"/>
+      </a:fillRef>
+      <a:effectRef idx="0">
+        <a:scrgbClr r="0" g="0" b="0"/>
+      </a:effectRef>
+      <a:fontRef idx="minor">
+        <a:schemeClr val="lt1"/>
+      </a:fontRef>
+    </dgm:style>
+  </dgm:styleLbl>
+  <dgm:styleLbl name="node1">
+    <dgm:scene3d>
+      <a:camera prst="orthographicFront"/>
+      <a:lightRig rig="threePt" dir="t"/>
+    </dgm:scene3d>
+    <dgm:sp3d/>
+    <dgm:txPr/>
+    <dgm:style>
+      <a:lnRef idx="2">
+        <a:scrgbClr r="0" g="0" b="0"/>
+      </a:lnRef>
+      <a:fillRef idx="1">
+        <a:scrgbClr r="0" g="0" b="0"/>
+      </a:fillRef>
+      <a:effectRef idx="0">
+        <a:scrgbClr r="0" g="0" b="0"/>
+      </a:effectRef>
+      <a:fontRef idx="minor">
+        <a:schemeClr val="lt1"/>
+      </a:fontRef>
+    </dgm:style>
+  </dgm:styleLbl>
+  <dgm:styleLbl name="node2">
+    <dgm:scene3d>
+      <a:camera prst="orthographicFront"/>
+      <a:lightRig rig="threePt" dir="t"/>
+    </dgm:scene3d>
+    <dgm:sp3d/>
+    <dgm:txPr/>
+    <dgm:style>
+      <a:lnRef idx="2">
+        <a:scrgbClr r="0" g="0" b="0"/>
+      </a:lnRef>
+      <a:fillRef idx="1">
+        <a:scrgbClr r="0" g="0" b="0"/>
+      </a:fillRef>
+      <a:effectRef idx="0">
+        <a:scrgbClr r="0" g="0" b="0"/>
+      </a:effectRef>
+      <a:fontRef idx="minor">
+        <a:schemeClr val="lt1"/>
+      </a:fontRef>
+    </dgm:style>
+  </dgm:styleLbl>
+  <dgm:styleLbl name="node3">
+    <dgm:scene3d>
+      <a:camera prst="orthographicFront"/>
+      <a:lightRig rig="threePt" dir="t"/>
+    </dgm:scene3d>
+    <dgm:sp3d/>
+    <dgm:txPr/>
+    <dgm:style>
+      <a:lnRef idx="2">
+        <a:scrgbClr r="0" g="0" b="0"/>
+      </a:lnRef>
+      <a:fillRef idx="1">
+        <a:scrgbClr r="0" g="0" b="0"/>
+      </a:fillRef>
+      <a:effectRef idx="0">
+        <a:scrgbClr r="0" g="0" b="0"/>
+      </a:effectRef>
+      <a:fontRef idx="minor">
+        <a:schemeClr val="lt1"/>
+      </a:fontRef>
+    </dgm:style>
+  </dgm:styleLbl>
+  <dgm:styleLbl name="node4">
+    <dgm:scene3d>
+      <a:camera prst="orthographicFront"/>
+      <a:lightRig rig="threePt" dir="t"/>
+    </dgm:scene3d>
+    <dgm:sp3d/>
+    <dgm:txPr/>
+    <dgm:style>
+      <a:lnRef idx="2">
+        <a:scrgbClr r="0" g="0" b="0"/>
+      </a:lnRef>
+      <a:fillRef idx="1">
+        <a:scrgbClr r="0" g="0" b="0"/>
+      </a:fillRef>
+      <a:effectRef idx="0">
+        <a:scrgbClr r="0" g="0" b="0"/>
+      </a:effectRef>
+      <a:fontRef idx="minor">
+        <a:schemeClr val="lt1"/>
+      </a:fontRef>
+    </dgm:style>
+  </dgm:styleLbl>
+  <dgm:styleLbl name="fgImgPlace1">
+    <dgm:scene3d>
+      <a:camera prst="orthographicFront"/>
+      <a:lightRig rig="threePt" dir="t"/>
+    </dgm:scene3d>
+    <dgm:sp3d/>
+    <dgm:txPr/>
+    <dgm:style>
+      <a:lnRef idx="2">
+        <a:scrgbClr r="0" g="0" b="0"/>
+      </a:lnRef>
+      <a:fillRef idx="1">
+        <a:scrgbClr r="0" g="0" b="0"/>
+      </a:fillRef>
+      <a:effectRef idx="0">
+        <a:scrgbClr r="0" g="0" b="0"/>
+      </a:effectRef>
+      <a:fontRef idx="minor"/>
+    </dgm:style>
+  </dgm:styleLbl>
+  <dgm:styleLbl name="alignImgPlace1">
+    <dgm:scene3d>
+      <a:camera prst="orthographicFront"/>
+      <a:lightRig rig="threePt" dir="t"/>
+    </dgm:scene3d>
+    <dgm:sp3d/>
+    <dgm:txPr/>
+    <dgm:style>
+      <a:lnRef idx="2">
+        <a:scrgbClr r="0" g="0" b="0"/>
+      </a:lnRef>
+      <a:fillRef idx="1">
+        <a:scrgbClr r="0" g="0" b="0"/>
+      </a:fillRef>
+      <a:effectRef idx="0">
+        <a:scrgbClr r="0" g="0" b="0"/>
+      </a:effectRef>
+      <a:fontRef idx="minor"/>
+    </dgm:style>
+  </dgm:styleLbl>
+  <dgm:styleLbl name="bgImgPlace1">
+    <dgm:scene3d>
+      <a:camera prst="orthographicFront"/>
+      <a:lightRig rig="threePt" dir="t"/>
+    </dgm:scene3d>
+    <dgm:sp3d/>
+    <dgm:txPr/>
+    <dgm:style>
+      <a:lnRef idx="2">
+        <a:scrgbClr r="0" g="0" b="0"/>
+      </a:lnRef>
+      <a:fillRef idx="1">
+        <a:scrgbClr r="0" g="0" b="0"/>
+      </a:fillRef>
+      <a:effectRef idx="0">
+        <a:scrgbClr r="0" g="0" b="0"/>
+      </a:effectRef>
+      <a:fontRef idx="minor"/>
+    </dgm:style>
+  </dgm:styleLbl>
+  <dgm:styleLbl name="sibTrans2D1">
+    <dgm:scene3d>
+      <a:camera prst="orthographicFront"/>
+      <a:lightRig rig="threePt" dir="t"/>
+    </dgm:scene3d>
+    <dgm:sp3d/>
+    <dgm:txPr/>
+    <dgm:style>
+      <a:lnRef idx="0">
+        <a:scrgbClr r="0" g="0" b="0"/>
+      </a:lnRef>
+      <a:fillRef idx="1">
+        <a:scrgbClr r="0" g="0" b="0"/>
+      </a:fillRef>
+      <a:effectRef idx="0">
+        <a:scrgbClr r="0" g="0" b="0"/>
+      </a:effectRef>
+      <a:fontRef idx="minor">
+        <a:schemeClr val="lt1"/>
+      </a:fontRef>
+    </dgm:style>
+  </dgm:styleLbl>
+  <dgm:styleLbl name="fgSibTrans2D1">
+    <dgm:scene3d>
+      <a:camera prst="orthographicFront"/>
+      <a:lightRig rig="threePt" dir="t"/>
+    </dgm:scene3d>
+    <dgm:sp3d/>
+    <dgm:txPr/>
+    <dgm:style>
+      <a:lnRef idx="0">
+        <a:scrgbClr r="0" g="0" b="0"/>
+      </a:lnRef>
+      <a:fillRef idx="1">
+        <a:scrgbClr r="0" g="0" b="0"/>
+      </a:fillRef>
+      <a:effectRef idx="0">
+        <a:scrgbClr r="0" g="0" b="0"/>
+      </a:effectRef>
+      <a:fontRef idx="minor">
+        <a:schemeClr val="lt1"/>
+      </a:fontRef>
+    </dgm:style>
+  </dgm:styleLbl>
+  <dgm:styleLbl name="bgSibTrans2D1">
+    <dgm:scene3d>
+      <a:camera prst="orthographicFront"/>
+      <a:lightRig rig="threePt" dir="t"/>
+    </dgm:scene3d>
+    <dgm:sp3d/>
+    <dgm:txPr/>
+    <dgm:style>
+      <a:lnRef idx="0">
+        <a:scrgbClr r="0" g="0" b="0"/>
+      </a:lnRef>
+      <a:fillRef idx="1">
+        <a:scrgbClr r="0" g="0" b="0"/>
+      </a:fillRef>
+      <a:effectRef idx="0">
+        <a:scrgbClr r="0" g="0" b="0"/>
+      </a:effectRef>
+      <a:fontRef idx="minor">
+        <a:schemeClr val="lt1"/>
+      </a:fontRef>
+    </dgm:style>
+  </dgm:styleLbl>
+  <dgm:styleLbl name="sibTrans1D1">
+    <dgm:scene3d>
+      <a:camera prst="orthographicFront"/>
+      <a:lightRig rig="threePt" dir="t"/>
+    </dgm:scene3d>
+    <dgm:sp3d/>
+    <dgm:txPr/>
+    <dgm:style>
+      <a:lnRef idx="1">
+        <a:scrgbClr r="0" g="0" b="0"/>
+      </a:lnRef>
+      <a:fillRef idx="0">
+        <a:scrgbClr r="0" g="0" b="0"/>
+      </a:fillRef>
+      <a:effectRef idx="0">
+        <a:scrgbClr r="0" g="0" b="0"/>
+      </a:effectRef>
+      <a:fontRef idx="minor"/>
+    </dgm:style>
+  </dgm:styleLbl>
+  <dgm:styleLbl name="callout">
+    <dgm:scene3d>
+      <a:camera prst="orthographicFront"/>
+      <a:lightRig rig="threePt" dir="t"/>
+    </dgm:scene3d>
+    <dgm:sp3d/>
+    <dgm:txPr/>
+    <dgm:style>
+      <a:lnRef idx="2">
+        <a:scrgbClr r="0" g="0" b="0"/>
+      </a:lnRef>
+      <a:fillRef idx="1">
+        <a:scrgbClr r="0" g="0" b="0"/>
+      </a:fillRef>
+      <a:effectRef idx="0">
+        <a:scrgbClr r="0" g="0" b="0"/>
+      </a:effectRef>
+      <a:fontRef idx="minor"/>
+    </dgm:style>
+  </dgm:styleLbl>
+  <dgm:styleLbl name="asst0">
+    <dgm:scene3d>
+      <a:camera prst="orthographicFront"/>
+      <a:lightRig rig="threePt" dir="t"/>
+    </dgm:scene3d>
+    <dgm:sp3d/>
+    <dgm:txPr/>
+    <dgm:style>
+      <a:lnRef idx="2">
+        <a:scrgbClr r="0" g="0" b="0"/>
+      </a:lnRef>
+      <a:fillRef idx="1">
+        <a:scrgbClr r="0" g="0" b="0"/>
+      </a:fillRef>
+      <a:effectRef idx="0">
+        <a:scrgbClr r="0" g="0" b="0"/>
+      </a:effectRef>
+      <a:fontRef idx="minor">
+        <a:schemeClr val="lt1"/>
+      </a:fontRef>
+    </dgm:style>
+  </dgm:styleLbl>
+  <dgm:styleLbl name="asst1">
+    <dgm:scene3d>
+      <a:camera prst="orthographicFront"/>
+      <a:lightRig rig="threePt" dir="t"/>
+    </dgm:scene3d>
+    <dgm:sp3d/>
+    <dgm:txPr/>
+    <dgm:style>
+      <a:lnRef idx="2">
+        <a:scrgbClr r="0" g="0" b="0"/>
+      </a:lnRef>
+      <a:fillRef idx="1">
+        <a:scrgbClr r="0" g="0" b="0"/>
+      </a:fillRef>
+      <a:effectRef idx="0">
+        <a:scrgbClr r="0" g="0" b="0"/>
+      </a:effectRef>
+      <a:fontRef idx="minor">
+        <a:schemeClr val="lt1"/>
+      </a:fontRef>
+    </dgm:style>
+  </dgm:styleLbl>
+  <dgm:styleLbl name="asst2">
+    <dgm:scene3d>
+      <a:camera prst="orthographicFront"/>
+      <a:lightRig rig="threePt" dir="t"/>
+    </dgm:scene3d>
+    <dgm:sp3d/>
+    <dgm:txPr/>
+    <dgm:style>
+      <a:lnRef idx="2">
+        <a:scrgbClr r="0" g="0" b="0"/>
+      </a:lnRef>
+      <a:fillRef idx="1">
+        <a:scrgbClr r="0" g="0" b="0"/>
+      </a:fillRef>
+      <a:effectRef idx="0">
+        <a:scrgbClr r="0" g="0" b="0"/>
+      </a:effectRef>
+      <a:fontRef idx="minor">
+        <a:schemeClr val="lt1"/>
+      </a:fontRef>
+    </dgm:style>
+  </dgm:styleLbl>
+  <dgm:styleLbl name="asst3">
+    <dgm:scene3d>
+      <a:camera prst="orthographicFront"/>
+      <a:lightRig rig="threePt" dir="t"/>
+    </dgm:scene3d>
+    <dgm:sp3d/>
+    <dgm:txPr/>
+    <dgm:style>
+      <a:lnRef idx="2">
+        <a:scrgbClr r="0" g="0" b="0"/>
+      </a:lnRef>
+      <a:fillRef idx="1">
+        <a:scrgbClr r="0" g="0" b="0"/>
+      </a:fillRef>
+      <a:effectRef idx="0">
+        <a:scrgbClr r="0" g="0" b="0"/>
+      </a:effectRef>
+      <a:fontRef idx="minor">
+        <a:schemeClr val="lt1"/>
+      </a:fontRef>
+    </dgm:style>
+  </dgm:styleLbl>
+  <dgm:styleLbl name="asst4">
+    <dgm:scene3d>
+      <a:camera prst="orthographicFront"/>
+      <a:lightRig rig="threePt" dir="t"/>
+    </dgm:scene3d>
+    <dgm:sp3d/>
+    <dgm:txPr/>
+    <dgm:style>
+      <a:lnRef idx="2">
+        <a:scrgbClr r="0" g="0" b="0"/>
+      </a:lnRef>
+      <a:fillRef idx="1">
+        <a:scrgbClr r="0" g="0" b="0"/>
+      </a:fillRef>
+      <a:effectRef idx="0">
+        <a:scrgbClr r="0" g="0" b="0"/>
+      </a:effectRef>
+      <a:fontRef idx="minor">
+        <a:schemeClr val="lt1"/>
+      </a:fontRef>
+    </dgm:style>
+  </dgm:styleLbl>
+  <dgm:styleLbl name="parChTrans2D1">
+    <dgm:scene3d>
+      <a:camera prst="orthographicFront"/>
+      <a:lightRig rig="threePt" dir="t"/>
+    </dgm:scene3d>
+    <dgm:sp3d/>
+    <dgm:txPr/>
+    <dgm:style>
+      <a:lnRef idx="2">
+        <a:scrgbClr r="0" g="0" b="0"/>
+      </a:lnRef>
+      <a:fillRef idx="1">
+        <a:scrgbClr r="0" g="0" b="0"/>
+      </a:fillRef>
+      <a:effectRef idx="0">
+        <a:scrgbClr r="0" g="0" b="0"/>
+      </a:effectRef>
+      <a:fontRef idx="minor">
+        <a:schemeClr val="lt1"/>
+      </a:fontRef>
+    </dgm:style>
+  </dgm:styleLbl>
+  <dgm:styleLbl name="parChTrans2D2">
+    <dgm:scene3d>
+      <a:camera prst="orthographicFront"/>
+      <a:lightRig rig="threePt" dir="t"/>
+    </dgm:scene3d>
+    <dgm:sp3d/>
+    <dgm:txPr/>
+    <dgm:style>
+      <a:lnRef idx="2">
+        <a:scrgbClr r="0" g="0" b="0"/>
+      </a:lnRef>
+      <a:fillRef idx="1">
+        <a:scrgbClr r="0" g="0" b="0"/>
+      </a:fillRef>
+      <a:effectRef idx="0">
+        <a:scrgbClr r="0" g="0" b="0"/>
+      </a:effectRef>
+      <a:fontRef idx="minor">
+        <a:schemeClr val="lt1"/>
+      </a:fontRef>
+    </dgm:style>
+  </dgm:styleLbl>
+  <dgm:styleLbl name="parChTrans2D3">
+    <dgm:scene3d>
+      <a:camera prst="orthographicFront"/>
+      <a:lightRig rig="threePt" dir="t"/>
+    </dgm:scene3d>
+    <dgm:sp3d/>
+    <dgm:txPr/>
+    <dgm:style>
+      <a:lnRef idx="2">
+        <a:scrgbClr r="0" g="0" b="0"/>
+      </a:lnRef>
+      <a:fillRef idx="1">
+        <a:scrgbClr r="0" g="0" b="0"/>
+      </a:fillRef>
+      <a:effectRef idx="0">
+        <a:scrgbClr r="0" g="0" b="0"/>
+      </a:effectRef>
+      <a:fontRef idx="minor">
+        <a:schemeClr val="lt1"/>
+      </a:fontRef>
+    </dgm:style>
+  </dgm:styleLbl>
+  <dgm:styleLbl name="parChTrans2D4">
+    <dgm:scene3d>
+      <a:camera prst="orthographicFront"/>
+      <a:lightRig rig="threePt" dir="t"/>
+    </dgm:scene3d>
+    <dgm:sp3d/>
+    <dgm:txPr/>
+    <dgm:style>
+      <a:lnRef idx="2">
+        <a:scrgbClr r="0" g="0" b="0"/>
+      </a:lnRef>
+      <a:fillRef idx="1">
+        <a:scrgbClr r="0" g="0" b="0"/>
+      </a:fillRef>
+      <a:effectRef idx="0">
+        <a:scrgbClr r="0" g="0" b="0"/>
+      </a:effectRef>
+      <a:fontRef idx="minor">
+        <a:schemeClr val="lt1"/>
+      </a:fontRef>
+    </dgm:style>
+  </dgm:styleLbl>
+  <dgm:styleLbl name="parChTrans1D1">
+    <dgm:scene3d>
+      <a:camera prst="orthographicFront"/>
+      <a:lightRig rig="threePt" dir="t"/>
+    </dgm:scene3d>
+    <dgm:sp3d/>
+    <dgm:txPr/>
+    <dgm:style>
+      <a:lnRef idx="2">
+        <a:scrgbClr r="0" g="0" b="0"/>
+      </a:lnRef>
+      <a:fillRef idx="0">
+        <a:scrgbClr r="0" g="0" b="0"/>
+      </a:fillRef>
+      <a:effectRef idx="0">
+        <a:scrgbClr r="0" g="0" b="0"/>
+      </a:effectRef>
+      <a:fontRef idx="minor"/>
+    </dgm:style>
+  </dgm:styleLbl>
+  <dgm:styleLbl name="parChTrans1D2">
+    <dgm:scene3d>
+      <a:camera prst="orthographicFront"/>
+      <a:lightRig rig="threePt" dir="t"/>
+    </dgm:scene3d>
+    <dgm:sp3d/>
+    <dgm:txPr/>
+    <dgm:style>
+      <a:lnRef idx="2">
+        <a:scrgbClr r="0" g="0" b="0"/>
+      </a:lnRef>
+      <a:fillRef idx="0">
+        <a:scrgbClr r="0" g="0" b="0"/>
+      </a:fillRef>
+      <a:effectRef idx="0">
+        <a:scrgbClr r="0" g="0" b="0"/>
+      </a:effectRef>
+      <a:fontRef idx="minor"/>
+    </dgm:style>
+  </dgm:styleLbl>
+  <dgm:styleLbl name="parChTrans1D3">
+    <dgm:scene3d>
+      <a:camera prst="orthographicFront"/>
+      <a:lightRig rig="threePt" dir="t"/>
+    </dgm:scene3d>
+    <dgm:sp3d/>
+    <dgm:txPr/>
+    <dgm:style>
+      <a:lnRef idx="2">
+        <a:scrgbClr r="0" g="0" b="0"/>
+      </a:lnRef>
+      <a:fillRef idx="0">
+        <a:scrgbClr r="0" g="0" b="0"/>
+      </a:fillRef>
+      <a:effectRef idx="0">
+        <a:scrgbClr r="0" g="0" b="0"/>
+      </a:effectRef>
+      <a:fontRef idx="minor"/>
+    </dgm:style>
+  </dgm:styleLbl>
+  <dgm:styleLbl name="parChTrans1D4">
+    <dgm:scene3d>
+      <a:camera prst="orthographicFront"/>
+      <a:lightRig rig="threePt" dir="t"/>
+    </dgm:scene3d>
+    <dgm:sp3d/>
+    <dgm:txPr/>
+    <dgm:style>
+      <a:lnRef idx="2">
+        <a:scrgbClr r="0" g="0" b="0"/>
+      </a:lnRef>
+      <a:fillRef idx="0">
+        <a:scrgbClr r="0" g="0" b="0"/>
+      </a:fillRef>
+      <a:effectRef idx="0">
+        <a:scrgbClr r="0" g="0" b="0"/>
+      </a:effectRef>
+      <a:fontRef idx="minor"/>
+    </dgm:style>
+  </dgm:styleLbl>
+  <dgm:styleLbl name="fgAcc1">
+    <dgm:scene3d>
+      <a:camera prst="orthographicFront"/>
+      <a:lightRig rig="threePt" dir="t"/>
+    </dgm:scene3d>
+    <dgm:sp3d/>
+    <dgm:txPr/>
+    <dgm:style>
+      <a:lnRef idx="2">
+        <a:scrgbClr r="0" g="0" b="0"/>
+      </a:lnRef>
+      <a:fillRef idx="1">
+        <a:scrgbClr r="0" g="0" b="0"/>
+      </a:fillRef>
+      <a:effectRef idx="0">
+        <a:scrgbClr r="0" g="0" b="0"/>
+      </a:effectRef>
+      <a:fontRef idx="minor"/>
+    </dgm:style>
+  </dgm:styleLbl>
+  <dgm:styleLbl name="conFgAcc1">
+    <dgm:scene3d>
+      <a:camera prst="orthographicFront"/>
+      <a:lightRig rig="threePt" dir="t"/>
+    </dgm:scene3d>
+    <dgm:sp3d/>
+    <dgm:txPr/>
+    <dgm:style>
+      <a:lnRef idx="2">
+        <a:scrgbClr r="0" g="0" b="0"/>
+      </a:lnRef>
+      <a:fillRef idx="1">
+        <a:scrgbClr r="0" g="0" b="0"/>
+      </a:fillRef>
+      <a:effectRef idx="0">
+        <a:scrgbClr r="0" g="0" b="0"/>
+      </a:effectRef>
+      <a:fontRef idx="minor"/>
+    </dgm:style>
+  </dgm:styleLbl>
+  <dgm:styleLbl name="alignAcc1">
+    <dgm:scene3d>
+      <a:camera prst="orthographicFront"/>
+      <a:lightRig rig="threePt" dir="t"/>
+    </dgm:scene3d>
+    <dgm:sp3d/>
+    <dgm:txPr/>
+    <dgm:style>
+      <a:lnRef idx="2">
+        <a:scrgbClr r="0" g="0" b="0"/>
+      </a:lnRef>
+      <a:fillRef idx="1">
+        <a:scrgbClr r="0" g="0" b="0"/>
+      </a:fillRef>
+      <a:effectRef idx="0">
+        <a:scrgbClr r="0" g="0" b="0"/>
+      </a:effectRef>
+      <a:fontRef idx="minor"/>
+    </dgm:style>
+  </dgm:styleLbl>
+  <dgm:styleLbl name="trAlignAcc1">
+    <dgm:scene3d>
+      <a:camera prst="orthographicFront"/>
+      <a:lightRig rig="threePt" dir="t"/>
+    </dgm:scene3d>
+    <dgm:sp3d/>
+    <dgm:txPr/>
+    <dgm:style>
+      <a:lnRef idx="1">
+        <a:scrgbClr r="0" g="0" b="0"/>
+      </a:lnRef>
+      <a:fillRef idx="1">
+        <a:scrgbClr r="0" g="0" b="0"/>
+      </a:fillRef>
+      <a:effectRef idx="0">
+        <a:scrgbClr r="0" g="0" b="0"/>
+      </a:effectRef>
+      <a:fontRef idx="minor"/>
+    </dgm:style>
+  </dgm:styleLbl>
+  <dgm:styleLbl name="bgAcc1">
+    <dgm:scene3d>
+      <a:camera prst="orthographicFront"/>
+      <a:lightRig rig="threePt" dir="t"/>
+    </dgm:scene3d>
+    <dgm:sp3d/>
+    <dgm:txPr/>
+    <dgm:style>
+      <a:lnRef idx="2">
+        <a:scrgbClr r="0" g="0" b="0"/>
+      </a:lnRef>
+      <a:fillRef idx="1">
+        <a:scrgbClr r="0" g="0" b="0"/>
+      </a:fillRef>
+      <a:effectRef idx="0">
+        <a:scrgbClr r="0" g="0" b="0"/>
+      </a:effectRef>
+      <a:fontRef idx="minor"/>
+    </dgm:style>
+  </dgm:styleLbl>
+  <dgm:styleLbl name="solidFgAcc1">
+    <dgm:scene3d>
+      <a:camera prst="orthographicFront"/>
+      <a:lightRig rig="threePt" dir="t"/>
+    </dgm:scene3d>
+    <dgm:sp3d/>
+    <dgm:txPr/>
+    <dgm:style>
+      <a:lnRef idx="2">
+        <a:scrgbClr r="0" g="0" b="0"/>
+      </a:lnRef>
+      <a:fillRef idx="1">
+        <a:scrgbClr r="0" g="0" b="0"/>
+      </a:fillRef>
+      <a:effectRef idx="0">
+        <a:scrgbClr r="0" g="0" b="0"/>
+      </a:effectRef>
+      <a:fontRef idx="minor"/>
+    </dgm:style>
+  </dgm:styleLbl>
+  <dgm:styleLbl name="solidAlignAcc1">
+    <dgm:scene3d>
+      <a:camera prst="orthographicFront"/>
+      <a:lightRig rig="threePt" dir="t"/>
+    </dgm:scene3d>
+    <dgm:sp3d/>
+    <dgm:txPr/>
+    <dgm:style>
+      <a:lnRef idx="2">
+        <a:scrgbClr r="0" g="0" b="0"/>
+      </a:lnRef>
+      <a:fillRef idx="1">
+        <a:scrgbClr r="0" g="0" b="0"/>
+      </a:fillRef>
+      <a:effectRef idx="0">
+        <a:scrgbClr r="0" g="0" b="0"/>
+      </a:effectRef>
+      <a:fontRef idx="minor"/>
+    </dgm:style>
+  </dgm:styleLbl>
+  <dgm:styleLbl name="solidBgAcc1">
+    <dgm:scene3d>
+      <a:camera prst="orthographicFront"/>
+      <a:lightRig rig="threePt" dir="t"/>
+    </dgm:scene3d>
+    <dgm:sp3d/>
+    <dgm:txPr/>
+    <dgm:style>
+      <a:lnRef idx="2">
+        <a:scrgbClr r="0" g="0" b="0"/>
+      </a:lnRef>
+      <a:fillRef idx="1">
+        <a:scrgbClr r="0" g="0" b="0"/>
+      </a:fillRef>
+      <a:effectRef idx="0">
+        <a:scrgbClr r="0" g="0" b="0"/>
+      </a:effectRef>
+      <a:fontRef idx="minor"/>
+    </dgm:style>
+  </dgm:styleLbl>
+  <dgm:styleLbl name="fgAccFollowNode1">
+    <dgm:scene3d>
+      <a:camera prst="orthographicFront"/>
+      <a:lightRig rig="threePt" dir="t"/>
+    </dgm:scene3d>
+    <dgm:sp3d/>
+    <dgm:txPr/>
+    <dgm:style>
+      <a:lnRef idx="2">
+        <a:scrgbClr r="0" g="0" b="0"/>
+      </a:lnRef>
+      <a:fillRef idx="1">
+        <a:scrgbClr r="0" g="0" b="0"/>
+      </a:fillRef>
+      <a:effectRef idx="0">
+        <a:scrgbClr r="0" g="0" b="0"/>
+      </a:effectRef>
+      <a:fontRef idx="minor"/>
+    </dgm:style>
+  </dgm:styleLbl>
+  <dgm:styleLbl name="alignAccFollowNode1">
+    <dgm:scene3d>
+      <a:camera prst="orthographicFront"/>
+      <a:lightRig rig="threePt" dir="t"/>
+    </dgm:scene3d>
+    <dgm:sp3d/>
+    <dgm:txPr/>
+    <dgm:style>
+      <a:lnRef idx="2">
+        <a:scrgbClr r="0" g="0" b="0"/>
+      </a:lnRef>
+      <a:fillRef idx="1">
+        <a:scrgbClr r="0" g="0" b="0"/>
+      </a:fillRef>
+      <a:effectRef idx="0">
+        <a:scrgbClr r="0" g="0" b="0"/>
+      </a:effectRef>
+      <a:fontRef idx="minor"/>
+    </dgm:style>
+  </dgm:styleLbl>
+  <dgm:styleLbl name="bgAccFollowNode1">
+    <dgm:scene3d>
+      <a:camera prst="orthographicFront"/>
+      <a:lightRig rig="threePt" dir="t"/>
+    </dgm:scene3d>
+    <dgm:sp3d/>
+    <dgm:txPr/>
+    <dgm:style>
+      <a:lnRef idx="2">
+        <a:scrgbClr r="0" g="0" b="0"/>
+      </a:lnRef>
+      <a:fillRef idx="1">
+        <a:scrgbClr r="0" g="0" b="0"/>
+      </a:fillRef>
+      <a:effectRef idx="0">
+        <a:scrgbClr r="0" g="0" b="0"/>
+      </a:effectRef>
+      <a:fontRef idx="minor"/>
+    </dgm:style>
+  </dgm:styleLbl>
+  <dgm:styleLbl name="fgAcc0">
+    <dgm:scene3d>
+      <a:camera prst="orthographicFront"/>
+      <a:lightRig rig="threePt" dir="t"/>
+    </dgm:scene3d>
+    <dgm:sp3d/>
+    <dgm:txPr/>
+    <dgm:style>
+      <a:lnRef idx="2">
+        <a:scrgbClr r="0" g="0" b="0"/>
+      </a:lnRef>
+      <a:fillRef idx="1">
+        <a:scrgbClr r="0" g="0" b="0"/>
+      </a:fillRef>
+      <a:effectRef idx="0">
+        <a:scrgbClr r="0" g="0" b="0"/>
+      </a:effectRef>
+      <a:fontRef idx="minor"/>
+    </dgm:style>
+  </dgm:styleLbl>
+  <dgm:styleLbl name="fgAcc2">
+    <dgm:scene3d>
+      <a:camera prst="orthographicFront"/>
+      <a:lightRig rig="threePt" dir="t"/>
+    </dgm:scene3d>
+    <dgm:sp3d/>
+    <dgm:txPr/>
+    <dgm:style>
+      <a:lnRef idx="2">
+        <a:scrgbClr r="0" g="0" b="0"/>
+      </a:lnRef>
+      <a:fillRef idx="1">
+        <a:scrgbClr r="0" g="0" b="0"/>
+      </a:fillRef>
+      <a:effectRef idx="0">
+        <a:scrgbClr r="0" g="0" b="0"/>
+      </a:effectRef>
+      <a:fontRef idx="minor"/>
+    </dgm:style>
+  </dgm:styleLbl>
+  <dgm:styleLbl name="fgAcc3">
+    <dgm:scene3d>
+      <a:camera prst="orthographicFront"/>
+      <a:lightRig rig="threePt" dir="t"/>
+    </dgm:scene3d>
+    <dgm:sp3d/>
+    <dgm:txPr/>
+    <dgm:style>
+      <a:lnRef idx="2">
+        <a:scrgbClr r="0" g="0" b="0"/>
+      </a:lnRef>
+      <a:fillRef idx="1">
+        <a:scrgbClr r="0" g="0" b="0"/>
+      </a:fillRef>
+      <a:effectRef idx="0">
+        <a:scrgbClr r="0" g="0" b="0"/>
+      </a:effectRef>
+      <a:fontRef idx="minor"/>
+    </dgm:style>
+  </dgm:styleLbl>
+  <dgm:styleLbl name="fgAcc4">
+    <dgm:scene3d>
+      <a:camera prst="orthographicFront"/>
+      <a:lightRig rig="threePt" dir="t"/>
+    </dgm:scene3d>
+    <dgm:sp3d/>
+    <dgm:txPr/>
+    <dgm:style>
+      <a:lnRef idx="2">
+        <a:scrgbClr r="0" g="0" b="0"/>
+      </a:lnRef>
+      <a:fillRef idx="1">
+        <a:scrgbClr r="0" g="0" b="0"/>
+      </a:fillRef>
+      <a:effectRef idx="0">
+        <a:scrgbClr r="0" g="0" b="0"/>
+      </a:effectRef>
+      <a:fontRef idx="minor"/>
+    </dgm:style>
+  </dgm:styleLbl>
+  <dgm:styleLbl name="bgShp">
+    <dgm:scene3d>
+      <a:camera prst="orthographicFront"/>
+      <a:lightRig rig="threePt" dir="t"/>
+    </dgm:scene3d>
+    <dgm:sp3d/>
+    <dgm:txPr/>
+    <dgm:style>
+      <a:lnRef idx="0">
+        <a:scrgbClr r="0" g="0" b="0"/>
+      </a:lnRef>
+      <a:fillRef idx="1">
+        <a:scrgbClr r="0" g="0" b="0"/>
+      </a:fillRef>
+      <a:effectRef idx="0">
+        <a:scrgbClr r="0" g="0" b="0"/>
+      </a:effectRef>
+      <a:fontRef idx="minor"/>
+    </dgm:style>
+  </dgm:styleLbl>
+  <dgm:styleLbl name="dkBgShp">
+    <dgm:scene3d>
+      <a:camera prst="orthographicFront"/>
+      <a:lightRig rig="threePt" dir="t"/>
+    </dgm:scene3d>
+    <dgm:sp3d/>
+    <dgm:txPr/>
+    <dgm:style>
+      <a:lnRef idx="0">
+        <a:scrgbClr r="0" g="0" b="0"/>
+      </a:lnRef>
+      <a:fillRef idx="1">
+        <a:scrgbClr r="0" g="0" b="0"/>
+      </a:fillRef>
+      <a:effectRef idx="0">
+        <a:scrgbClr r="0" g="0" b="0"/>
+      </a:effectRef>
+      <a:fontRef idx="minor"/>
+    </dgm:style>
+  </dgm:styleLbl>
+  <dgm:styleLbl name="trBgShp">
+    <dgm:scene3d>
+      <a:camera prst="orthographicFront"/>
+      <a:lightRig rig="threePt" dir="t"/>
+    </dgm:scene3d>
+    <dgm:sp3d/>
+    <dgm:txPr/>
+    <dgm:style>
+      <a:lnRef idx="0">
+        <a:scrgbClr r="0" g="0" b="0"/>
+      </a:lnRef>
+      <a:fillRef idx="1">
+        <a:scrgbClr r="0" g="0" b="0"/>
+      </a:fillRef>
+      <a:effectRef idx="0">
+        <a:scrgbClr r="0" g="0" b="0"/>
+      </a:effectRef>
+      <a:fontRef idx="minor"/>
+    </dgm:style>
+  </dgm:styleLbl>
+  <dgm:styleLbl name="fgShp">
+    <dgm:scene3d>
+      <a:camera prst="orthographicFront"/>
+      <a:lightRig rig="threePt" dir="t"/>
+    </dgm:scene3d>
+    <dgm:sp3d/>
+    <dgm:txPr/>
+    <dgm:style>
+      <a:lnRef idx="2">
+        <a:scrgbClr r="0" g="0" b="0"/>
+      </a:lnRef>
+      <a:fillRef idx="1">
+        <a:scrgbClr r="0" g="0" b="0"/>
+      </a:fillRef>
+      <a:effectRef idx="0">
+        <a:scrgbClr r="0" g="0" b="0"/>
+      </a:effectRef>
+      <a:fontRef idx="minor"/>
+    </dgm:style>
+  </dgm:styleLbl>
+  <dgm:styleLbl name="revTx">
+    <dgm:scene3d>
+      <a:camera prst="orthographicFront"/>
+      <a:lightRig rig="threePt" dir="t"/>
+    </dgm:scene3d>
+    <dgm:sp3d/>
+    <dgm:txPr/>
+    <dgm:style>
+      <a:lnRef idx="0">
+        <a:scrgbClr r="0" g="0" b="0"/>
+      </a:lnRef>
+      <a:fillRef idx="0">
+        <a:scrgbClr r="0" g="0" b="0"/>
+      </a:fillRef>
+      <a:effectRef idx="0">
+        <a:scrgbClr r="0" g="0" b="0"/>
+      </a:effectRef>
+      <a:fontRef idx="minor"/>
+    </dgm:style>
+  </dgm:styleLbl>
+</dgm:styleDef>
+</file>
+
+<file path=ppt/diagrams/quickStyle7.xml><?xml version="1.0" encoding="utf-8"?>
 <dgm:styleDef xmlns:dgm="http://schemas.openxmlformats.org/drawingml/2006/diagram" xmlns:a="http://schemas.openxmlformats.org/drawingml/2006/main" uniqueId="urn:microsoft.com/office/officeart/2005/8/quickstyle/simple1">
   <dgm:title val=""/>
   <dgm:desc val=""/>
@@ -15188,6 +18946,90 @@
     </a:lvl9pPr>
   </p:notesStyle>
 </p:notesMaster>
+</file>
+
+<file path=ppt/notesSlides/notesSlide1.xml><?xml version="1.0" encoding="utf-8"?>
+<p:notes xmlns:a="http://schemas.openxmlformats.org/drawingml/2006/main" xmlns:r="http://schemas.openxmlformats.org/officeDocument/2006/relationships" xmlns:p="http://schemas.openxmlformats.org/presentationml/2006/main">
+  <p:cSld>
+    <p:spTree>
+      <p:nvGrpSpPr>
+        <p:cNvPr id="1" name=""/>
+        <p:cNvGrpSpPr/>
+        <p:nvPr/>
+      </p:nvGrpSpPr>
+      <p:grpSpPr>
+        <a:xfrm>
+          <a:off x="0" y="0"/>
+          <a:ext cx="0" cy="0"/>
+          <a:chOff x="0" y="0"/>
+          <a:chExt cx="0" cy="0"/>
+        </a:xfrm>
+      </p:grpSpPr>
+      <p:sp>
+        <p:nvSpPr>
+          <p:cNvPr id="2" name="Slide Image Placeholder 1"/>
+          <p:cNvSpPr>
+            <a:spLocks noGrp="1" noRot="1" noChangeAspect="1"/>
+          </p:cNvSpPr>
+          <p:nvPr>
+            <p:ph type="sldImg"/>
+          </p:nvPr>
+        </p:nvSpPr>
+        <p:spPr/>
+      </p:sp>
+      <p:sp>
+        <p:nvSpPr>
+          <p:cNvPr id="3" name="Notes Placeholder 2"/>
+          <p:cNvSpPr>
+            <a:spLocks noGrp="1"/>
+          </p:cNvSpPr>
+          <p:nvPr>
+            <p:ph type="body" idx="1"/>
+          </p:nvPr>
+        </p:nvSpPr>
+        <p:spPr/>
+        <p:txBody>
+          <a:bodyPr/>
+          <a:lstStyle/>
+          <a:p>
+            <a:endParaRPr lang="en-CA" dirty="0"/>
+          </a:p>
+        </p:txBody>
+      </p:sp>
+      <p:sp>
+        <p:nvSpPr>
+          <p:cNvPr id="4" name="Slide Number Placeholder 3"/>
+          <p:cNvSpPr>
+            <a:spLocks noGrp="1"/>
+          </p:cNvSpPr>
+          <p:nvPr>
+            <p:ph type="sldNum" sz="quarter" idx="5"/>
+          </p:nvPr>
+        </p:nvSpPr>
+        <p:spPr/>
+        <p:txBody>
+          <a:bodyPr/>
+          <a:lstStyle/>
+          <a:p>
+            <a:fld id="{406DC430-8259-49BD-A3AF-7901CB5ACC58}" type="slidenum">
+              <a:rPr lang="en-CA" smtClean="0"/>
+              <a:t>25</a:t>
+            </a:fld>
+            <a:endParaRPr lang="en-CA"/>
+          </a:p>
+        </p:txBody>
+      </p:sp>
+    </p:spTree>
+    <p:extLst>
+      <p:ext uri="{BB962C8B-B14F-4D97-AF65-F5344CB8AC3E}">
+        <p14:creationId xmlns:p14="http://schemas.microsoft.com/office/powerpoint/2010/main" val="1512419758"/>
+      </p:ext>
+    </p:extLst>
+  </p:cSld>
+  <p:clrMapOvr>
+    <a:masterClrMapping/>
+  </p:clrMapOvr>
+</p:notes>
 </file>
 
 <file path=ppt/slideLayouts/slideLayout1.xml><?xml version="1.0" encoding="utf-8"?>
@@ -20188,7 +24030,7 @@
         </p:xfrm>
         <a:graphic>
           <a:graphicData uri="http://schemas.openxmlformats.org/drawingml/2006/diagram">
-            <dgm:relIds xmlns:dgm="http://schemas.openxmlformats.org/drawingml/2006/diagram" xmlns:r="http://schemas.openxmlformats.org/officeDocument/2006/relationships" r:dm="rId2" r:lo="rId3" r:qs="rId4" r:cs="rId5"/>
+            <dgm:relIds xmlns:dgm="http://schemas.openxmlformats.org/drawingml/2006/diagram" xmlns:r="http://schemas.openxmlformats.org/officeDocument/2006/relationships" r:dm="rId3" r:lo="rId4" r:qs="rId5" r:cs="rId6"/>
           </a:graphicData>
         </a:graphic>
       </p:graphicFrame>
@@ -21479,6 +25321,372 @@
 </p:sld>
 </file>
 
+<file path=ppt/slides/slide33.xml><?xml version="1.0" encoding="utf-8"?>
+<p:sld xmlns:a="http://schemas.openxmlformats.org/drawingml/2006/main" xmlns:r="http://schemas.openxmlformats.org/officeDocument/2006/relationships" xmlns:p="http://schemas.openxmlformats.org/presentationml/2006/main">
+  <p:cSld>
+    <p:spTree>
+      <p:nvGrpSpPr>
+        <p:cNvPr id="1" name=""/>
+        <p:cNvGrpSpPr/>
+        <p:nvPr/>
+      </p:nvGrpSpPr>
+      <p:grpSpPr>
+        <a:xfrm>
+          <a:off x="0" y="0"/>
+          <a:ext cx="0" cy="0"/>
+          <a:chOff x="0" y="0"/>
+          <a:chExt cx="0" cy="0"/>
+        </a:xfrm>
+      </p:grpSpPr>
+      <p:sp>
+        <p:nvSpPr>
+          <p:cNvPr id="2" name="Title 1">
+            <a:extLst>
+              <a:ext uri="{FF2B5EF4-FFF2-40B4-BE49-F238E27FC236}">
+                <a16:creationId xmlns:a16="http://schemas.microsoft.com/office/drawing/2014/main" id="{4E8BD01F-9324-F2FE-F991-920D7469AE7C}"/>
+              </a:ext>
+            </a:extLst>
+          </p:cNvPr>
+          <p:cNvSpPr>
+            <a:spLocks noGrp="1"/>
+          </p:cNvSpPr>
+          <p:nvPr>
+            <p:ph type="title"/>
+          </p:nvPr>
+        </p:nvSpPr>
+        <p:spPr/>
+        <p:txBody>
+          <a:bodyPr/>
+          <a:lstStyle/>
+          <a:p>
+            <a:r>
+              <a:rPr lang="en-CA" dirty="0"/>
+              <a:t>Assignment #2 Review</a:t>
+            </a:r>
+          </a:p>
+        </p:txBody>
+      </p:sp>
+      <p:sp>
+        <p:nvSpPr>
+          <p:cNvPr id="3" name="Content Placeholder 2">
+            <a:extLst>
+              <a:ext uri="{FF2B5EF4-FFF2-40B4-BE49-F238E27FC236}">
+                <a16:creationId xmlns:a16="http://schemas.microsoft.com/office/drawing/2014/main" id="{7F39BF66-4BE8-3167-0EE9-307785D5B8B9}"/>
+              </a:ext>
+            </a:extLst>
+          </p:cNvPr>
+          <p:cNvSpPr>
+            <a:spLocks noGrp="1"/>
+          </p:cNvSpPr>
+          <p:nvPr>
+            <p:ph idx="1"/>
+          </p:nvPr>
+        </p:nvSpPr>
+        <p:spPr/>
+        <p:txBody>
+          <a:bodyPr/>
+          <a:lstStyle/>
+          <a:p>
+            <a:r>
+              <a:rPr lang="en-CA" dirty="0"/>
+              <a:t>Fill out the implementation to as much as you can</a:t>
+            </a:r>
+          </a:p>
+          <a:p>
+            <a:r>
+              <a:rPr lang="en-CA" dirty="0"/>
+              <a:t>Remember, wrong is better than nothing</a:t>
+            </a:r>
+          </a:p>
+          <a:p>
+            <a:r>
+              <a:rPr lang="en-CA" dirty="0"/>
+              <a:t>See Microsoft reference source implementation of </a:t>
+            </a:r>
+            <a:r>
+              <a:rPr lang="en-CA" dirty="0" err="1">
+                <a:hlinkClick r:id="rId2"/>
+              </a:rPr>
+              <a:t>List.cs</a:t>
+            </a:r>
+            <a:endParaRPr lang="en-CA" dirty="0"/>
+          </a:p>
+          <a:p>
+            <a:r>
+              <a:rPr lang="en-CA" dirty="0"/>
+              <a:t>Search StackOverflow.com</a:t>
+            </a:r>
+          </a:p>
+          <a:p>
+            <a:r>
+              <a:rPr lang="en-CA" dirty="0"/>
+              <a:t>Read the tests, they hold clues </a:t>
+            </a:r>
+          </a:p>
+          <a:p>
+            <a:r>
+              <a:rPr lang="en-CA" dirty="0"/>
+              <a:t>Look at the helper functions</a:t>
+            </a:r>
+          </a:p>
+          <a:p>
+            <a:r>
+              <a:rPr lang="en-CA"/>
+              <a:t>Consider writing your own.</a:t>
+            </a:r>
+            <a:endParaRPr lang="en-CA" dirty="0"/>
+          </a:p>
+          <a:p>
+            <a:endParaRPr lang="en-CA" dirty="0"/>
+          </a:p>
+        </p:txBody>
+      </p:sp>
+    </p:spTree>
+    <p:extLst>
+      <p:ext uri="{BB962C8B-B14F-4D97-AF65-F5344CB8AC3E}">
+        <p14:creationId xmlns:p14="http://schemas.microsoft.com/office/powerpoint/2010/main" val="2209901633"/>
+      </p:ext>
+    </p:extLst>
+  </p:cSld>
+  <p:clrMapOvr>
+    <a:masterClrMapping/>
+  </p:clrMapOvr>
+</p:sld>
+</file>
+
+<file path=ppt/slides/slide34.xml><?xml version="1.0" encoding="utf-8"?>
+<p:sld xmlns:a="http://schemas.openxmlformats.org/drawingml/2006/main" xmlns:r="http://schemas.openxmlformats.org/officeDocument/2006/relationships" xmlns:p="http://schemas.openxmlformats.org/presentationml/2006/main">
+  <p:cSld>
+    <p:spTree>
+      <p:nvGrpSpPr>
+        <p:cNvPr id="1" name=""/>
+        <p:cNvGrpSpPr/>
+        <p:nvPr/>
+      </p:nvGrpSpPr>
+      <p:grpSpPr>
+        <a:xfrm>
+          <a:off x="0" y="0"/>
+          <a:ext cx="0" cy="0"/>
+          <a:chOff x="0" y="0"/>
+          <a:chExt cx="0" cy="0"/>
+        </a:xfrm>
+      </p:grpSpPr>
+      <p:sp>
+        <p:nvSpPr>
+          <p:cNvPr id="2" name="Title 1">
+            <a:extLst>
+              <a:ext uri="{FF2B5EF4-FFF2-40B4-BE49-F238E27FC236}">
+                <a16:creationId xmlns:a16="http://schemas.microsoft.com/office/drawing/2014/main" id="{4FBD7D8F-B885-FB25-BDDF-1CD223CC35F9}"/>
+              </a:ext>
+            </a:extLst>
+          </p:cNvPr>
+          <p:cNvSpPr>
+            <a:spLocks noGrp="1"/>
+          </p:cNvSpPr>
+          <p:nvPr>
+            <p:ph type="title"/>
+          </p:nvPr>
+        </p:nvSpPr>
+        <p:spPr/>
+        <p:txBody>
+          <a:bodyPr/>
+          <a:lstStyle/>
+          <a:p>
+            <a:r>
+              <a:rPr lang="en-CA" dirty="0"/>
+              <a:t>Assignment Advice</a:t>
+            </a:r>
+          </a:p>
+        </p:txBody>
+      </p:sp>
+      <p:sp>
+        <p:nvSpPr>
+          <p:cNvPr id="3" name="Content Placeholder 2">
+            <a:extLst>
+              <a:ext uri="{FF2B5EF4-FFF2-40B4-BE49-F238E27FC236}">
+                <a16:creationId xmlns:a16="http://schemas.microsoft.com/office/drawing/2014/main" id="{49DEEDCB-0874-2D83-234C-75BAFD1AD94E}"/>
+              </a:ext>
+            </a:extLst>
+          </p:cNvPr>
+          <p:cNvSpPr>
+            <a:spLocks noGrp="1"/>
+          </p:cNvSpPr>
+          <p:nvPr>
+            <p:ph idx="1"/>
+          </p:nvPr>
+        </p:nvSpPr>
+        <p:spPr/>
+        <p:txBody>
+          <a:bodyPr/>
+          <a:lstStyle/>
+          <a:p>
+            <a:r>
+              <a:rPr lang="en-CA" dirty="0"/>
+              <a:t>Find ways to make things work </a:t>
+            </a:r>
+          </a:p>
+          <a:p>
+            <a:r>
+              <a:rPr lang="en-CA" dirty="0"/>
+              <a:t>Use system libraries at the beginning and remove them </a:t>
+            </a:r>
+          </a:p>
+          <a:p>
+            <a:r>
+              <a:rPr lang="en-CA" dirty="0"/>
+              <a:t>Refactor afterwards</a:t>
+            </a:r>
+          </a:p>
+          <a:p>
+            <a:r>
+              <a:rPr lang="en-CA" dirty="0"/>
+              <a:t>Solve what you can first and come back</a:t>
+            </a:r>
+          </a:p>
+          <a:p>
+            <a:r>
+              <a:rPr lang="en-CA" dirty="0"/>
+              <a:t>Look for patterns </a:t>
+            </a:r>
+          </a:p>
+          <a:p>
+            <a:r>
+              <a:rPr lang="en-CA" dirty="0"/>
+              <a:t>Think about arrays/list as values (data)</a:t>
+            </a:r>
+          </a:p>
+          <a:p>
+            <a:r>
+              <a:rPr lang="en-CA" dirty="0"/>
+              <a:t>Look at the reference implementation</a:t>
+            </a:r>
+          </a:p>
+          <a:p>
+            <a:pPr marL="68580" indent="0">
+              <a:buNone/>
+            </a:pPr>
+            <a:endParaRPr lang="en-CA" dirty="0"/>
+          </a:p>
+        </p:txBody>
+      </p:sp>
+    </p:spTree>
+    <p:extLst>
+      <p:ext uri="{BB962C8B-B14F-4D97-AF65-F5344CB8AC3E}">
+        <p14:creationId xmlns:p14="http://schemas.microsoft.com/office/powerpoint/2010/main" val="2502118550"/>
+      </p:ext>
+    </p:extLst>
+  </p:cSld>
+  <p:clrMapOvr>
+    <a:masterClrMapping/>
+  </p:clrMapOvr>
+</p:sld>
+</file>
+
+<file path=ppt/slides/slide35.xml><?xml version="1.0" encoding="utf-8"?>
+<p:sld xmlns:a="http://schemas.openxmlformats.org/drawingml/2006/main" xmlns:r="http://schemas.openxmlformats.org/officeDocument/2006/relationships" xmlns:p="http://schemas.openxmlformats.org/presentationml/2006/main">
+  <p:cSld>
+    <p:bg>
+      <p:bgPr>
+        <a:solidFill>
+          <a:schemeClr val="accent1"/>
+        </a:solidFill>
+        <a:effectLst/>
+      </p:bgPr>
+    </p:bg>
+    <p:spTree>
+      <p:nvGrpSpPr>
+        <p:cNvPr id="1" name=""/>
+        <p:cNvGrpSpPr/>
+        <p:nvPr/>
+      </p:nvGrpSpPr>
+      <p:grpSpPr>
+        <a:xfrm>
+          <a:off x="0" y="0"/>
+          <a:ext cx="0" cy="0"/>
+          <a:chOff x="0" y="0"/>
+          <a:chExt cx="0" cy="0"/>
+        </a:xfrm>
+      </p:grpSpPr>
+      <p:sp>
+        <p:nvSpPr>
+          <p:cNvPr id="2" name="Title 1">
+            <a:extLst>
+              <a:ext uri="{FF2B5EF4-FFF2-40B4-BE49-F238E27FC236}">
+                <a16:creationId xmlns:a16="http://schemas.microsoft.com/office/drawing/2014/main" id="{21C507A0-E9E1-2F73-18BD-54106F37E1E7}"/>
+              </a:ext>
+            </a:extLst>
+          </p:cNvPr>
+          <p:cNvSpPr>
+            <a:spLocks noGrp="1"/>
+          </p:cNvSpPr>
+          <p:nvPr>
+            <p:ph type="title"/>
+          </p:nvPr>
+        </p:nvSpPr>
+        <p:spPr>
+          <a:xfrm>
+            <a:off x="1714500" y="914400"/>
+            <a:ext cx="14813280" cy="2034540"/>
+          </a:xfrm>
+        </p:spPr>
+        <p:txBody>
+          <a:bodyPr>
+            <a:normAutofit/>
+          </a:bodyPr>
+          <a:lstStyle/>
+          <a:p>
+            <a:r>
+              <a:rPr lang="en-CA"/>
+              <a:t>Types of Tests (informal)</a:t>
+            </a:r>
+            <a:endParaRPr lang="en-CA" dirty="0"/>
+          </a:p>
+        </p:txBody>
+      </p:sp>
+      <p:graphicFrame>
+        <p:nvGraphicFramePr>
+          <p:cNvPr id="5" name="Content Placeholder 2">
+            <a:extLst>
+              <a:ext uri="{FF2B5EF4-FFF2-40B4-BE49-F238E27FC236}">
+                <a16:creationId xmlns:a16="http://schemas.microsoft.com/office/drawing/2014/main" id="{5BB45F15-EEF3-C5B2-F1D2-336B86D02F82}"/>
+              </a:ext>
+            </a:extLst>
+          </p:cNvPr>
+          <p:cNvGraphicFramePr>
+            <a:graphicFrameLocks noGrp="1"/>
+          </p:cNvGraphicFramePr>
+          <p:nvPr>
+            <p:ph idx="1"/>
+            <p:extLst>
+              <p:ext uri="{D42A27DB-BD31-4B8C-83A1-F6EECF244321}">
+                <p14:modId xmlns:p14="http://schemas.microsoft.com/office/powerpoint/2010/main" val="125674761"/>
+              </p:ext>
+            </p:extLst>
+          </p:nvPr>
+        </p:nvGraphicFramePr>
+        <p:xfrm>
+          <a:off x="3657600" y="3162300"/>
+          <a:ext cx="10248900" cy="5696205"/>
+        </p:xfrm>
+        <a:graphic>
+          <a:graphicData uri="http://schemas.openxmlformats.org/drawingml/2006/diagram">
+            <dgm:relIds xmlns:dgm="http://schemas.openxmlformats.org/drawingml/2006/diagram" xmlns:r="http://schemas.openxmlformats.org/officeDocument/2006/relationships" r:dm="rId2" r:lo="rId3" r:qs="rId4" r:cs="rId5"/>
+          </a:graphicData>
+        </a:graphic>
+      </p:graphicFrame>
+    </p:spTree>
+    <p:extLst>
+      <p:ext uri="{BB962C8B-B14F-4D97-AF65-F5344CB8AC3E}">
+        <p14:creationId xmlns:p14="http://schemas.microsoft.com/office/powerpoint/2010/main" val="2391403152"/>
+      </p:ext>
+    </p:extLst>
+  </p:cSld>
+  <p:clrMapOvr>
+    <a:masterClrMapping/>
+  </p:clrMapOvr>
+</p:sld>
+</file>
+
 <file path=ppt/slides/slide4.xml><?xml version="1.0" encoding="utf-8"?>
 <p:sld xmlns:a="http://schemas.openxmlformats.org/drawingml/2006/main" xmlns:r="http://schemas.openxmlformats.org/officeDocument/2006/relationships" xmlns:p="http://schemas.openxmlformats.org/presentationml/2006/main">
   <p:cSld>
@@ -21853,7 +26061,7 @@
           <p:cNvPr id="2" name="Title 1">
             <a:extLst>
               <a:ext uri="{FF2B5EF4-FFF2-40B4-BE49-F238E27FC236}">
-                <a16:creationId xmlns:a16="http://schemas.microsoft.com/office/drawing/2014/main" id="{4E8BD01F-9324-F2FE-F991-920D7469AE7C}"/>
+                <a16:creationId xmlns:a16="http://schemas.microsoft.com/office/drawing/2014/main" id="{48BF8342-3BE7-22A0-9A79-D84D4CB5B251}"/>
               </a:ext>
             </a:extLst>
           </p:cNvPr>
@@ -21871,7 +26079,7 @@
           <a:p>
             <a:r>
               <a:rPr lang="en-CA" dirty="0"/>
-              <a:t>Assignment #2 Review</a:t>
+              <a:t>Foreshadowing</a:t>
             </a:r>
           </a:p>
         </p:txBody>
@@ -21881,7 +26089,7 @@
           <p:cNvPr id="3" name="Content Placeholder 2">
             <a:extLst>
               <a:ext uri="{FF2B5EF4-FFF2-40B4-BE49-F238E27FC236}">
-                <a16:creationId xmlns:a16="http://schemas.microsoft.com/office/drawing/2014/main" id="{7F39BF66-4BE8-3167-0EE9-307785D5B8B9}"/>
+                <a16:creationId xmlns:a16="http://schemas.microsoft.com/office/drawing/2014/main" id="{6EEACBA4-4F76-311E-D64F-738D47635B24}"/>
               </a:ext>
             </a:extLst>
           </p:cNvPr>
@@ -21899,61 +26107,33 @@
           <a:p>
             <a:r>
               <a:rPr lang="en-CA" dirty="0"/>
-              <a:t>Fill out the implementation to several algorithms</a:t>
+              <a:t>The final project (and maybe future assignments) will look similar to this! </a:t>
             </a:r>
           </a:p>
           <a:p>
             <a:r>
               <a:rPr lang="en-CA" dirty="0"/>
-              <a:t>See: </a:t>
+              <a:t>One or more applications </a:t>
             </a:r>
-            <a:r>
-              <a:rPr lang="en-CA" dirty="0">
-                <a:hlinkClick r:id="rId2"/>
-              </a:rPr>
-              <a:t>https://referencesource.microsoft.com/#mscorlib/system/array.cs</a:t>
-            </a:r>
-            <a:endParaRPr lang="en-CA" dirty="0"/>
           </a:p>
           <a:p>
             <a:r>
               <a:rPr lang="en-CA" dirty="0"/>
-              <a:t>And: </a:t>
+              <a:t>One or more test projects</a:t>
             </a:r>
-            <a:r>
-              <a:rPr lang="en-CA" dirty="0">
-                <a:hlinkClick r:id="rId3"/>
-              </a:rPr>
-              <a:t>https://referencesource.microsoft.com/#mscorlib/system/collections/generic/list.cs</a:t>
-            </a:r>
-            <a:endParaRPr lang="en-CA" dirty="0"/>
           </a:p>
           <a:p>
             <a:r>
               <a:rPr lang="en-CA" dirty="0"/>
-              <a:t>Use </a:t>
+              <a:t>One or more shared code libraries  </a:t>
             </a:r>
-            <a:r>
-              <a:rPr lang="en-CA" dirty="0" err="1"/>
-              <a:t>StackOverflow</a:t>
-            </a:r>
-            <a:endParaRPr lang="en-CA" dirty="0"/>
-          </a:p>
-          <a:p>
-            <a:r>
-              <a:rPr lang="en-CA" dirty="0"/>
-              <a:t>Warning: not very modern implementations!</a:t>
-            </a:r>
-          </a:p>
-          <a:p>
-            <a:endParaRPr lang="en-CA" dirty="0"/>
           </a:p>
         </p:txBody>
       </p:sp>
     </p:spTree>
     <p:extLst>
       <p:ext uri="{BB962C8B-B14F-4D97-AF65-F5344CB8AC3E}">
-        <p14:creationId xmlns:p14="http://schemas.microsoft.com/office/powerpoint/2010/main" val="451994924"/>
+        <p14:creationId xmlns:p14="http://schemas.microsoft.com/office/powerpoint/2010/main" val="150176609"/>
       </p:ext>
     </p:extLst>
   </p:cSld>
@@ -21985,7 +26165,7 @@
           <p:cNvPr id="2" name="Title 1">
             <a:extLst>
               <a:ext uri="{FF2B5EF4-FFF2-40B4-BE49-F238E27FC236}">
-                <a16:creationId xmlns:a16="http://schemas.microsoft.com/office/drawing/2014/main" id="{48BF8342-3BE7-22A0-9A79-D84D4CB5B251}"/>
+                <a16:creationId xmlns:a16="http://schemas.microsoft.com/office/drawing/2014/main" id="{C7824583-3A7B-C4DD-BBF8-915DA1A9CCC1}"/>
               </a:ext>
             </a:extLst>
           </p:cNvPr>
@@ -22003,7 +26183,7 @@
           <a:p>
             <a:r>
               <a:rPr lang="en-CA" dirty="0"/>
-              <a:t>Foreshadowing</a:t>
+              <a:t>Practice thinking and problem solving</a:t>
             </a:r>
           </a:p>
         </p:txBody>
@@ -22013,7 +26193,7 @@
           <p:cNvPr id="3" name="Content Placeholder 2">
             <a:extLst>
               <a:ext uri="{FF2B5EF4-FFF2-40B4-BE49-F238E27FC236}">
-                <a16:creationId xmlns:a16="http://schemas.microsoft.com/office/drawing/2014/main" id="{6EEACBA4-4F76-311E-D64F-738D47635B24}"/>
+                <a16:creationId xmlns:a16="http://schemas.microsoft.com/office/drawing/2014/main" id="{CF99332C-882C-AD87-3C8C-2FB65260986E}"/>
               </a:ext>
             </a:extLst>
           </p:cNvPr>
@@ -22030,34 +26210,23 @@
           <a:lstStyle/>
           <a:p>
             <a:r>
-              <a:rPr lang="en-CA" dirty="0"/>
-              <a:t>The final project (and maybe future assignments) will look similar to this! </a:t>
+              <a:rPr lang="en-CA" b="1" i="1" dirty="0"/>
+              <a:t>Don’t rely on tools or resources without thinking!</a:t>
             </a:r>
-          </a:p>
-          <a:p>
             <a:r>
-              <a:rPr lang="en-CA" dirty="0"/>
-              <a:t>One or more applications </a:t>
+              <a:rPr lang="en-CA" i="1" dirty="0"/>
+              <a:t> </a:t>
             </a:r>
           </a:p>
           <a:p>
-            <a:r>
-              <a:rPr lang="en-CA" dirty="0"/>
-              <a:t>One or more test projects</a:t>
-            </a:r>
-          </a:p>
-          <a:p>
-            <a:r>
-              <a:rPr lang="en-CA" dirty="0"/>
-              <a:t>One or more shared code libraries  </a:t>
-            </a:r>
+            <a:endParaRPr lang="en-CA" dirty="0"/>
           </a:p>
         </p:txBody>
       </p:sp>
     </p:spTree>
     <p:extLst>
       <p:ext uri="{BB962C8B-B14F-4D97-AF65-F5344CB8AC3E}">
-        <p14:creationId xmlns:p14="http://schemas.microsoft.com/office/powerpoint/2010/main" val="150176609"/>
+        <p14:creationId xmlns:p14="http://schemas.microsoft.com/office/powerpoint/2010/main" val="4267196571"/>
       </p:ext>
     </p:extLst>
   </p:cSld>

</xml_diff>